<commit_message>
5th week 2 modified
</commit_message>
<xml_diff>
--- a/5th week 2.pptx
+++ b/5th week 2.pptx
@@ -5,24 +5,25 @@
     <p:sldMasterId id="2147483676" r:id="rId1"/>
   </p:sldMasterIdLst>
   <p:notesMasterIdLst>
-    <p:notesMasterId r:id="rId14"/>
+    <p:notesMasterId r:id="rId15"/>
   </p:notesMasterIdLst>
   <p:handoutMasterIdLst>
-    <p:handoutMasterId r:id="rId15"/>
+    <p:handoutMasterId r:id="rId16"/>
   </p:handoutMasterIdLst>
   <p:sldIdLst>
     <p:sldId id="256" r:id="rId2"/>
-    <p:sldId id="375" r:id="rId3"/>
-    <p:sldId id="376" r:id="rId4"/>
-    <p:sldId id="377" r:id="rId5"/>
-    <p:sldId id="378" r:id="rId6"/>
-    <p:sldId id="379" r:id="rId7"/>
-    <p:sldId id="380" r:id="rId8"/>
-    <p:sldId id="381" r:id="rId9"/>
-    <p:sldId id="382" r:id="rId10"/>
-    <p:sldId id="383" r:id="rId11"/>
-    <p:sldId id="384" r:id="rId12"/>
-    <p:sldId id="260" r:id="rId13"/>
+    <p:sldId id="257" r:id="rId3"/>
+    <p:sldId id="382" r:id="rId4"/>
+    <p:sldId id="383" r:id="rId5"/>
+    <p:sldId id="384" r:id="rId6"/>
+    <p:sldId id="385" r:id="rId7"/>
+    <p:sldId id="386" r:id="rId8"/>
+    <p:sldId id="391" r:id="rId9"/>
+    <p:sldId id="387" r:id="rId10"/>
+    <p:sldId id="388" r:id="rId11"/>
+    <p:sldId id="389" r:id="rId12"/>
+    <p:sldId id="390" r:id="rId13"/>
+    <p:sldId id="260" r:id="rId14"/>
   </p:sldIdLst>
   <p:sldSz cx="9144000" cy="6858000" type="screen4x3"/>
   <p:notesSz cx="6858000" cy="9144000"/>
@@ -193,6 +194,552 @@
     </pc:docChg>
   </pc:docChgLst>
   <pc:docChgLst>
+    <pc:chgData name="Jeong SangWoo" userId="8b3882065fa5c9e6" providerId="LiveId" clId="{F984A344-9FF2-4F8E-9F43-7D6F6BF7C2C7}"/>
+    <pc:docChg chg="undo custSel addSld delSld modSld sldOrd modMainMaster">
+      <pc:chgData name="Jeong SangWoo" userId="8b3882065fa5c9e6" providerId="LiveId" clId="{F984A344-9FF2-4F8E-9F43-7D6F6BF7C2C7}" dt="2018-04-25T14:15:03.530" v="5818"/>
+      <pc:docMkLst>
+        <pc:docMk/>
+      </pc:docMkLst>
+      <pc:sldChg chg="addSp delSp modSp modTransition">
+        <pc:chgData name="Jeong SangWoo" userId="8b3882065fa5c9e6" providerId="LiveId" clId="{F984A344-9FF2-4F8E-9F43-7D6F6BF7C2C7}" dt="2018-04-22T07:40:07.617" v="5371" actId="20577"/>
+        <pc:sldMkLst>
+          <pc:docMk/>
+          <pc:sldMk cId="3655051314" sldId="256"/>
+        </pc:sldMkLst>
+        <pc:spChg chg="mod">
+          <ac:chgData name="Jeong SangWoo" userId="8b3882065fa5c9e6" providerId="LiveId" clId="{F984A344-9FF2-4F8E-9F43-7D6F6BF7C2C7}" dt="2018-04-22T07:40:07.617" v="5371" actId="20577"/>
+          <ac:spMkLst>
+            <pc:docMk/>
+            <pc:sldMk cId="3655051314" sldId="256"/>
+            <ac:spMk id="3" creationId="{DE6C901A-D1F1-4F84-82A0-6259DA1FA2B3}"/>
+          </ac:spMkLst>
+        </pc:spChg>
+        <pc:picChg chg="add del">
+          <ac:chgData name="Jeong SangWoo" userId="8b3882065fa5c9e6" providerId="LiveId" clId="{F984A344-9FF2-4F8E-9F43-7D6F6BF7C2C7}" dt="2018-04-22T05:21:45.236" v="1154" actId="20577"/>
+          <ac:picMkLst>
+            <pc:docMk/>
+            <pc:sldMk cId="3655051314" sldId="256"/>
+            <ac:picMk id="5" creationId="{15FB8EDB-A683-4BB8-A620-4D687D2A8982}"/>
+          </ac:picMkLst>
+        </pc:picChg>
+        <pc:picChg chg="add del">
+          <ac:chgData name="Jeong SangWoo" userId="8b3882065fa5c9e6" providerId="LiveId" clId="{F984A344-9FF2-4F8E-9F43-7D6F6BF7C2C7}" dt="2018-04-22T06:42:48.885" v="3199" actId="478"/>
+          <ac:picMkLst>
+            <pc:docMk/>
+            <pc:sldMk cId="3655051314" sldId="256"/>
+            <ac:picMk id="6" creationId="{3DD3109C-8245-4AF1-A8CC-0B4C1F62A7CE}"/>
+          </ac:picMkLst>
+        </pc:picChg>
+        <pc:picChg chg="add del">
+          <ac:chgData name="Jeong SangWoo" userId="8b3882065fa5c9e6" providerId="LiveId" clId="{F984A344-9FF2-4F8E-9F43-7D6F6BF7C2C7}" dt="2018-04-22T06:15:31.312" v="2242" actId="20577"/>
+          <ac:picMkLst>
+            <pc:docMk/>
+            <pc:sldMk cId="3655051314" sldId="256"/>
+            <ac:picMk id="7" creationId="{FB095575-C22A-47F7-9B6D-E1782BF7E7F2}"/>
+          </ac:picMkLst>
+        </pc:picChg>
+        <pc:picChg chg="add del">
+          <ac:chgData name="Jeong SangWoo" userId="8b3882065fa5c9e6" providerId="LiveId" clId="{F984A344-9FF2-4F8E-9F43-7D6F6BF7C2C7}" dt="2018-04-22T05:44:57.129" v="1475" actId="20577"/>
+          <ac:picMkLst>
+            <pc:docMk/>
+            <pc:sldMk cId="3655051314" sldId="256"/>
+            <ac:picMk id="8" creationId="{712E2150-CD2E-4857-9AB9-8F10FE78AB4E}"/>
+          </ac:picMkLst>
+        </pc:picChg>
+        <pc:picChg chg="add del">
+          <ac:chgData name="Jeong SangWoo" userId="8b3882065fa5c9e6" providerId="LiveId" clId="{F984A344-9FF2-4F8E-9F43-7D6F6BF7C2C7}" dt="2018-04-22T05:23:49.674" v="1210" actId="20577"/>
+          <ac:picMkLst>
+            <pc:docMk/>
+            <pc:sldMk cId="3655051314" sldId="256"/>
+            <ac:picMk id="9" creationId="{77239142-D9F8-4189-9C7E-83279B438C28}"/>
+          </ac:picMkLst>
+        </pc:picChg>
+        <pc:picChg chg="add del mod">
+          <ac:chgData name="Jeong SangWoo" userId="8b3882065fa5c9e6" providerId="LiveId" clId="{F984A344-9FF2-4F8E-9F43-7D6F6BF7C2C7}" dt="2018-04-22T06:42:45.799" v="3198" actId="20577"/>
+          <ac:picMkLst>
+            <pc:docMk/>
+            <pc:sldMk cId="3655051314" sldId="256"/>
+            <ac:picMk id="10" creationId="{95FE95E3-375B-4852-BB0E-3AE18B3C834D}"/>
+          </ac:picMkLst>
+        </pc:picChg>
+        <pc:picChg chg="add del">
+          <ac:chgData name="Jeong SangWoo" userId="8b3882065fa5c9e6" providerId="LiveId" clId="{F984A344-9FF2-4F8E-9F43-7D6F6BF7C2C7}" dt="2018-04-22T07:29:10.109" v="5115" actId="20577"/>
+          <ac:picMkLst>
+            <pc:docMk/>
+            <pc:sldMk cId="3655051314" sldId="256"/>
+            <ac:picMk id="11" creationId="{C7D59A15-031A-4742-A56D-05D944E39EE5}"/>
+          </ac:picMkLst>
+        </pc:picChg>
+      </pc:sldChg>
+      <pc:sldChg chg="modTransition">
+        <pc:chgData name="Jeong SangWoo" userId="8b3882065fa5c9e6" providerId="LiveId" clId="{F984A344-9FF2-4F8E-9F43-7D6F6BF7C2C7}" dt="2018-04-22T04:53:01.947" v="156" actId="20577"/>
+        <pc:sldMkLst>
+          <pc:docMk/>
+          <pc:sldMk cId="1746186059" sldId="260"/>
+        </pc:sldMkLst>
+      </pc:sldChg>
+      <pc:sldMasterChg chg="modSldLayout">
+        <pc:chgData name="Jeong SangWoo" userId="8b3882065fa5c9e6" providerId="LiveId" clId="{F984A344-9FF2-4F8E-9F43-7D6F6BF7C2C7}" dt="2018-04-22T07:37:21.470" v="5331" actId="14100"/>
+        <pc:sldMasterMkLst>
+          <pc:docMk/>
+          <pc:sldMasterMk cId="2055134626" sldId="2147483676"/>
+        </pc:sldMasterMkLst>
+        <pc:sldLayoutChg chg="modSp">
+          <pc:chgData name="Jeong SangWoo" userId="8b3882065fa5c9e6" providerId="LiveId" clId="{F984A344-9FF2-4F8E-9F43-7D6F6BF7C2C7}" dt="2018-04-22T07:37:21.470" v="5331" actId="14100"/>
+          <pc:sldLayoutMkLst>
+            <pc:docMk/>
+            <pc:sldMasterMk cId="2055134626" sldId="2147483676"/>
+            <pc:sldLayoutMk cId="251237391" sldId="2147483693"/>
+          </pc:sldLayoutMkLst>
+          <pc:spChg chg="mod">
+            <ac:chgData name="Jeong SangWoo" userId="8b3882065fa5c9e6" providerId="LiveId" clId="{F984A344-9FF2-4F8E-9F43-7D6F6BF7C2C7}" dt="2018-04-22T07:37:21.470" v="5331" actId="14100"/>
+            <ac:spMkLst>
+              <pc:docMk/>
+              <pc:sldMasterMk cId="2055134626" sldId="2147483676"/>
+              <pc:sldLayoutMk cId="251237391" sldId="2147483693"/>
+              <ac:spMk id="3" creationId="{C98E057A-AEE1-4C1C-BFE3-17126FA4FE0B}"/>
+            </ac:spMkLst>
+          </pc:spChg>
+        </pc:sldLayoutChg>
+      </pc:sldMasterChg>
+    </pc:docChg>
+  </pc:docChgLst>
+  <pc:docChgLst>
+    <pc:chgData name="Jeong SangWoo" userId="8b3882065fa5c9e6" providerId="LiveId" clId="{CBAE06D3-3B81-449F-A7F3-FAD05C0BB75D}"/>
+    <pc:docChg chg="undo custSel addSld delSld modSld">
+      <pc:chgData name="Jeong SangWoo" userId="8b3882065fa5c9e6" providerId="LiveId" clId="{CBAE06D3-3B81-449F-A7F3-FAD05C0BB75D}" dt="2018-05-27T10:14:07.291" v="403" actId="2696"/>
+      <pc:docMkLst>
+        <pc:docMk/>
+      </pc:docMkLst>
+      <pc:sldChg chg="modSp">
+        <pc:chgData name="Jeong SangWoo" userId="8b3882065fa5c9e6" providerId="LiveId" clId="{CBAE06D3-3B81-449F-A7F3-FAD05C0BB75D}" dt="2018-05-27T09:50:16.464" v="27" actId="2696"/>
+        <pc:sldMkLst>
+          <pc:docMk/>
+          <pc:sldMk cId="3655051314" sldId="256"/>
+        </pc:sldMkLst>
+        <pc:spChg chg="mod">
+          <ac:chgData name="Jeong SangWoo" userId="8b3882065fa5c9e6" providerId="LiveId" clId="{CBAE06D3-3B81-449F-A7F3-FAD05C0BB75D}" dt="2018-05-27T09:50:04.172" v="9" actId="20577"/>
+          <ac:spMkLst>
+            <pc:docMk/>
+            <pc:sldMk cId="3655051314" sldId="256"/>
+            <ac:spMk id="2" creationId="{87F2F9A8-35A7-4878-8B78-89685E5866F5}"/>
+          </ac:spMkLst>
+        </pc:spChg>
+        <pc:spChg chg="mod">
+          <ac:chgData name="Jeong SangWoo" userId="8b3882065fa5c9e6" providerId="LiveId" clId="{CBAE06D3-3B81-449F-A7F3-FAD05C0BB75D}" dt="2018-05-27T09:50:16.464" v="27" actId="2696"/>
+          <ac:spMkLst>
+            <pc:docMk/>
+            <pc:sldMk cId="3655051314" sldId="256"/>
+            <ac:spMk id="3" creationId="{DE6C901A-D1F1-4F84-82A0-6259DA1FA2B3}"/>
+          </ac:spMkLst>
+        </pc:spChg>
+      </pc:sldChg>
+      <pc:sldChg chg="addSp delSp modSp add del">
+        <pc:chgData name="Jeong SangWoo" userId="8b3882065fa5c9e6" providerId="LiveId" clId="{CBAE06D3-3B81-449F-A7F3-FAD05C0BB75D}" dt="2018-05-27T09:52:07.050" v="47" actId="2696"/>
+        <pc:sldMkLst>
+          <pc:docMk/>
+          <pc:sldMk cId="2828471371" sldId="257"/>
+        </pc:sldMkLst>
+        <pc:grpChg chg="add del mod">
+          <ac:chgData name="Jeong SangWoo" userId="8b3882065fa5c9e6" providerId="LiveId" clId="{CBAE06D3-3B81-449F-A7F3-FAD05C0BB75D}" dt="2018-05-27T09:50:25.332" v="32" actId="478"/>
+          <ac:grpSpMkLst>
+            <pc:docMk/>
+            <pc:sldMk cId="2828471371" sldId="257"/>
+            <ac:grpSpMk id="8" creationId="{A85BE140-0EE9-44DF-B619-0E61E4630013}"/>
+          </ac:grpSpMkLst>
+        </pc:grpChg>
+        <pc:grpChg chg="add del mod">
+          <ac:chgData name="Jeong SangWoo" userId="8b3882065fa5c9e6" providerId="LiveId" clId="{CBAE06D3-3B81-449F-A7F3-FAD05C0BB75D}" dt="2018-05-27T09:50:25.332" v="32" actId="478"/>
+          <ac:grpSpMkLst>
+            <pc:docMk/>
+            <pc:sldMk cId="2828471371" sldId="257"/>
+            <ac:grpSpMk id="9" creationId="{60EF4181-1834-4E09-B6A0-C6E29400622B}"/>
+          </ac:grpSpMkLst>
+        </pc:grpChg>
+      </pc:sldChg>
+      <pc:sldChg chg="del">
+        <pc:chgData name="Jeong SangWoo" userId="8b3882065fa5c9e6" providerId="LiveId" clId="{CBAE06D3-3B81-449F-A7F3-FAD05C0BB75D}" dt="2018-05-27T09:52:08.913" v="48" actId="2696"/>
+        <pc:sldMkLst>
+          <pc:docMk/>
+          <pc:sldMk cId="2747549357" sldId="374"/>
+        </pc:sldMkLst>
+      </pc:sldChg>
+      <pc:sldChg chg="addSp delSp modSp">
+        <pc:chgData name="Jeong SangWoo" userId="8b3882065fa5c9e6" providerId="LiveId" clId="{CBAE06D3-3B81-449F-A7F3-FAD05C0BB75D}" dt="2018-05-27T09:54:39.702" v="101" actId="1076"/>
+        <pc:sldMkLst>
+          <pc:docMk/>
+          <pc:sldMk cId="121322230" sldId="375"/>
+        </pc:sldMkLst>
+        <pc:spChg chg="add del">
+          <ac:chgData name="Jeong SangWoo" userId="8b3882065fa5c9e6" providerId="LiveId" clId="{CBAE06D3-3B81-449F-A7F3-FAD05C0BB75D}" dt="2018-05-27T09:52:46.741" v="83" actId="1076"/>
+          <ac:spMkLst>
+            <pc:docMk/>
+            <pc:sldMk cId="121322230" sldId="375"/>
+            <ac:spMk id="2" creationId="{93E89F17-41B1-42E3-88EA-5BD59B737BED}"/>
+          </ac:spMkLst>
+        </pc:spChg>
+        <pc:spChg chg="mod">
+          <ac:chgData name="Jeong SangWoo" userId="8b3882065fa5c9e6" providerId="LiveId" clId="{CBAE06D3-3B81-449F-A7F3-FAD05C0BB75D}" dt="2018-05-27T09:54:39.702" v="101" actId="1076"/>
+          <ac:spMkLst>
+            <pc:docMk/>
+            <pc:sldMk cId="121322230" sldId="375"/>
+            <ac:spMk id="3" creationId="{76DEDF3D-AD3E-4C60-A62E-779C9266CAD4}"/>
+          </ac:spMkLst>
+        </pc:spChg>
+        <pc:spChg chg="del mod">
+          <ac:chgData name="Jeong SangWoo" userId="8b3882065fa5c9e6" providerId="LiveId" clId="{CBAE06D3-3B81-449F-A7F3-FAD05C0BB75D}" dt="2018-05-27T09:53:25.549" v="92" actId="478"/>
+          <ac:spMkLst>
+            <pc:docMk/>
+            <pc:sldMk cId="121322230" sldId="375"/>
+            <ac:spMk id="11" creationId="{AC22DCD9-5B4C-4536-93E8-1FF813C69FF0}"/>
+          </ac:spMkLst>
+        </pc:spChg>
+        <pc:picChg chg="add del mod">
+          <ac:chgData name="Jeong SangWoo" userId="8b3882065fa5c9e6" providerId="LiveId" clId="{CBAE06D3-3B81-449F-A7F3-FAD05C0BB75D}" dt="2018-05-27T09:54:20.097" v="95" actId="1076"/>
+          <ac:picMkLst>
+            <pc:docMk/>
+            <pc:sldMk cId="121322230" sldId="375"/>
+            <ac:picMk id="4" creationId="{5D71804E-B1DE-4467-8837-C0AC2346E030}"/>
+          </ac:picMkLst>
+        </pc:picChg>
+        <pc:picChg chg="del">
+          <ac:chgData name="Jeong SangWoo" userId="8b3882065fa5c9e6" providerId="LiveId" clId="{CBAE06D3-3B81-449F-A7F3-FAD05C0BB75D}" dt="2018-05-27T09:52:17.409" v="49" actId="478"/>
+          <ac:picMkLst>
+            <pc:docMk/>
+            <pc:sldMk cId="121322230" sldId="375"/>
+            <ac:picMk id="5" creationId="{2FB3B230-3C40-4D6C-B7F3-B0EC848C8276}"/>
+          </ac:picMkLst>
+        </pc:picChg>
+      </pc:sldChg>
+      <pc:sldChg chg="del">
+        <pc:chgData name="Jeong SangWoo" userId="8b3882065fa5c9e6" providerId="LiveId" clId="{CBAE06D3-3B81-449F-A7F3-FAD05C0BB75D}" dt="2018-05-27T09:50:35.171" v="33" actId="2696"/>
+        <pc:sldMkLst>
+          <pc:docMk/>
+          <pc:sldMk cId="1450421919" sldId="376"/>
+        </pc:sldMkLst>
+      </pc:sldChg>
+      <pc:sldChg chg="addSp delSp modSp add">
+        <pc:chgData name="Jeong SangWoo" userId="8b3882065fa5c9e6" providerId="LiveId" clId="{CBAE06D3-3B81-449F-A7F3-FAD05C0BB75D}" dt="2018-05-27T09:54:28.348" v="98" actId="2696"/>
+        <pc:sldMkLst>
+          <pc:docMk/>
+          <pc:sldMk cId="2053696221" sldId="376"/>
+        </pc:sldMkLst>
+        <pc:spChg chg="del">
+          <ac:chgData name="Jeong SangWoo" userId="8b3882065fa5c9e6" providerId="LiveId" clId="{CBAE06D3-3B81-449F-A7F3-FAD05C0BB75D}" dt="2018-05-27T09:54:27.211" v="97" actId="478"/>
+          <ac:spMkLst>
+            <pc:docMk/>
+            <pc:sldMk cId="2053696221" sldId="376"/>
+            <ac:spMk id="3" creationId="{76DEDF3D-AD3E-4C60-A62E-779C9266CAD4}"/>
+          </ac:spMkLst>
+        </pc:spChg>
+        <pc:spChg chg="add mod">
+          <ac:chgData name="Jeong SangWoo" userId="8b3882065fa5c9e6" providerId="LiveId" clId="{CBAE06D3-3B81-449F-A7F3-FAD05C0BB75D}" dt="2018-05-27T09:54:27.211" v="97" actId="478"/>
+          <ac:spMkLst>
+            <pc:docMk/>
+            <pc:sldMk cId="2053696221" sldId="376"/>
+            <ac:spMk id="4" creationId="{EB0EBC6B-012A-4ACA-8760-6CC34C9635E0}"/>
+          </ac:spMkLst>
+        </pc:spChg>
+        <pc:picChg chg="add">
+          <ac:chgData name="Jeong SangWoo" userId="8b3882065fa5c9e6" providerId="LiveId" clId="{CBAE06D3-3B81-449F-A7F3-FAD05C0BB75D}" dt="2018-05-27T09:54:28.348" v="98" actId="2696"/>
+          <ac:picMkLst>
+            <pc:docMk/>
+            <pc:sldMk cId="2053696221" sldId="376"/>
+            <ac:picMk id="5" creationId="{DB154649-6ED9-4EE1-A9C5-E8703DBC38E3}"/>
+          </ac:picMkLst>
+        </pc:picChg>
+      </pc:sldChg>
+      <pc:sldChg chg="addSp delSp modSp add">
+        <pc:chgData name="Jeong SangWoo" userId="8b3882065fa5c9e6" providerId="LiveId" clId="{CBAE06D3-3B81-449F-A7F3-FAD05C0BB75D}" dt="2018-05-27T09:54:59.199" v="105" actId="1076"/>
+        <pc:sldMkLst>
+          <pc:docMk/>
+          <pc:sldMk cId="2394875296" sldId="377"/>
+        </pc:sldMkLst>
+        <pc:picChg chg="add mod">
+          <ac:chgData name="Jeong SangWoo" userId="8b3882065fa5c9e6" providerId="LiveId" clId="{CBAE06D3-3B81-449F-A7F3-FAD05C0BB75D}" dt="2018-05-27T09:54:59.199" v="105" actId="1076"/>
+          <ac:picMkLst>
+            <pc:docMk/>
+            <pc:sldMk cId="2394875296" sldId="377"/>
+            <ac:picMk id="2" creationId="{1B8FF623-91F4-4F70-BB08-6D6E21D6467B}"/>
+          </ac:picMkLst>
+        </pc:picChg>
+        <pc:picChg chg="del">
+          <ac:chgData name="Jeong SangWoo" userId="8b3882065fa5c9e6" providerId="LiveId" clId="{CBAE06D3-3B81-449F-A7F3-FAD05C0BB75D}" dt="2018-05-27T09:54:57.685" v="103" actId="478"/>
+          <ac:picMkLst>
+            <pc:docMk/>
+            <pc:sldMk cId="2394875296" sldId="377"/>
+            <ac:picMk id="5" creationId="{DB154649-6ED9-4EE1-A9C5-E8703DBC38E3}"/>
+          </ac:picMkLst>
+        </pc:picChg>
+      </pc:sldChg>
+      <pc:sldChg chg="del">
+        <pc:chgData name="Jeong SangWoo" userId="8b3882065fa5c9e6" providerId="LiveId" clId="{CBAE06D3-3B81-449F-A7F3-FAD05C0BB75D}" dt="2018-05-27T09:50:35.180" v="34" actId="2696"/>
+        <pc:sldMkLst>
+          <pc:docMk/>
+          <pc:sldMk cId="4046101176" sldId="377"/>
+        </pc:sldMkLst>
+      </pc:sldChg>
+      <pc:sldChg chg="addSp delSp modSp add">
+        <pc:chgData name="Jeong SangWoo" userId="8b3882065fa5c9e6" providerId="LiveId" clId="{CBAE06D3-3B81-449F-A7F3-FAD05C0BB75D}" dt="2018-05-27T09:59:50.872" v="154" actId="121"/>
+        <pc:sldMkLst>
+          <pc:docMk/>
+          <pc:sldMk cId="2092208707" sldId="378"/>
+        </pc:sldMkLst>
+        <pc:spChg chg="mod">
+          <ac:chgData name="Jeong SangWoo" userId="8b3882065fa5c9e6" providerId="LiveId" clId="{CBAE06D3-3B81-449F-A7F3-FAD05C0BB75D}" dt="2018-05-27T09:55:17.752" v="127" actId="121"/>
+          <ac:spMkLst>
+            <pc:docMk/>
+            <pc:sldMk cId="2092208707" sldId="378"/>
+            <ac:spMk id="4" creationId="{EB0EBC6B-012A-4ACA-8760-6CC34C9635E0}"/>
+          </ac:spMkLst>
+        </pc:spChg>
+        <pc:graphicFrameChg chg="add mod modGraphic">
+          <ac:chgData name="Jeong SangWoo" userId="8b3882065fa5c9e6" providerId="LiveId" clId="{CBAE06D3-3B81-449F-A7F3-FAD05C0BB75D}" dt="2018-05-27T09:59:50.872" v="154" actId="121"/>
+          <ac:graphicFrameMkLst>
+            <pc:docMk/>
+            <pc:sldMk cId="2092208707" sldId="378"/>
+            <ac:graphicFrameMk id="3" creationId="{6B39A3A4-4A6D-4A2D-986B-4159AA46198E}"/>
+          </ac:graphicFrameMkLst>
+        </pc:graphicFrameChg>
+        <pc:picChg chg="del">
+          <ac:chgData name="Jeong SangWoo" userId="8b3882065fa5c9e6" providerId="LiveId" clId="{CBAE06D3-3B81-449F-A7F3-FAD05C0BB75D}" dt="2018-05-27T09:55:02.887" v="107" actId="478"/>
+          <ac:picMkLst>
+            <pc:docMk/>
+            <pc:sldMk cId="2092208707" sldId="378"/>
+            <ac:picMk id="2" creationId="{1B8FF623-91F4-4F70-BB08-6D6E21D6467B}"/>
+          </ac:picMkLst>
+        </pc:picChg>
+      </pc:sldChg>
+      <pc:sldChg chg="del">
+        <pc:chgData name="Jeong SangWoo" userId="8b3882065fa5c9e6" providerId="LiveId" clId="{CBAE06D3-3B81-449F-A7F3-FAD05C0BB75D}" dt="2018-05-27T09:50:45.095" v="41" actId="2696"/>
+        <pc:sldMkLst>
+          <pc:docMk/>
+          <pc:sldMk cId="1613427096" sldId="379"/>
+        </pc:sldMkLst>
+      </pc:sldChg>
+      <pc:sldChg chg="modSp add">
+        <pc:chgData name="Jeong SangWoo" userId="8b3882065fa5c9e6" providerId="LiveId" clId="{CBAE06D3-3B81-449F-A7F3-FAD05C0BB75D}" dt="2018-05-27T10:03:10.275" v="217" actId="122"/>
+        <pc:sldMkLst>
+          <pc:docMk/>
+          <pc:sldMk cId="3544114982" sldId="379"/>
+        </pc:sldMkLst>
+        <pc:spChg chg="mod">
+          <ac:chgData name="Jeong SangWoo" userId="8b3882065fa5c9e6" providerId="LiveId" clId="{CBAE06D3-3B81-449F-A7F3-FAD05C0BB75D}" dt="2018-05-27T10:03:10.275" v="217" actId="122"/>
+          <ac:spMkLst>
+            <pc:docMk/>
+            <pc:sldMk cId="3544114982" sldId="379"/>
+            <ac:spMk id="4" creationId="{EB0EBC6B-012A-4ACA-8760-6CC34C9635E0}"/>
+          </ac:spMkLst>
+        </pc:spChg>
+      </pc:sldChg>
+      <pc:sldChg chg="addSp modSp add">
+        <pc:chgData name="Jeong SangWoo" userId="8b3882065fa5c9e6" providerId="LiveId" clId="{CBAE06D3-3B81-449F-A7F3-FAD05C0BB75D}" dt="2018-05-27T10:04:11.810" v="219" actId="1076"/>
+        <pc:sldMkLst>
+          <pc:docMk/>
+          <pc:sldMk cId="459164807" sldId="380"/>
+        </pc:sldMkLst>
+        <pc:picChg chg="add mod">
+          <ac:chgData name="Jeong SangWoo" userId="8b3882065fa5c9e6" providerId="LiveId" clId="{CBAE06D3-3B81-449F-A7F3-FAD05C0BB75D}" dt="2018-05-27T10:04:11.810" v="219" actId="1076"/>
+          <ac:picMkLst>
+            <pc:docMk/>
+            <pc:sldMk cId="459164807" sldId="380"/>
+            <ac:picMk id="2" creationId="{551EC926-2B8E-4015-A003-89BDB6AF112B}"/>
+          </ac:picMkLst>
+        </pc:picChg>
+      </pc:sldChg>
+      <pc:sldChg chg="del">
+        <pc:chgData name="Jeong SangWoo" userId="8b3882065fa5c9e6" providerId="LiveId" clId="{CBAE06D3-3B81-449F-A7F3-FAD05C0BB75D}" dt="2018-05-27T09:50:45.108" v="42" actId="2696"/>
+        <pc:sldMkLst>
+          <pc:docMk/>
+          <pc:sldMk cId="859655405" sldId="380"/>
+        </pc:sldMkLst>
+      </pc:sldChg>
+      <pc:sldChg chg="del">
+        <pc:chgData name="Jeong SangWoo" userId="8b3882065fa5c9e6" providerId="LiveId" clId="{CBAE06D3-3B81-449F-A7F3-FAD05C0BB75D}" dt="2018-05-27T09:50:45.132" v="44" actId="2696"/>
+        <pc:sldMkLst>
+          <pc:docMk/>
+          <pc:sldMk cId="486618669" sldId="381"/>
+        </pc:sldMkLst>
+      </pc:sldChg>
+      <pc:sldChg chg="addSp modSp add">
+        <pc:chgData name="Jeong SangWoo" userId="8b3882065fa5c9e6" providerId="LiveId" clId="{CBAE06D3-3B81-449F-A7F3-FAD05C0BB75D}" dt="2018-05-27T10:06:58.505" v="259" actId="20577"/>
+        <pc:sldMkLst>
+          <pc:docMk/>
+          <pc:sldMk cId="4053553878" sldId="381"/>
+        </pc:sldMkLst>
+        <pc:spChg chg="mod">
+          <ac:chgData name="Jeong SangWoo" userId="8b3882065fa5c9e6" providerId="LiveId" clId="{CBAE06D3-3B81-449F-A7F3-FAD05C0BB75D}" dt="2018-05-27T10:04:31.664" v="226" actId="20577"/>
+          <ac:spMkLst>
+            <pc:docMk/>
+            <pc:sldMk cId="4053553878" sldId="381"/>
+            <ac:spMk id="4" creationId="{EB0EBC6B-012A-4ACA-8760-6CC34C9635E0}"/>
+          </ac:spMkLst>
+        </pc:spChg>
+        <pc:graphicFrameChg chg="add modGraphic">
+          <ac:chgData name="Jeong SangWoo" userId="8b3882065fa5c9e6" providerId="LiveId" clId="{CBAE06D3-3B81-449F-A7F3-FAD05C0BB75D}" dt="2018-05-27T10:06:58.505" v="259" actId="20577"/>
+          <ac:graphicFrameMkLst>
+            <pc:docMk/>
+            <pc:sldMk cId="4053553878" sldId="381"/>
+            <ac:graphicFrameMk id="3" creationId="{7B226D33-72C0-43C3-933A-6784C48F14BC}"/>
+          </ac:graphicFrameMkLst>
+        </pc:graphicFrameChg>
+      </pc:sldChg>
+      <pc:sldChg chg="del">
+        <pc:chgData name="Jeong SangWoo" userId="8b3882065fa5c9e6" providerId="LiveId" clId="{CBAE06D3-3B81-449F-A7F3-FAD05C0BB75D}" dt="2018-05-27T09:50:45.118" v="43" actId="2696"/>
+        <pc:sldMkLst>
+          <pc:docMk/>
+          <pc:sldMk cId="478563443" sldId="382"/>
+        </pc:sldMkLst>
+      </pc:sldChg>
+      <pc:sldChg chg="modSp add">
+        <pc:chgData name="Jeong SangWoo" userId="8b3882065fa5c9e6" providerId="LiveId" clId="{CBAE06D3-3B81-449F-A7F3-FAD05C0BB75D}" dt="2018-05-27T10:09:50.992" v="294" actId="2696"/>
+        <pc:sldMkLst>
+          <pc:docMk/>
+          <pc:sldMk cId="2794658932" sldId="382"/>
+        </pc:sldMkLst>
+        <pc:spChg chg="mod">
+          <ac:chgData name="Jeong SangWoo" userId="8b3882065fa5c9e6" providerId="LiveId" clId="{CBAE06D3-3B81-449F-A7F3-FAD05C0BB75D}" dt="2018-05-27T10:09:50.992" v="294" actId="2696"/>
+          <ac:spMkLst>
+            <pc:docMk/>
+            <pc:sldMk cId="2794658932" sldId="382"/>
+            <ac:spMk id="4" creationId="{EB0EBC6B-012A-4ACA-8760-6CC34C9635E0}"/>
+          </ac:spMkLst>
+        </pc:spChg>
+      </pc:sldChg>
+      <pc:sldChg chg="addSp add">
+        <pc:chgData name="Jeong SangWoo" userId="8b3882065fa5c9e6" providerId="LiveId" clId="{CBAE06D3-3B81-449F-A7F3-FAD05C0BB75D}" dt="2018-05-27T10:10:05.382" v="295" actId="2696"/>
+        <pc:sldMkLst>
+          <pc:docMk/>
+          <pc:sldMk cId="3647005457" sldId="383"/>
+        </pc:sldMkLst>
+        <pc:picChg chg="add">
+          <ac:chgData name="Jeong SangWoo" userId="8b3882065fa5c9e6" providerId="LiveId" clId="{CBAE06D3-3B81-449F-A7F3-FAD05C0BB75D}" dt="2018-05-27T10:10:05.382" v="295" actId="2696"/>
+          <ac:picMkLst>
+            <pc:docMk/>
+            <pc:sldMk cId="3647005457" sldId="383"/>
+            <ac:picMk id="2" creationId="{94A30234-8284-40C9-BEC4-92DAA7D97796}"/>
+          </ac:picMkLst>
+        </pc:picChg>
+      </pc:sldChg>
+      <pc:sldChg chg="del">
+        <pc:chgData name="Jeong SangWoo" userId="8b3882065fa5c9e6" providerId="LiveId" clId="{CBAE06D3-3B81-449F-A7F3-FAD05C0BB75D}" dt="2018-05-27T09:50:45.147" v="45" actId="2696"/>
+        <pc:sldMkLst>
+          <pc:docMk/>
+          <pc:sldMk cId="3862583093" sldId="383"/>
+        </pc:sldMkLst>
+      </pc:sldChg>
+      <pc:sldChg chg="addSp modSp add">
+        <pc:chgData name="Jeong SangWoo" userId="8b3882065fa5c9e6" providerId="LiveId" clId="{CBAE06D3-3B81-449F-A7F3-FAD05C0BB75D}" dt="2018-05-27T10:12:13.971" v="401" actId="20577"/>
+        <pc:sldMkLst>
+          <pc:docMk/>
+          <pc:sldMk cId="1921309914" sldId="384"/>
+        </pc:sldMkLst>
+        <pc:spChg chg="mod">
+          <ac:chgData name="Jeong SangWoo" userId="8b3882065fa5c9e6" providerId="LiveId" clId="{CBAE06D3-3B81-449F-A7F3-FAD05C0BB75D}" dt="2018-05-27T10:10:22.541" v="302" actId="20577"/>
+          <ac:spMkLst>
+            <pc:docMk/>
+            <pc:sldMk cId="1921309914" sldId="384"/>
+            <ac:spMk id="4" creationId="{EB0EBC6B-012A-4ACA-8760-6CC34C9635E0}"/>
+          </ac:spMkLst>
+        </pc:spChg>
+        <pc:graphicFrameChg chg="add mod modGraphic">
+          <ac:chgData name="Jeong SangWoo" userId="8b3882065fa5c9e6" providerId="LiveId" clId="{CBAE06D3-3B81-449F-A7F3-FAD05C0BB75D}" dt="2018-05-27T10:12:13.971" v="401" actId="20577"/>
+          <ac:graphicFrameMkLst>
+            <pc:docMk/>
+            <pc:sldMk cId="1921309914" sldId="384"/>
+            <ac:graphicFrameMk id="3" creationId="{AA297D23-2656-43E6-948D-530B44AFF3AD}"/>
+          </ac:graphicFrameMkLst>
+        </pc:graphicFrameChg>
+      </pc:sldChg>
+      <pc:sldChg chg="del">
+        <pc:chgData name="Jeong SangWoo" userId="8b3882065fa5c9e6" providerId="LiveId" clId="{CBAE06D3-3B81-449F-A7F3-FAD05C0BB75D}" dt="2018-05-27T09:50:45.154" v="46" actId="2696"/>
+        <pc:sldMkLst>
+          <pc:docMk/>
+          <pc:sldMk cId="3256850263" sldId="384"/>
+        </pc:sldMkLst>
+      </pc:sldChg>
+      <pc:sldChg chg="del">
+        <pc:chgData name="Jeong SangWoo" userId="8b3882065fa5c9e6" providerId="LiveId" clId="{CBAE06D3-3B81-449F-A7F3-FAD05C0BB75D}" dt="2018-05-27T09:50:35.189" v="35" actId="2696"/>
+        <pc:sldMkLst>
+          <pc:docMk/>
+          <pc:sldMk cId="2809608429" sldId="385"/>
+        </pc:sldMkLst>
+      </pc:sldChg>
+      <pc:sldChg chg="add del">
+        <pc:chgData name="Jeong SangWoo" userId="8b3882065fa5c9e6" providerId="LiveId" clId="{CBAE06D3-3B81-449F-A7F3-FAD05C0BB75D}" dt="2018-05-27T10:14:07.291" v="403" actId="2696"/>
+        <pc:sldMkLst>
+          <pc:docMk/>
+          <pc:sldMk cId="3240517434" sldId="385"/>
+        </pc:sldMkLst>
+      </pc:sldChg>
+      <pc:sldChg chg="del">
+        <pc:chgData name="Jeong SangWoo" userId="8b3882065fa5c9e6" providerId="LiveId" clId="{CBAE06D3-3B81-449F-A7F3-FAD05C0BB75D}" dt="2018-05-27T09:50:35.207" v="36" actId="2696"/>
+        <pc:sldMkLst>
+          <pc:docMk/>
+          <pc:sldMk cId="1608468357" sldId="386"/>
+        </pc:sldMkLst>
+      </pc:sldChg>
+      <pc:sldChg chg="add del">
+        <pc:chgData name="Jeong SangWoo" userId="8b3882065fa5c9e6" providerId="LiveId" clId="{CBAE06D3-3B81-449F-A7F3-FAD05C0BB75D}" dt="2018-05-27T10:14:07.290" v="402" actId="2696"/>
+        <pc:sldMkLst>
+          <pc:docMk/>
+          <pc:sldMk cId="2063371977" sldId="386"/>
+        </pc:sldMkLst>
+      </pc:sldChg>
+      <pc:sldChg chg="del">
+        <pc:chgData name="Jeong SangWoo" userId="8b3882065fa5c9e6" providerId="LiveId" clId="{CBAE06D3-3B81-449F-A7F3-FAD05C0BB75D}" dt="2018-05-27T09:50:35.222" v="37" actId="2696"/>
+        <pc:sldMkLst>
+          <pc:docMk/>
+          <pc:sldMk cId="928948610" sldId="387"/>
+        </pc:sldMkLst>
+      </pc:sldChg>
+      <pc:sldChg chg="del">
+        <pc:chgData name="Jeong SangWoo" userId="8b3882065fa5c9e6" providerId="LiveId" clId="{CBAE06D3-3B81-449F-A7F3-FAD05C0BB75D}" dt="2018-05-27T09:50:35.255" v="40" actId="2696"/>
+        <pc:sldMkLst>
+          <pc:docMk/>
+          <pc:sldMk cId="2280014155" sldId="388"/>
+        </pc:sldMkLst>
+      </pc:sldChg>
+      <pc:sldChg chg="del">
+        <pc:chgData name="Jeong SangWoo" userId="8b3882065fa5c9e6" providerId="LiveId" clId="{CBAE06D3-3B81-449F-A7F3-FAD05C0BB75D}" dt="2018-05-27T09:50:35.233" v="38" actId="2696"/>
+        <pc:sldMkLst>
+          <pc:docMk/>
+          <pc:sldMk cId="1669710602" sldId="389"/>
+        </pc:sldMkLst>
+      </pc:sldChg>
+      <pc:sldChg chg="del">
+        <pc:chgData name="Jeong SangWoo" userId="8b3882065fa5c9e6" providerId="LiveId" clId="{CBAE06D3-3B81-449F-A7F3-FAD05C0BB75D}" dt="2018-05-27T09:50:35.248" v="39" actId="2696"/>
+        <pc:sldMkLst>
+          <pc:docMk/>
+          <pc:sldMk cId="68581250" sldId="390"/>
+        </pc:sldMkLst>
+      </pc:sldChg>
+    </pc:docChg>
+  </pc:docChgLst>
+  <pc:docChgLst>
+    <pc:chgData name="Jeong SangWoo" userId="8b3882065fa5c9e6" providerId="LiveId" clId="{3A39EEAF-673A-4F0F-9A74-0C6B9AF50125}"/>
+    <pc:docChg chg="undo custSel addSld delSld modSld sldOrd">
+      <pc:chgData name="Jeong SangWoo" userId="8b3882065fa5c9e6" providerId="LiveId" clId="{3A39EEAF-673A-4F0F-9A74-0C6B9AF50125}" dt="2018-04-29T06:44:25.995" v="2661"/>
+      <pc:docMkLst>
+        <pc:docMk/>
+      </pc:docMkLst>
+      <pc:sldChg chg="modTransition">
+        <pc:chgData name="Jeong SangWoo" userId="8b3882065fa5c9e6" providerId="LiveId" clId="{3A39EEAF-673A-4F0F-9A74-0C6B9AF50125}" dt="2018-04-29T05:55:53.975" v="1677"/>
+        <pc:sldMkLst>
+          <pc:docMk/>
+          <pc:sldMk cId="3655051314" sldId="256"/>
+        </pc:sldMkLst>
+      </pc:sldChg>
+      <pc:sldChg chg="modTransition">
+        <pc:chgData name="Jeong SangWoo" userId="8b3882065fa5c9e6" providerId="LiveId" clId="{3A39EEAF-673A-4F0F-9A74-0C6B9AF50125}" dt="2018-04-29T05:55:53.975" v="1677"/>
+        <pc:sldMkLst>
+          <pc:docMk/>
+          <pc:sldMk cId="1746186059" sldId="260"/>
+        </pc:sldMkLst>
+      </pc:sldChg>
+    </pc:docChg>
+  </pc:docChgLst>
+  <pc:docChgLst>
     <pc:chgData name="Jeong SangWoo" userId="8b3882065fa5c9e6" providerId="LiveId" clId="{C6948998-872D-4478-91A8-92141DC3D95E}"/>
     <pc:docChg chg="undo custSel delSld modSld modMainMaster">
       <pc:chgData name="Jeong SangWoo" userId="8b3882065fa5c9e6" providerId="LiveId" clId="{C6948998-872D-4478-91A8-92141DC3D95E}" dt="2018-04-26T07:31:53.689" v="521" actId="20577"/>
@@ -317,6 +864,179 @@
           </pc:spChg>
         </pc:sldLayoutChg>
       </pc:sldMasterChg>
+    </pc:docChg>
+  </pc:docChgLst>
+  <pc:docChgLst>
+    <pc:chgData name="Jeong SangWoo" userId="8b3882065fa5c9e6" providerId="LiveId" clId="{30F86056-4561-4F85-80D8-2B9537299174}"/>
+    <pc:docChg chg="undo custSel addSld delSld modSld">
+      <pc:chgData name="Jeong SangWoo" userId="8b3882065fa5c9e6" providerId="LiveId" clId="{30F86056-4561-4F85-80D8-2B9537299174}" dt="2018-05-12T08:00:07.890" v="1445"/>
+      <pc:docMkLst>
+        <pc:docMk/>
+      </pc:docMkLst>
+      <pc:sldChg chg="modSp">
+        <pc:chgData name="Jeong SangWoo" userId="8b3882065fa5c9e6" providerId="LiveId" clId="{30F86056-4561-4F85-80D8-2B9537299174}" dt="2018-05-12T05:42:48.390" v="207" actId="20577"/>
+        <pc:sldMkLst>
+          <pc:docMk/>
+          <pc:sldMk cId="3655051314" sldId="256"/>
+        </pc:sldMkLst>
+        <pc:spChg chg="mod">
+          <ac:chgData name="Jeong SangWoo" userId="8b3882065fa5c9e6" providerId="LiveId" clId="{30F86056-4561-4F85-80D8-2B9537299174}" dt="2018-05-12T05:42:48.390" v="207" actId="20577"/>
+          <ac:spMkLst>
+            <pc:docMk/>
+            <pc:sldMk cId="3655051314" sldId="256"/>
+            <ac:spMk id="3" creationId="{DE6C901A-D1F1-4F84-82A0-6259DA1FA2B3}"/>
+          </ac:spMkLst>
+        </pc:spChg>
+      </pc:sldChg>
+      <pc:sldChg chg="addSp delSp modSp add">
+        <pc:chgData name="Jeong SangWoo" userId="8b3882065fa5c9e6" providerId="LiveId" clId="{30F86056-4561-4F85-80D8-2B9537299174}" dt="2018-05-12T07:38:39.017" v="953"/>
+        <pc:sldMkLst>
+          <pc:docMk/>
+          <pc:sldMk cId="121322230" sldId="375"/>
+        </pc:sldMkLst>
+        <pc:spChg chg="mod">
+          <ac:chgData name="Jeong SangWoo" userId="8b3882065fa5c9e6" providerId="LiveId" clId="{30F86056-4561-4F85-80D8-2B9537299174}" dt="2018-05-12T05:53:06.328" v="393" actId="20577"/>
+          <ac:spMkLst>
+            <pc:docMk/>
+            <pc:sldMk cId="121322230" sldId="375"/>
+            <ac:spMk id="3" creationId="{76DEDF3D-AD3E-4C60-A62E-779C9266CAD4}"/>
+          </ac:spMkLst>
+        </pc:spChg>
+        <pc:spChg chg="add del mod">
+          <ac:chgData name="Jeong SangWoo" userId="8b3882065fa5c9e6" providerId="LiveId" clId="{30F86056-4561-4F85-80D8-2B9537299174}" dt="2018-05-12T07:33:54.744" v="562"/>
+          <ac:spMkLst>
+            <pc:docMk/>
+            <pc:sldMk cId="121322230" sldId="375"/>
+            <ac:spMk id="5" creationId="{AEA421EB-CA79-4829-8E24-13F707363D89}"/>
+          </ac:spMkLst>
+        </pc:spChg>
+        <pc:spChg chg="mod">
+          <ac:chgData name="Jeong SangWoo" userId="8b3882065fa5c9e6" providerId="LiveId" clId="{30F86056-4561-4F85-80D8-2B9537299174}" dt="2018-05-12T07:38:39.017" v="953"/>
+          <ac:spMkLst>
+            <pc:docMk/>
+            <pc:sldMk cId="121322230" sldId="375"/>
+            <ac:spMk id="11" creationId="{AC22DCD9-5B4C-4536-93E8-1FF813C69FF0}"/>
+          </ac:spMkLst>
+        </pc:spChg>
+        <pc:picChg chg="del">
+          <ac:chgData name="Jeong SangWoo" userId="8b3882065fa5c9e6" providerId="LiveId" clId="{30F86056-4561-4F85-80D8-2B9537299174}" dt="2018-05-12T05:46:28.957" v="313" actId="478"/>
+          <ac:picMkLst>
+            <pc:docMk/>
+            <pc:sldMk cId="121322230" sldId="375"/>
+            <ac:picMk id="2" creationId="{70B1EB07-5F48-4333-BAE5-6B336C8EDB16}"/>
+          </ac:picMkLst>
+        </pc:picChg>
+        <pc:picChg chg="del">
+          <ac:chgData name="Jeong SangWoo" userId="8b3882065fa5c9e6" providerId="LiveId" clId="{30F86056-4561-4F85-80D8-2B9537299174}" dt="2018-05-12T05:46:10.036" v="291" actId="478"/>
+          <ac:picMkLst>
+            <pc:docMk/>
+            <pc:sldMk cId="121322230" sldId="375"/>
+            <ac:picMk id="4" creationId="{59019C09-98C6-49C4-9364-ADB911569F09}"/>
+          </ac:picMkLst>
+        </pc:picChg>
+        <pc:picChg chg="add mod">
+          <ac:chgData name="Jeong SangWoo" userId="8b3882065fa5c9e6" providerId="LiveId" clId="{30F86056-4561-4F85-80D8-2B9537299174}" dt="2018-05-12T05:46:22.751" v="294" actId="1076"/>
+          <ac:picMkLst>
+            <pc:docMk/>
+            <pc:sldMk cId="121322230" sldId="375"/>
+            <ac:picMk id="6" creationId="{F0781856-2FF9-4436-85C1-23D415B7D817}"/>
+          </ac:picMkLst>
+        </pc:picChg>
+      </pc:sldChg>
+    </pc:docChg>
+  </pc:docChgLst>
+  <pc:docChgLst>
+    <pc:chgData name="Jeong SangWoo" userId="8b3882065fa5c9e6" providerId="LiveId" clId="{C1AC0F52-5356-4E5E-A33B-7BBA7A5173E9}"/>
+    <pc:docChg chg="undo custSel addSld delSld modSld">
+      <pc:chgData name="Jeong SangWoo" userId="8b3882065fa5c9e6" providerId="LiveId" clId="{C1AC0F52-5356-4E5E-A33B-7BBA7A5173E9}" dt="2018-05-21T04:31:10.286" v="4457" actId="207"/>
+      <pc:docMkLst>
+        <pc:docMk/>
+      </pc:docMkLst>
+      <pc:sldChg chg="modSp">
+        <pc:chgData name="Jeong SangWoo" userId="8b3882065fa5c9e6" providerId="LiveId" clId="{C1AC0F52-5356-4E5E-A33B-7BBA7A5173E9}" dt="2018-05-21T03:57:32.491" v="1557" actId="20577"/>
+        <pc:sldMkLst>
+          <pc:docMk/>
+          <pc:sldMk cId="3655051314" sldId="256"/>
+        </pc:sldMkLst>
+        <pc:spChg chg="mod">
+          <ac:chgData name="Jeong SangWoo" userId="8b3882065fa5c9e6" providerId="LiveId" clId="{C1AC0F52-5356-4E5E-A33B-7BBA7A5173E9}" dt="2018-05-21T03:57:32.491" v="1557" actId="20577"/>
+          <ac:spMkLst>
+            <pc:docMk/>
+            <pc:sldMk cId="3655051314" sldId="256"/>
+            <ac:spMk id="3" creationId="{DE6C901A-D1F1-4F84-82A0-6259DA1FA2B3}"/>
+          </ac:spMkLst>
+        </pc:spChg>
+      </pc:sldChg>
+      <pc:sldChg chg="addSp delSp modSp">
+        <pc:chgData name="Jeong SangWoo" userId="8b3882065fa5c9e6" providerId="LiveId" clId="{C1AC0F52-5356-4E5E-A33B-7BBA7A5173E9}" dt="2018-05-21T03:16:55.297" v="288" actId="207"/>
+        <pc:sldMkLst>
+          <pc:docMk/>
+          <pc:sldMk cId="121322230" sldId="375"/>
+        </pc:sldMkLst>
+        <pc:spChg chg="mod">
+          <ac:chgData name="Jeong SangWoo" userId="8b3882065fa5c9e6" providerId="LiveId" clId="{C1AC0F52-5356-4E5E-A33B-7BBA7A5173E9}" dt="2018-05-21T03:16:05.939" v="130" actId="20577"/>
+          <ac:spMkLst>
+            <pc:docMk/>
+            <pc:sldMk cId="121322230" sldId="375"/>
+            <ac:spMk id="3" creationId="{76DEDF3D-AD3E-4C60-A62E-779C9266CAD4}"/>
+          </ac:spMkLst>
+        </pc:spChg>
+        <pc:spChg chg="mod">
+          <ac:chgData name="Jeong SangWoo" userId="8b3882065fa5c9e6" providerId="LiveId" clId="{C1AC0F52-5356-4E5E-A33B-7BBA7A5173E9}" dt="2018-05-21T03:16:55.297" v="288" actId="207"/>
+          <ac:spMkLst>
+            <pc:docMk/>
+            <pc:sldMk cId="121322230" sldId="375"/>
+            <ac:spMk id="11" creationId="{AC22DCD9-5B4C-4536-93E8-1FF813C69FF0}"/>
+          </ac:spMkLst>
+        </pc:spChg>
+        <pc:picChg chg="add mod">
+          <ac:chgData name="Jeong SangWoo" userId="8b3882065fa5c9e6" providerId="LiveId" clId="{C1AC0F52-5356-4E5E-A33B-7BBA7A5173E9}" dt="2018-05-21T03:15:51.095" v="101" actId="1076"/>
+          <ac:picMkLst>
+            <pc:docMk/>
+            <pc:sldMk cId="121322230" sldId="375"/>
+            <ac:picMk id="5" creationId="{2FB3B230-3C40-4D6C-B7F3-B0EC848C8276}"/>
+          </ac:picMkLst>
+        </pc:picChg>
+        <pc:picChg chg="del">
+          <ac:chgData name="Jeong SangWoo" userId="8b3882065fa5c9e6" providerId="LiveId" clId="{C1AC0F52-5356-4E5E-A33B-7BBA7A5173E9}" dt="2018-05-21T03:15:48.563" v="100" actId="478"/>
+          <ac:picMkLst>
+            <pc:docMk/>
+            <pc:sldMk cId="121322230" sldId="375"/>
+            <ac:picMk id="6" creationId="{F0781856-2FF9-4436-85C1-23D415B7D817}"/>
+          </ac:picMkLst>
+        </pc:picChg>
+      </pc:sldChg>
+    </pc:docChg>
+  </pc:docChgLst>
+  <pc:docChgLst>
+    <pc:chgData name="Jeong SangWoo" userId="8b3882065fa5c9e6" providerId="LiveId" clId="{0E483734-3ECC-475D-BC3C-3922CEBCACE7}"/>
+    <pc:docChg chg="undo custSel addSld delSld modSld sldOrd">
+      <pc:chgData name="Jeong SangWoo" userId="8b3882065fa5c9e6" providerId="LiveId" clId="{0E483734-3ECC-475D-BC3C-3922CEBCACE7}" dt="2018-04-30T10:00:26.146" v="3661" actId="20577"/>
+      <pc:docMkLst>
+        <pc:docMk/>
+      </pc:docMkLst>
+      <pc:sldChg chg="modSp modTransition">
+        <pc:chgData name="Jeong SangWoo" userId="8b3882065fa5c9e6" providerId="LiveId" clId="{0E483734-3ECC-475D-BC3C-3922CEBCACE7}" dt="2018-04-30T10:00:26.146" v="3661" actId="20577"/>
+        <pc:sldMkLst>
+          <pc:docMk/>
+          <pc:sldMk cId="3655051314" sldId="256"/>
+        </pc:sldMkLst>
+        <pc:spChg chg="mod">
+          <ac:chgData name="Jeong SangWoo" userId="8b3882065fa5c9e6" providerId="LiveId" clId="{0E483734-3ECC-475D-BC3C-3922CEBCACE7}" dt="2018-04-30T10:00:26.146" v="3661" actId="20577"/>
+          <ac:spMkLst>
+            <pc:docMk/>
+            <pc:sldMk cId="3655051314" sldId="256"/>
+            <ac:spMk id="3" creationId="{DE6C901A-D1F1-4F84-82A0-6259DA1FA2B3}"/>
+          </ac:spMkLst>
+        </pc:spChg>
+      </pc:sldChg>
+      <pc:sldChg chg="modTransition">
+        <pc:chgData name="Jeong SangWoo" userId="8b3882065fa5c9e6" providerId="LiveId" clId="{0E483734-3ECC-475D-BC3C-3922CEBCACE7}" dt="2018-04-30T07:25:40.543" v="3631" actId="20577"/>
+        <pc:sldMkLst>
+          <pc:docMk/>
+          <pc:sldMk cId="1746186059" sldId="260"/>
+        </pc:sldMkLst>
+      </pc:sldChg>
     </pc:docChg>
   </pc:docChgLst>
   <pc:docChgLst>
@@ -1204,725 +1924,6 @@
       </pc:sldMasterChg>
     </pc:docChg>
   </pc:docChgLst>
-  <pc:docChgLst>
-    <pc:chgData name="Jeong SangWoo" userId="8b3882065fa5c9e6" providerId="LiveId" clId="{F984A344-9FF2-4F8E-9F43-7D6F6BF7C2C7}"/>
-    <pc:docChg chg="undo custSel addSld delSld modSld sldOrd modMainMaster">
-      <pc:chgData name="Jeong SangWoo" userId="8b3882065fa5c9e6" providerId="LiveId" clId="{F984A344-9FF2-4F8E-9F43-7D6F6BF7C2C7}" dt="2018-04-25T14:15:03.530" v="5818"/>
-      <pc:docMkLst>
-        <pc:docMk/>
-      </pc:docMkLst>
-      <pc:sldChg chg="addSp delSp modSp modTransition">
-        <pc:chgData name="Jeong SangWoo" userId="8b3882065fa5c9e6" providerId="LiveId" clId="{F984A344-9FF2-4F8E-9F43-7D6F6BF7C2C7}" dt="2018-04-22T07:40:07.617" v="5371" actId="20577"/>
-        <pc:sldMkLst>
-          <pc:docMk/>
-          <pc:sldMk cId="3655051314" sldId="256"/>
-        </pc:sldMkLst>
-        <pc:spChg chg="mod">
-          <ac:chgData name="Jeong SangWoo" userId="8b3882065fa5c9e6" providerId="LiveId" clId="{F984A344-9FF2-4F8E-9F43-7D6F6BF7C2C7}" dt="2018-04-22T07:40:07.617" v="5371" actId="20577"/>
-          <ac:spMkLst>
-            <pc:docMk/>
-            <pc:sldMk cId="3655051314" sldId="256"/>
-            <ac:spMk id="3" creationId="{DE6C901A-D1F1-4F84-82A0-6259DA1FA2B3}"/>
-          </ac:spMkLst>
-        </pc:spChg>
-        <pc:picChg chg="add del">
-          <ac:chgData name="Jeong SangWoo" userId="8b3882065fa5c9e6" providerId="LiveId" clId="{F984A344-9FF2-4F8E-9F43-7D6F6BF7C2C7}" dt="2018-04-22T05:21:45.236" v="1154" actId="20577"/>
-          <ac:picMkLst>
-            <pc:docMk/>
-            <pc:sldMk cId="3655051314" sldId="256"/>
-            <ac:picMk id="5" creationId="{15FB8EDB-A683-4BB8-A620-4D687D2A8982}"/>
-          </ac:picMkLst>
-        </pc:picChg>
-        <pc:picChg chg="add del">
-          <ac:chgData name="Jeong SangWoo" userId="8b3882065fa5c9e6" providerId="LiveId" clId="{F984A344-9FF2-4F8E-9F43-7D6F6BF7C2C7}" dt="2018-04-22T06:42:48.885" v="3199" actId="478"/>
-          <ac:picMkLst>
-            <pc:docMk/>
-            <pc:sldMk cId="3655051314" sldId="256"/>
-            <ac:picMk id="6" creationId="{3DD3109C-8245-4AF1-A8CC-0B4C1F62A7CE}"/>
-          </ac:picMkLst>
-        </pc:picChg>
-        <pc:picChg chg="add del">
-          <ac:chgData name="Jeong SangWoo" userId="8b3882065fa5c9e6" providerId="LiveId" clId="{F984A344-9FF2-4F8E-9F43-7D6F6BF7C2C7}" dt="2018-04-22T06:15:31.312" v="2242" actId="20577"/>
-          <ac:picMkLst>
-            <pc:docMk/>
-            <pc:sldMk cId="3655051314" sldId="256"/>
-            <ac:picMk id="7" creationId="{FB095575-C22A-47F7-9B6D-E1782BF7E7F2}"/>
-          </ac:picMkLst>
-        </pc:picChg>
-        <pc:picChg chg="add del">
-          <ac:chgData name="Jeong SangWoo" userId="8b3882065fa5c9e6" providerId="LiveId" clId="{F984A344-9FF2-4F8E-9F43-7D6F6BF7C2C7}" dt="2018-04-22T05:44:57.129" v="1475" actId="20577"/>
-          <ac:picMkLst>
-            <pc:docMk/>
-            <pc:sldMk cId="3655051314" sldId="256"/>
-            <ac:picMk id="8" creationId="{712E2150-CD2E-4857-9AB9-8F10FE78AB4E}"/>
-          </ac:picMkLst>
-        </pc:picChg>
-        <pc:picChg chg="add del">
-          <ac:chgData name="Jeong SangWoo" userId="8b3882065fa5c9e6" providerId="LiveId" clId="{F984A344-9FF2-4F8E-9F43-7D6F6BF7C2C7}" dt="2018-04-22T05:23:49.674" v="1210" actId="20577"/>
-          <ac:picMkLst>
-            <pc:docMk/>
-            <pc:sldMk cId="3655051314" sldId="256"/>
-            <ac:picMk id="9" creationId="{77239142-D9F8-4189-9C7E-83279B438C28}"/>
-          </ac:picMkLst>
-        </pc:picChg>
-        <pc:picChg chg="add del mod">
-          <ac:chgData name="Jeong SangWoo" userId="8b3882065fa5c9e6" providerId="LiveId" clId="{F984A344-9FF2-4F8E-9F43-7D6F6BF7C2C7}" dt="2018-04-22T06:42:45.799" v="3198" actId="20577"/>
-          <ac:picMkLst>
-            <pc:docMk/>
-            <pc:sldMk cId="3655051314" sldId="256"/>
-            <ac:picMk id="10" creationId="{95FE95E3-375B-4852-BB0E-3AE18B3C834D}"/>
-          </ac:picMkLst>
-        </pc:picChg>
-        <pc:picChg chg="add del">
-          <ac:chgData name="Jeong SangWoo" userId="8b3882065fa5c9e6" providerId="LiveId" clId="{F984A344-9FF2-4F8E-9F43-7D6F6BF7C2C7}" dt="2018-04-22T07:29:10.109" v="5115" actId="20577"/>
-          <ac:picMkLst>
-            <pc:docMk/>
-            <pc:sldMk cId="3655051314" sldId="256"/>
-            <ac:picMk id="11" creationId="{C7D59A15-031A-4742-A56D-05D944E39EE5}"/>
-          </ac:picMkLst>
-        </pc:picChg>
-      </pc:sldChg>
-      <pc:sldChg chg="modTransition">
-        <pc:chgData name="Jeong SangWoo" userId="8b3882065fa5c9e6" providerId="LiveId" clId="{F984A344-9FF2-4F8E-9F43-7D6F6BF7C2C7}" dt="2018-04-22T04:53:01.947" v="156" actId="20577"/>
-        <pc:sldMkLst>
-          <pc:docMk/>
-          <pc:sldMk cId="1746186059" sldId="260"/>
-        </pc:sldMkLst>
-      </pc:sldChg>
-      <pc:sldMasterChg chg="modSldLayout">
-        <pc:chgData name="Jeong SangWoo" userId="8b3882065fa5c9e6" providerId="LiveId" clId="{F984A344-9FF2-4F8E-9F43-7D6F6BF7C2C7}" dt="2018-04-22T07:37:21.470" v="5331" actId="14100"/>
-        <pc:sldMasterMkLst>
-          <pc:docMk/>
-          <pc:sldMasterMk cId="2055134626" sldId="2147483676"/>
-        </pc:sldMasterMkLst>
-        <pc:sldLayoutChg chg="modSp">
-          <pc:chgData name="Jeong SangWoo" userId="8b3882065fa5c9e6" providerId="LiveId" clId="{F984A344-9FF2-4F8E-9F43-7D6F6BF7C2C7}" dt="2018-04-22T07:37:21.470" v="5331" actId="14100"/>
-          <pc:sldLayoutMkLst>
-            <pc:docMk/>
-            <pc:sldMasterMk cId="2055134626" sldId="2147483676"/>
-            <pc:sldLayoutMk cId="251237391" sldId="2147483693"/>
-          </pc:sldLayoutMkLst>
-          <pc:spChg chg="mod">
-            <ac:chgData name="Jeong SangWoo" userId="8b3882065fa5c9e6" providerId="LiveId" clId="{F984A344-9FF2-4F8E-9F43-7D6F6BF7C2C7}" dt="2018-04-22T07:37:21.470" v="5331" actId="14100"/>
-            <ac:spMkLst>
-              <pc:docMk/>
-              <pc:sldMasterMk cId="2055134626" sldId="2147483676"/>
-              <pc:sldLayoutMk cId="251237391" sldId="2147483693"/>
-              <ac:spMk id="3" creationId="{C98E057A-AEE1-4C1C-BFE3-17126FA4FE0B}"/>
-            </ac:spMkLst>
-          </pc:spChg>
-        </pc:sldLayoutChg>
-      </pc:sldMasterChg>
-    </pc:docChg>
-  </pc:docChgLst>
-  <pc:docChgLst>
-    <pc:chgData name="Jeong SangWoo" userId="8b3882065fa5c9e6" providerId="LiveId" clId="{0E483734-3ECC-475D-BC3C-3922CEBCACE7}"/>
-    <pc:docChg chg="undo custSel addSld delSld modSld sldOrd">
-      <pc:chgData name="Jeong SangWoo" userId="8b3882065fa5c9e6" providerId="LiveId" clId="{0E483734-3ECC-475D-BC3C-3922CEBCACE7}" dt="2018-04-30T10:00:26.146" v="3661" actId="20577"/>
-      <pc:docMkLst>
-        <pc:docMk/>
-      </pc:docMkLst>
-      <pc:sldChg chg="modSp modTransition">
-        <pc:chgData name="Jeong SangWoo" userId="8b3882065fa5c9e6" providerId="LiveId" clId="{0E483734-3ECC-475D-BC3C-3922CEBCACE7}" dt="2018-04-30T10:00:26.146" v="3661" actId="20577"/>
-        <pc:sldMkLst>
-          <pc:docMk/>
-          <pc:sldMk cId="3655051314" sldId="256"/>
-        </pc:sldMkLst>
-        <pc:spChg chg="mod">
-          <ac:chgData name="Jeong SangWoo" userId="8b3882065fa5c9e6" providerId="LiveId" clId="{0E483734-3ECC-475D-BC3C-3922CEBCACE7}" dt="2018-04-30T10:00:26.146" v="3661" actId="20577"/>
-          <ac:spMkLst>
-            <pc:docMk/>
-            <pc:sldMk cId="3655051314" sldId="256"/>
-            <ac:spMk id="3" creationId="{DE6C901A-D1F1-4F84-82A0-6259DA1FA2B3}"/>
-          </ac:spMkLst>
-        </pc:spChg>
-      </pc:sldChg>
-      <pc:sldChg chg="modTransition">
-        <pc:chgData name="Jeong SangWoo" userId="8b3882065fa5c9e6" providerId="LiveId" clId="{0E483734-3ECC-475D-BC3C-3922CEBCACE7}" dt="2018-04-30T07:25:40.543" v="3631" actId="20577"/>
-        <pc:sldMkLst>
-          <pc:docMk/>
-          <pc:sldMk cId="1746186059" sldId="260"/>
-        </pc:sldMkLst>
-      </pc:sldChg>
-    </pc:docChg>
-  </pc:docChgLst>
-  <pc:docChgLst>
-    <pc:chgData name="Jeong SangWoo" userId="8b3882065fa5c9e6" providerId="LiveId" clId="{CBAE06D3-3B81-449F-A7F3-FAD05C0BB75D}"/>
-    <pc:docChg chg="undo custSel addSld delSld modSld">
-      <pc:chgData name="Jeong SangWoo" userId="8b3882065fa5c9e6" providerId="LiveId" clId="{CBAE06D3-3B81-449F-A7F3-FAD05C0BB75D}" dt="2018-05-27T10:14:07.291" v="403" actId="2696"/>
-      <pc:docMkLst>
-        <pc:docMk/>
-      </pc:docMkLst>
-      <pc:sldChg chg="modSp">
-        <pc:chgData name="Jeong SangWoo" userId="8b3882065fa5c9e6" providerId="LiveId" clId="{CBAE06D3-3B81-449F-A7F3-FAD05C0BB75D}" dt="2018-05-27T09:50:16.464" v="27"/>
-        <pc:sldMkLst>
-          <pc:docMk/>
-          <pc:sldMk cId="3655051314" sldId="256"/>
-        </pc:sldMkLst>
-        <pc:spChg chg="mod">
-          <ac:chgData name="Jeong SangWoo" userId="8b3882065fa5c9e6" providerId="LiveId" clId="{CBAE06D3-3B81-449F-A7F3-FAD05C0BB75D}" dt="2018-05-27T09:50:04.172" v="9" actId="20577"/>
-          <ac:spMkLst>
-            <pc:docMk/>
-            <pc:sldMk cId="3655051314" sldId="256"/>
-            <ac:spMk id="2" creationId="{87F2F9A8-35A7-4878-8B78-89685E5866F5}"/>
-          </ac:spMkLst>
-        </pc:spChg>
-        <pc:spChg chg="mod">
-          <ac:chgData name="Jeong SangWoo" userId="8b3882065fa5c9e6" providerId="LiveId" clId="{CBAE06D3-3B81-449F-A7F3-FAD05C0BB75D}" dt="2018-05-27T09:50:16.464" v="27"/>
-          <ac:spMkLst>
-            <pc:docMk/>
-            <pc:sldMk cId="3655051314" sldId="256"/>
-            <ac:spMk id="3" creationId="{DE6C901A-D1F1-4F84-82A0-6259DA1FA2B3}"/>
-          </ac:spMkLst>
-        </pc:spChg>
-      </pc:sldChg>
-      <pc:sldChg chg="addSp delSp modSp add del">
-        <pc:chgData name="Jeong SangWoo" userId="8b3882065fa5c9e6" providerId="LiveId" clId="{CBAE06D3-3B81-449F-A7F3-FAD05C0BB75D}" dt="2018-05-27T09:52:07.050" v="47" actId="2696"/>
-        <pc:sldMkLst>
-          <pc:docMk/>
-          <pc:sldMk cId="2828471371" sldId="257"/>
-        </pc:sldMkLst>
-        <pc:grpChg chg="add del mod">
-          <ac:chgData name="Jeong SangWoo" userId="8b3882065fa5c9e6" providerId="LiveId" clId="{CBAE06D3-3B81-449F-A7F3-FAD05C0BB75D}" dt="2018-05-27T09:50:25.332" v="32" actId="478"/>
-          <ac:grpSpMkLst>
-            <pc:docMk/>
-            <pc:sldMk cId="2828471371" sldId="257"/>
-            <ac:grpSpMk id="8" creationId="{A85BE140-0EE9-44DF-B619-0E61E4630013}"/>
-          </ac:grpSpMkLst>
-        </pc:grpChg>
-        <pc:grpChg chg="add del mod">
-          <ac:chgData name="Jeong SangWoo" userId="8b3882065fa5c9e6" providerId="LiveId" clId="{CBAE06D3-3B81-449F-A7F3-FAD05C0BB75D}" dt="2018-05-27T09:50:25.332" v="32" actId="478"/>
-          <ac:grpSpMkLst>
-            <pc:docMk/>
-            <pc:sldMk cId="2828471371" sldId="257"/>
-            <ac:grpSpMk id="9" creationId="{60EF4181-1834-4E09-B6A0-C6E29400622B}"/>
-          </ac:grpSpMkLst>
-        </pc:grpChg>
-      </pc:sldChg>
-      <pc:sldChg chg="del">
-        <pc:chgData name="Jeong SangWoo" userId="8b3882065fa5c9e6" providerId="LiveId" clId="{CBAE06D3-3B81-449F-A7F3-FAD05C0BB75D}" dt="2018-05-27T09:52:08.913" v="48" actId="2696"/>
-        <pc:sldMkLst>
-          <pc:docMk/>
-          <pc:sldMk cId="2747549357" sldId="374"/>
-        </pc:sldMkLst>
-      </pc:sldChg>
-      <pc:sldChg chg="addSp delSp modSp">
-        <pc:chgData name="Jeong SangWoo" userId="8b3882065fa5c9e6" providerId="LiveId" clId="{CBAE06D3-3B81-449F-A7F3-FAD05C0BB75D}" dt="2018-05-27T09:54:39.702" v="101" actId="1076"/>
-        <pc:sldMkLst>
-          <pc:docMk/>
-          <pc:sldMk cId="121322230" sldId="375"/>
-        </pc:sldMkLst>
-        <pc:spChg chg="add del">
-          <ac:chgData name="Jeong SangWoo" userId="8b3882065fa5c9e6" providerId="LiveId" clId="{CBAE06D3-3B81-449F-A7F3-FAD05C0BB75D}" dt="2018-05-27T09:52:46.741" v="83"/>
-          <ac:spMkLst>
-            <pc:docMk/>
-            <pc:sldMk cId="121322230" sldId="375"/>
-            <ac:spMk id="2" creationId="{93E89F17-41B1-42E3-88EA-5BD59B737BED}"/>
-          </ac:spMkLst>
-        </pc:spChg>
-        <pc:spChg chg="mod">
-          <ac:chgData name="Jeong SangWoo" userId="8b3882065fa5c9e6" providerId="LiveId" clId="{CBAE06D3-3B81-449F-A7F3-FAD05C0BB75D}" dt="2018-05-27T09:54:39.702" v="101" actId="1076"/>
-          <ac:spMkLst>
-            <pc:docMk/>
-            <pc:sldMk cId="121322230" sldId="375"/>
-            <ac:spMk id="3" creationId="{76DEDF3D-AD3E-4C60-A62E-779C9266CAD4}"/>
-          </ac:spMkLst>
-        </pc:spChg>
-        <pc:spChg chg="del mod">
-          <ac:chgData name="Jeong SangWoo" userId="8b3882065fa5c9e6" providerId="LiveId" clId="{CBAE06D3-3B81-449F-A7F3-FAD05C0BB75D}" dt="2018-05-27T09:53:25.549" v="92" actId="478"/>
-          <ac:spMkLst>
-            <pc:docMk/>
-            <pc:sldMk cId="121322230" sldId="375"/>
-            <ac:spMk id="11" creationId="{AC22DCD9-5B4C-4536-93E8-1FF813C69FF0}"/>
-          </ac:spMkLst>
-        </pc:spChg>
-        <pc:picChg chg="add del mod">
-          <ac:chgData name="Jeong SangWoo" userId="8b3882065fa5c9e6" providerId="LiveId" clId="{CBAE06D3-3B81-449F-A7F3-FAD05C0BB75D}" dt="2018-05-27T09:54:20.097" v="95"/>
-          <ac:picMkLst>
-            <pc:docMk/>
-            <pc:sldMk cId="121322230" sldId="375"/>
-            <ac:picMk id="4" creationId="{5D71804E-B1DE-4467-8837-C0AC2346E030}"/>
-          </ac:picMkLst>
-        </pc:picChg>
-        <pc:picChg chg="del">
-          <ac:chgData name="Jeong SangWoo" userId="8b3882065fa5c9e6" providerId="LiveId" clId="{CBAE06D3-3B81-449F-A7F3-FAD05C0BB75D}" dt="2018-05-27T09:52:17.409" v="49" actId="478"/>
-          <ac:picMkLst>
-            <pc:docMk/>
-            <pc:sldMk cId="121322230" sldId="375"/>
-            <ac:picMk id="5" creationId="{2FB3B230-3C40-4D6C-B7F3-B0EC848C8276}"/>
-          </ac:picMkLst>
-        </pc:picChg>
-      </pc:sldChg>
-      <pc:sldChg chg="del">
-        <pc:chgData name="Jeong SangWoo" userId="8b3882065fa5c9e6" providerId="LiveId" clId="{CBAE06D3-3B81-449F-A7F3-FAD05C0BB75D}" dt="2018-05-27T09:50:35.171" v="33" actId="2696"/>
-        <pc:sldMkLst>
-          <pc:docMk/>
-          <pc:sldMk cId="1450421919" sldId="376"/>
-        </pc:sldMkLst>
-      </pc:sldChg>
-      <pc:sldChg chg="addSp delSp modSp add">
-        <pc:chgData name="Jeong SangWoo" userId="8b3882065fa5c9e6" providerId="LiveId" clId="{CBAE06D3-3B81-449F-A7F3-FAD05C0BB75D}" dt="2018-05-27T09:54:28.348" v="98"/>
-        <pc:sldMkLst>
-          <pc:docMk/>
-          <pc:sldMk cId="2053696221" sldId="376"/>
-        </pc:sldMkLst>
-        <pc:spChg chg="del">
-          <ac:chgData name="Jeong SangWoo" userId="8b3882065fa5c9e6" providerId="LiveId" clId="{CBAE06D3-3B81-449F-A7F3-FAD05C0BB75D}" dt="2018-05-27T09:54:27.211" v="97" actId="478"/>
-          <ac:spMkLst>
-            <pc:docMk/>
-            <pc:sldMk cId="2053696221" sldId="376"/>
-            <ac:spMk id="3" creationId="{76DEDF3D-AD3E-4C60-A62E-779C9266CAD4}"/>
-          </ac:spMkLst>
-        </pc:spChg>
-        <pc:spChg chg="add mod">
-          <ac:chgData name="Jeong SangWoo" userId="8b3882065fa5c9e6" providerId="LiveId" clId="{CBAE06D3-3B81-449F-A7F3-FAD05C0BB75D}" dt="2018-05-27T09:54:27.211" v="97" actId="478"/>
-          <ac:spMkLst>
-            <pc:docMk/>
-            <pc:sldMk cId="2053696221" sldId="376"/>
-            <ac:spMk id="4" creationId="{EB0EBC6B-012A-4ACA-8760-6CC34C9635E0}"/>
-          </ac:spMkLst>
-        </pc:spChg>
-        <pc:picChg chg="add">
-          <ac:chgData name="Jeong SangWoo" userId="8b3882065fa5c9e6" providerId="LiveId" clId="{CBAE06D3-3B81-449F-A7F3-FAD05C0BB75D}" dt="2018-05-27T09:54:28.348" v="98"/>
-          <ac:picMkLst>
-            <pc:docMk/>
-            <pc:sldMk cId="2053696221" sldId="376"/>
-            <ac:picMk id="5" creationId="{DB154649-6ED9-4EE1-A9C5-E8703DBC38E3}"/>
-          </ac:picMkLst>
-        </pc:picChg>
-      </pc:sldChg>
-      <pc:sldChg chg="addSp delSp modSp add">
-        <pc:chgData name="Jeong SangWoo" userId="8b3882065fa5c9e6" providerId="LiveId" clId="{CBAE06D3-3B81-449F-A7F3-FAD05C0BB75D}" dt="2018-05-27T09:54:59.199" v="105" actId="1076"/>
-        <pc:sldMkLst>
-          <pc:docMk/>
-          <pc:sldMk cId="2394875296" sldId="377"/>
-        </pc:sldMkLst>
-        <pc:picChg chg="add mod">
-          <ac:chgData name="Jeong SangWoo" userId="8b3882065fa5c9e6" providerId="LiveId" clId="{CBAE06D3-3B81-449F-A7F3-FAD05C0BB75D}" dt="2018-05-27T09:54:59.199" v="105" actId="1076"/>
-          <ac:picMkLst>
-            <pc:docMk/>
-            <pc:sldMk cId="2394875296" sldId="377"/>
-            <ac:picMk id="2" creationId="{1B8FF623-91F4-4F70-BB08-6D6E21D6467B}"/>
-          </ac:picMkLst>
-        </pc:picChg>
-        <pc:picChg chg="del">
-          <ac:chgData name="Jeong SangWoo" userId="8b3882065fa5c9e6" providerId="LiveId" clId="{CBAE06D3-3B81-449F-A7F3-FAD05C0BB75D}" dt="2018-05-27T09:54:57.685" v="103" actId="478"/>
-          <ac:picMkLst>
-            <pc:docMk/>
-            <pc:sldMk cId="2394875296" sldId="377"/>
-            <ac:picMk id="5" creationId="{DB154649-6ED9-4EE1-A9C5-E8703DBC38E3}"/>
-          </ac:picMkLst>
-        </pc:picChg>
-      </pc:sldChg>
-      <pc:sldChg chg="del">
-        <pc:chgData name="Jeong SangWoo" userId="8b3882065fa5c9e6" providerId="LiveId" clId="{CBAE06D3-3B81-449F-A7F3-FAD05C0BB75D}" dt="2018-05-27T09:50:35.180" v="34" actId="2696"/>
-        <pc:sldMkLst>
-          <pc:docMk/>
-          <pc:sldMk cId="4046101176" sldId="377"/>
-        </pc:sldMkLst>
-      </pc:sldChg>
-      <pc:sldChg chg="addSp delSp modSp add">
-        <pc:chgData name="Jeong SangWoo" userId="8b3882065fa5c9e6" providerId="LiveId" clId="{CBAE06D3-3B81-449F-A7F3-FAD05C0BB75D}" dt="2018-05-27T09:59:50.872" v="154" actId="121"/>
-        <pc:sldMkLst>
-          <pc:docMk/>
-          <pc:sldMk cId="2092208707" sldId="378"/>
-        </pc:sldMkLst>
-        <pc:spChg chg="mod">
-          <ac:chgData name="Jeong SangWoo" userId="8b3882065fa5c9e6" providerId="LiveId" clId="{CBAE06D3-3B81-449F-A7F3-FAD05C0BB75D}" dt="2018-05-27T09:55:17.752" v="127"/>
-          <ac:spMkLst>
-            <pc:docMk/>
-            <pc:sldMk cId="2092208707" sldId="378"/>
-            <ac:spMk id="4" creationId="{EB0EBC6B-012A-4ACA-8760-6CC34C9635E0}"/>
-          </ac:spMkLst>
-        </pc:spChg>
-        <pc:graphicFrameChg chg="add mod modGraphic">
-          <ac:chgData name="Jeong SangWoo" userId="8b3882065fa5c9e6" providerId="LiveId" clId="{CBAE06D3-3B81-449F-A7F3-FAD05C0BB75D}" dt="2018-05-27T09:59:50.872" v="154" actId="121"/>
-          <ac:graphicFrameMkLst>
-            <pc:docMk/>
-            <pc:sldMk cId="2092208707" sldId="378"/>
-            <ac:graphicFrameMk id="3" creationId="{6B39A3A4-4A6D-4A2D-986B-4159AA46198E}"/>
-          </ac:graphicFrameMkLst>
-        </pc:graphicFrameChg>
-        <pc:picChg chg="del">
-          <ac:chgData name="Jeong SangWoo" userId="8b3882065fa5c9e6" providerId="LiveId" clId="{CBAE06D3-3B81-449F-A7F3-FAD05C0BB75D}" dt="2018-05-27T09:55:02.887" v="107" actId="478"/>
-          <ac:picMkLst>
-            <pc:docMk/>
-            <pc:sldMk cId="2092208707" sldId="378"/>
-            <ac:picMk id="2" creationId="{1B8FF623-91F4-4F70-BB08-6D6E21D6467B}"/>
-          </ac:picMkLst>
-        </pc:picChg>
-      </pc:sldChg>
-      <pc:sldChg chg="del">
-        <pc:chgData name="Jeong SangWoo" userId="8b3882065fa5c9e6" providerId="LiveId" clId="{CBAE06D3-3B81-449F-A7F3-FAD05C0BB75D}" dt="2018-05-27T09:50:45.095" v="41" actId="2696"/>
-        <pc:sldMkLst>
-          <pc:docMk/>
-          <pc:sldMk cId="1613427096" sldId="379"/>
-        </pc:sldMkLst>
-      </pc:sldChg>
-      <pc:sldChg chg="modSp add">
-        <pc:chgData name="Jeong SangWoo" userId="8b3882065fa5c9e6" providerId="LiveId" clId="{CBAE06D3-3B81-449F-A7F3-FAD05C0BB75D}" dt="2018-05-27T10:03:10.275" v="217" actId="122"/>
-        <pc:sldMkLst>
-          <pc:docMk/>
-          <pc:sldMk cId="3544114982" sldId="379"/>
-        </pc:sldMkLst>
-        <pc:spChg chg="mod">
-          <ac:chgData name="Jeong SangWoo" userId="8b3882065fa5c9e6" providerId="LiveId" clId="{CBAE06D3-3B81-449F-A7F3-FAD05C0BB75D}" dt="2018-05-27T10:03:10.275" v="217" actId="122"/>
-          <ac:spMkLst>
-            <pc:docMk/>
-            <pc:sldMk cId="3544114982" sldId="379"/>
-            <ac:spMk id="4" creationId="{EB0EBC6B-012A-4ACA-8760-6CC34C9635E0}"/>
-          </ac:spMkLst>
-        </pc:spChg>
-      </pc:sldChg>
-      <pc:sldChg chg="addSp modSp add">
-        <pc:chgData name="Jeong SangWoo" userId="8b3882065fa5c9e6" providerId="LiveId" clId="{CBAE06D3-3B81-449F-A7F3-FAD05C0BB75D}" dt="2018-05-27T10:04:11.810" v="219" actId="1076"/>
-        <pc:sldMkLst>
-          <pc:docMk/>
-          <pc:sldMk cId="459164807" sldId="380"/>
-        </pc:sldMkLst>
-        <pc:picChg chg="add mod">
-          <ac:chgData name="Jeong SangWoo" userId="8b3882065fa5c9e6" providerId="LiveId" clId="{CBAE06D3-3B81-449F-A7F3-FAD05C0BB75D}" dt="2018-05-27T10:04:11.810" v="219" actId="1076"/>
-          <ac:picMkLst>
-            <pc:docMk/>
-            <pc:sldMk cId="459164807" sldId="380"/>
-            <ac:picMk id="2" creationId="{551EC926-2B8E-4015-A003-89BDB6AF112B}"/>
-          </ac:picMkLst>
-        </pc:picChg>
-      </pc:sldChg>
-      <pc:sldChg chg="del">
-        <pc:chgData name="Jeong SangWoo" userId="8b3882065fa5c9e6" providerId="LiveId" clId="{CBAE06D3-3B81-449F-A7F3-FAD05C0BB75D}" dt="2018-05-27T09:50:45.108" v="42" actId="2696"/>
-        <pc:sldMkLst>
-          <pc:docMk/>
-          <pc:sldMk cId="859655405" sldId="380"/>
-        </pc:sldMkLst>
-      </pc:sldChg>
-      <pc:sldChg chg="del">
-        <pc:chgData name="Jeong SangWoo" userId="8b3882065fa5c9e6" providerId="LiveId" clId="{CBAE06D3-3B81-449F-A7F3-FAD05C0BB75D}" dt="2018-05-27T09:50:45.132" v="44" actId="2696"/>
-        <pc:sldMkLst>
-          <pc:docMk/>
-          <pc:sldMk cId="486618669" sldId="381"/>
-        </pc:sldMkLst>
-      </pc:sldChg>
-      <pc:sldChg chg="addSp modSp add">
-        <pc:chgData name="Jeong SangWoo" userId="8b3882065fa5c9e6" providerId="LiveId" clId="{CBAE06D3-3B81-449F-A7F3-FAD05C0BB75D}" dt="2018-05-27T10:06:58.505" v="259" actId="20577"/>
-        <pc:sldMkLst>
-          <pc:docMk/>
-          <pc:sldMk cId="4053553878" sldId="381"/>
-        </pc:sldMkLst>
-        <pc:spChg chg="mod">
-          <ac:chgData name="Jeong SangWoo" userId="8b3882065fa5c9e6" providerId="LiveId" clId="{CBAE06D3-3B81-449F-A7F3-FAD05C0BB75D}" dt="2018-05-27T10:04:31.664" v="226"/>
-          <ac:spMkLst>
-            <pc:docMk/>
-            <pc:sldMk cId="4053553878" sldId="381"/>
-            <ac:spMk id="4" creationId="{EB0EBC6B-012A-4ACA-8760-6CC34C9635E0}"/>
-          </ac:spMkLst>
-        </pc:spChg>
-        <pc:graphicFrameChg chg="add modGraphic">
-          <ac:chgData name="Jeong SangWoo" userId="8b3882065fa5c9e6" providerId="LiveId" clId="{CBAE06D3-3B81-449F-A7F3-FAD05C0BB75D}" dt="2018-05-27T10:06:58.505" v="259" actId="20577"/>
-          <ac:graphicFrameMkLst>
-            <pc:docMk/>
-            <pc:sldMk cId="4053553878" sldId="381"/>
-            <ac:graphicFrameMk id="3" creationId="{7B226D33-72C0-43C3-933A-6784C48F14BC}"/>
-          </ac:graphicFrameMkLst>
-        </pc:graphicFrameChg>
-      </pc:sldChg>
-      <pc:sldChg chg="del">
-        <pc:chgData name="Jeong SangWoo" userId="8b3882065fa5c9e6" providerId="LiveId" clId="{CBAE06D3-3B81-449F-A7F3-FAD05C0BB75D}" dt="2018-05-27T09:50:45.118" v="43" actId="2696"/>
-        <pc:sldMkLst>
-          <pc:docMk/>
-          <pc:sldMk cId="478563443" sldId="382"/>
-        </pc:sldMkLst>
-      </pc:sldChg>
-      <pc:sldChg chg="modSp add">
-        <pc:chgData name="Jeong SangWoo" userId="8b3882065fa5c9e6" providerId="LiveId" clId="{CBAE06D3-3B81-449F-A7F3-FAD05C0BB75D}" dt="2018-05-27T10:09:50.992" v="294"/>
-        <pc:sldMkLst>
-          <pc:docMk/>
-          <pc:sldMk cId="2794658932" sldId="382"/>
-        </pc:sldMkLst>
-        <pc:spChg chg="mod">
-          <ac:chgData name="Jeong SangWoo" userId="8b3882065fa5c9e6" providerId="LiveId" clId="{CBAE06D3-3B81-449F-A7F3-FAD05C0BB75D}" dt="2018-05-27T10:09:50.992" v="294"/>
-          <ac:spMkLst>
-            <pc:docMk/>
-            <pc:sldMk cId="2794658932" sldId="382"/>
-            <ac:spMk id="4" creationId="{EB0EBC6B-012A-4ACA-8760-6CC34C9635E0}"/>
-          </ac:spMkLst>
-        </pc:spChg>
-      </pc:sldChg>
-      <pc:sldChg chg="addSp add">
-        <pc:chgData name="Jeong SangWoo" userId="8b3882065fa5c9e6" providerId="LiveId" clId="{CBAE06D3-3B81-449F-A7F3-FAD05C0BB75D}" dt="2018-05-27T10:10:05.382" v="295"/>
-        <pc:sldMkLst>
-          <pc:docMk/>
-          <pc:sldMk cId="3647005457" sldId="383"/>
-        </pc:sldMkLst>
-        <pc:picChg chg="add">
-          <ac:chgData name="Jeong SangWoo" userId="8b3882065fa5c9e6" providerId="LiveId" clId="{CBAE06D3-3B81-449F-A7F3-FAD05C0BB75D}" dt="2018-05-27T10:10:05.382" v="295"/>
-          <ac:picMkLst>
-            <pc:docMk/>
-            <pc:sldMk cId="3647005457" sldId="383"/>
-            <ac:picMk id="2" creationId="{94A30234-8284-40C9-BEC4-92DAA7D97796}"/>
-          </ac:picMkLst>
-        </pc:picChg>
-      </pc:sldChg>
-      <pc:sldChg chg="del">
-        <pc:chgData name="Jeong SangWoo" userId="8b3882065fa5c9e6" providerId="LiveId" clId="{CBAE06D3-3B81-449F-A7F3-FAD05C0BB75D}" dt="2018-05-27T09:50:45.147" v="45" actId="2696"/>
-        <pc:sldMkLst>
-          <pc:docMk/>
-          <pc:sldMk cId="3862583093" sldId="383"/>
-        </pc:sldMkLst>
-      </pc:sldChg>
-      <pc:sldChg chg="addSp modSp add">
-        <pc:chgData name="Jeong SangWoo" userId="8b3882065fa5c9e6" providerId="LiveId" clId="{CBAE06D3-3B81-449F-A7F3-FAD05C0BB75D}" dt="2018-05-27T10:12:13.971" v="401" actId="20577"/>
-        <pc:sldMkLst>
-          <pc:docMk/>
-          <pc:sldMk cId="1921309914" sldId="384"/>
-        </pc:sldMkLst>
-        <pc:spChg chg="mod">
-          <ac:chgData name="Jeong SangWoo" userId="8b3882065fa5c9e6" providerId="LiveId" clId="{CBAE06D3-3B81-449F-A7F3-FAD05C0BB75D}" dt="2018-05-27T10:10:22.541" v="302"/>
-          <ac:spMkLst>
-            <pc:docMk/>
-            <pc:sldMk cId="1921309914" sldId="384"/>
-            <ac:spMk id="4" creationId="{EB0EBC6B-012A-4ACA-8760-6CC34C9635E0}"/>
-          </ac:spMkLst>
-        </pc:spChg>
-        <pc:graphicFrameChg chg="add mod modGraphic">
-          <ac:chgData name="Jeong SangWoo" userId="8b3882065fa5c9e6" providerId="LiveId" clId="{CBAE06D3-3B81-449F-A7F3-FAD05C0BB75D}" dt="2018-05-27T10:12:13.971" v="401" actId="20577"/>
-          <ac:graphicFrameMkLst>
-            <pc:docMk/>
-            <pc:sldMk cId="1921309914" sldId="384"/>
-            <ac:graphicFrameMk id="3" creationId="{AA297D23-2656-43E6-948D-530B44AFF3AD}"/>
-          </ac:graphicFrameMkLst>
-        </pc:graphicFrameChg>
-      </pc:sldChg>
-      <pc:sldChg chg="del">
-        <pc:chgData name="Jeong SangWoo" userId="8b3882065fa5c9e6" providerId="LiveId" clId="{CBAE06D3-3B81-449F-A7F3-FAD05C0BB75D}" dt="2018-05-27T09:50:45.154" v="46" actId="2696"/>
-        <pc:sldMkLst>
-          <pc:docMk/>
-          <pc:sldMk cId="3256850263" sldId="384"/>
-        </pc:sldMkLst>
-      </pc:sldChg>
-      <pc:sldChg chg="del">
-        <pc:chgData name="Jeong SangWoo" userId="8b3882065fa5c9e6" providerId="LiveId" clId="{CBAE06D3-3B81-449F-A7F3-FAD05C0BB75D}" dt="2018-05-27T09:50:35.189" v="35" actId="2696"/>
-        <pc:sldMkLst>
-          <pc:docMk/>
-          <pc:sldMk cId="2809608429" sldId="385"/>
-        </pc:sldMkLst>
-      </pc:sldChg>
-      <pc:sldChg chg="add del">
-        <pc:chgData name="Jeong SangWoo" userId="8b3882065fa5c9e6" providerId="LiveId" clId="{CBAE06D3-3B81-449F-A7F3-FAD05C0BB75D}" dt="2018-05-27T10:14:07.291" v="403" actId="2696"/>
-        <pc:sldMkLst>
-          <pc:docMk/>
-          <pc:sldMk cId="3240517434" sldId="385"/>
-        </pc:sldMkLst>
-      </pc:sldChg>
-      <pc:sldChg chg="del">
-        <pc:chgData name="Jeong SangWoo" userId="8b3882065fa5c9e6" providerId="LiveId" clId="{CBAE06D3-3B81-449F-A7F3-FAD05C0BB75D}" dt="2018-05-27T09:50:35.207" v="36" actId="2696"/>
-        <pc:sldMkLst>
-          <pc:docMk/>
-          <pc:sldMk cId="1608468357" sldId="386"/>
-        </pc:sldMkLst>
-      </pc:sldChg>
-      <pc:sldChg chg="add del">
-        <pc:chgData name="Jeong SangWoo" userId="8b3882065fa5c9e6" providerId="LiveId" clId="{CBAE06D3-3B81-449F-A7F3-FAD05C0BB75D}" dt="2018-05-27T10:14:07.290" v="402" actId="2696"/>
-        <pc:sldMkLst>
-          <pc:docMk/>
-          <pc:sldMk cId="2063371977" sldId="386"/>
-        </pc:sldMkLst>
-      </pc:sldChg>
-      <pc:sldChg chg="del">
-        <pc:chgData name="Jeong SangWoo" userId="8b3882065fa5c9e6" providerId="LiveId" clId="{CBAE06D3-3B81-449F-A7F3-FAD05C0BB75D}" dt="2018-05-27T09:50:35.222" v="37" actId="2696"/>
-        <pc:sldMkLst>
-          <pc:docMk/>
-          <pc:sldMk cId="928948610" sldId="387"/>
-        </pc:sldMkLst>
-      </pc:sldChg>
-      <pc:sldChg chg="del">
-        <pc:chgData name="Jeong SangWoo" userId="8b3882065fa5c9e6" providerId="LiveId" clId="{CBAE06D3-3B81-449F-A7F3-FAD05C0BB75D}" dt="2018-05-27T09:50:35.255" v="40" actId="2696"/>
-        <pc:sldMkLst>
-          <pc:docMk/>
-          <pc:sldMk cId="2280014155" sldId="388"/>
-        </pc:sldMkLst>
-      </pc:sldChg>
-      <pc:sldChg chg="del">
-        <pc:chgData name="Jeong SangWoo" userId="8b3882065fa5c9e6" providerId="LiveId" clId="{CBAE06D3-3B81-449F-A7F3-FAD05C0BB75D}" dt="2018-05-27T09:50:35.233" v="38" actId="2696"/>
-        <pc:sldMkLst>
-          <pc:docMk/>
-          <pc:sldMk cId="1669710602" sldId="389"/>
-        </pc:sldMkLst>
-      </pc:sldChg>
-      <pc:sldChg chg="del">
-        <pc:chgData name="Jeong SangWoo" userId="8b3882065fa5c9e6" providerId="LiveId" clId="{CBAE06D3-3B81-449F-A7F3-FAD05C0BB75D}" dt="2018-05-27T09:50:35.248" v="39" actId="2696"/>
-        <pc:sldMkLst>
-          <pc:docMk/>
-          <pc:sldMk cId="68581250" sldId="390"/>
-        </pc:sldMkLst>
-      </pc:sldChg>
-    </pc:docChg>
-  </pc:docChgLst>
-  <pc:docChgLst>
-    <pc:chgData name="Jeong SangWoo" userId="8b3882065fa5c9e6" providerId="LiveId" clId="{C1AC0F52-5356-4E5E-A33B-7BBA7A5173E9}"/>
-    <pc:docChg chg="undo custSel addSld delSld modSld">
-      <pc:chgData name="Jeong SangWoo" userId="8b3882065fa5c9e6" providerId="LiveId" clId="{C1AC0F52-5356-4E5E-A33B-7BBA7A5173E9}" dt="2018-05-21T04:31:10.286" v="4457" actId="207"/>
-      <pc:docMkLst>
-        <pc:docMk/>
-      </pc:docMkLst>
-      <pc:sldChg chg="modSp">
-        <pc:chgData name="Jeong SangWoo" userId="8b3882065fa5c9e6" providerId="LiveId" clId="{C1AC0F52-5356-4E5E-A33B-7BBA7A5173E9}" dt="2018-05-21T03:57:32.491" v="1557" actId="20577"/>
-        <pc:sldMkLst>
-          <pc:docMk/>
-          <pc:sldMk cId="3655051314" sldId="256"/>
-        </pc:sldMkLst>
-        <pc:spChg chg="mod">
-          <ac:chgData name="Jeong SangWoo" userId="8b3882065fa5c9e6" providerId="LiveId" clId="{C1AC0F52-5356-4E5E-A33B-7BBA7A5173E9}" dt="2018-05-21T03:57:32.491" v="1557" actId="20577"/>
-          <ac:spMkLst>
-            <pc:docMk/>
-            <pc:sldMk cId="3655051314" sldId="256"/>
-            <ac:spMk id="3" creationId="{DE6C901A-D1F1-4F84-82A0-6259DA1FA2B3}"/>
-          </ac:spMkLst>
-        </pc:spChg>
-      </pc:sldChg>
-      <pc:sldChg chg="addSp delSp modSp">
-        <pc:chgData name="Jeong SangWoo" userId="8b3882065fa5c9e6" providerId="LiveId" clId="{C1AC0F52-5356-4E5E-A33B-7BBA7A5173E9}" dt="2018-05-21T03:16:55.297" v="288" actId="207"/>
-        <pc:sldMkLst>
-          <pc:docMk/>
-          <pc:sldMk cId="121322230" sldId="375"/>
-        </pc:sldMkLst>
-        <pc:spChg chg="mod">
-          <ac:chgData name="Jeong SangWoo" userId="8b3882065fa5c9e6" providerId="LiveId" clId="{C1AC0F52-5356-4E5E-A33B-7BBA7A5173E9}" dt="2018-05-21T03:16:05.939" v="130" actId="20577"/>
-          <ac:spMkLst>
-            <pc:docMk/>
-            <pc:sldMk cId="121322230" sldId="375"/>
-            <ac:spMk id="3" creationId="{76DEDF3D-AD3E-4C60-A62E-779C9266CAD4}"/>
-          </ac:spMkLst>
-        </pc:spChg>
-        <pc:spChg chg="mod">
-          <ac:chgData name="Jeong SangWoo" userId="8b3882065fa5c9e6" providerId="LiveId" clId="{C1AC0F52-5356-4E5E-A33B-7BBA7A5173E9}" dt="2018-05-21T03:16:55.297" v="288" actId="207"/>
-          <ac:spMkLst>
-            <pc:docMk/>
-            <pc:sldMk cId="121322230" sldId="375"/>
-            <ac:spMk id="11" creationId="{AC22DCD9-5B4C-4536-93E8-1FF813C69FF0}"/>
-          </ac:spMkLst>
-        </pc:spChg>
-        <pc:picChg chg="add mod">
-          <ac:chgData name="Jeong SangWoo" userId="8b3882065fa5c9e6" providerId="LiveId" clId="{C1AC0F52-5356-4E5E-A33B-7BBA7A5173E9}" dt="2018-05-21T03:15:51.095" v="101" actId="1076"/>
-          <ac:picMkLst>
-            <pc:docMk/>
-            <pc:sldMk cId="121322230" sldId="375"/>
-            <ac:picMk id="5" creationId="{2FB3B230-3C40-4D6C-B7F3-B0EC848C8276}"/>
-          </ac:picMkLst>
-        </pc:picChg>
-        <pc:picChg chg="del">
-          <ac:chgData name="Jeong SangWoo" userId="8b3882065fa5c9e6" providerId="LiveId" clId="{C1AC0F52-5356-4E5E-A33B-7BBA7A5173E9}" dt="2018-05-21T03:15:48.563" v="100" actId="478"/>
-          <ac:picMkLst>
-            <pc:docMk/>
-            <pc:sldMk cId="121322230" sldId="375"/>
-            <ac:picMk id="6" creationId="{F0781856-2FF9-4436-85C1-23D415B7D817}"/>
-          </ac:picMkLst>
-        </pc:picChg>
-      </pc:sldChg>
-    </pc:docChg>
-  </pc:docChgLst>
-  <pc:docChgLst>
-    <pc:chgData name="Jeong SangWoo" userId="8b3882065fa5c9e6" providerId="LiveId" clId="{3A39EEAF-673A-4F0F-9A74-0C6B9AF50125}"/>
-    <pc:docChg chg="undo custSel addSld delSld modSld sldOrd">
-      <pc:chgData name="Jeong SangWoo" userId="8b3882065fa5c9e6" providerId="LiveId" clId="{3A39EEAF-673A-4F0F-9A74-0C6B9AF50125}" dt="2018-04-29T06:44:25.995" v="2661"/>
-      <pc:docMkLst>
-        <pc:docMk/>
-      </pc:docMkLst>
-      <pc:sldChg chg="modTransition">
-        <pc:chgData name="Jeong SangWoo" userId="8b3882065fa5c9e6" providerId="LiveId" clId="{3A39EEAF-673A-4F0F-9A74-0C6B9AF50125}" dt="2018-04-29T05:55:53.975" v="1677"/>
-        <pc:sldMkLst>
-          <pc:docMk/>
-          <pc:sldMk cId="3655051314" sldId="256"/>
-        </pc:sldMkLst>
-      </pc:sldChg>
-      <pc:sldChg chg="modTransition">
-        <pc:chgData name="Jeong SangWoo" userId="8b3882065fa5c9e6" providerId="LiveId" clId="{3A39EEAF-673A-4F0F-9A74-0C6B9AF50125}" dt="2018-04-29T05:55:53.975" v="1677"/>
-        <pc:sldMkLst>
-          <pc:docMk/>
-          <pc:sldMk cId="1746186059" sldId="260"/>
-        </pc:sldMkLst>
-      </pc:sldChg>
-    </pc:docChg>
-  </pc:docChgLst>
-  <pc:docChgLst>
-    <pc:chgData name="Jeong SangWoo" userId="8b3882065fa5c9e6" providerId="LiveId" clId="{30F86056-4561-4F85-80D8-2B9537299174}"/>
-    <pc:docChg chg="undo custSel addSld delSld modSld">
-      <pc:chgData name="Jeong SangWoo" userId="8b3882065fa5c9e6" providerId="LiveId" clId="{30F86056-4561-4F85-80D8-2B9537299174}" dt="2018-05-12T08:00:07.890" v="1445"/>
-      <pc:docMkLst>
-        <pc:docMk/>
-      </pc:docMkLst>
-      <pc:sldChg chg="modSp">
-        <pc:chgData name="Jeong SangWoo" userId="8b3882065fa5c9e6" providerId="LiveId" clId="{30F86056-4561-4F85-80D8-2B9537299174}" dt="2018-05-12T05:42:48.390" v="207" actId="20577"/>
-        <pc:sldMkLst>
-          <pc:docMk/>
-          <pc:sldMk cId="3655051314" sldId="256"/>
-        </pc:sldMkLst>
-        <pc:spChg chg="mod">
-          <ac:chgData name="Jeong SangWoo" userId="8b3882065fa5c9e6" providerId="LiveId" clId="{30F86056-4561-4F85-80D8-2B9537299174}" dt="2018-05-12T05:42:48.390" v="207" actId="20577"/>
-          <ac:spMkLst>
-            <pc:docMk/>
-            <pc:sldMk cId="3655051314" sldId="256"/>
-            <ac:spMk id="3" creationId="{DE6C901A-D1F1-4F84-82A0-6259DA1FA2B3}"/>
-          </ac:spMkLst>
-        </pc:spChg>
-      </pc:sldChg>
-      <pc:sldChg chg="addSp delSp modSp add">
-        <pc:chgData name="Jeong SangWoo" userId="8b3882065fa5c9e6" providerId="LiveId" clId="{30F86056-4561-4F85-80D8-2B9537299174}" dt="2018-05-12T07:38:39.017" v="953"/>
-        <pc:sldMkLst>
-          <pc:docMk/>
-          <pc:sldMk cId="121322230" sldId="375"/>
-        </pc:sldMkLst>
-        <pc:spChg chg="mod">
-          <ac:chgData name="Jeong SangWoo" userId="8b3882065fa5c9e6" providerId="LiveId" clId="{30F86056-4561-4F85-80D8-2B9537299174}" dt="2018-05-12T05:53:06.328" v="393" actId="20577"/>
-          <ac:spMkLst>
-            <pc:docMk/>
-            <pc:sldMk cId="121322230" sldId="375"/>
-            <ac:spMk id="3" creationId="{76DEDF3D-AD3E-4C60-A62E-779C9266CAD4}"/>
-          </ac:spMkLst>
-        </pc:spChg>
-        <pc:spChg chg="add del mod">
-          <ac:chgData name="Jeong SangWoo" userId="8b3882065fa5c9e6" providerId="LiveId" clId="{30F86056-4561-4F85-80D8-2B9537299174}" dt="2018-05-12T07:33:54.744" v="562"/>
-          <ac:spMkLst>
-            <pc:docMk/>
-            <pc:sldMk cId="121322230" sldId="375"/>
-            <ac:spMk id="5" creationId="{AEA421EB-CA79-4829-8E24-13F707363D89}"/>
-          </ac:spMkLst>
-        </pc:spChg>
-        <pc:spChg chg="mod">
-          <ac:chgData name="Jeong SangWoo" userId="8b3882065fa5c9e6" providerId="LiveId" clId="{30F86056-4561-4F85-80D8-2B9537299174}" dt="2018-05-12T07:38:39.017" v="953"/>
-          <ac:spMkLst>
-            <pc:docMk/>
-            <pc:sldMk cId="121322230" sldId="375"/>
-            <ac:spMk id="11" creationId="{AC22DCD9-5B4C-4536-93E8-1FF813C69FF0}"/>
-          </ac:spMkLst>
-        </pc:spChg>
-        <pc:picChg chg="del">
-          <ac:chgData name="Jeong SangWoo" userId="8b3882065fa5c9e6" providerId="LiveId" clId="{30F86056-4561-4F85-80D8-2B9537299174}" dt="2018-05-12T05:46:28.957" v="313" actId="478"/>
-          <ac:picMkLst>
-            <pc:docMk/>
-            <pc:sldMk cId="121322230" sldId="375"/>
-            <ac:picMk id="2" creationId="{70B1EB07-5F48-4333-BAE5-6B336C8EDB16}"/>
-          </ac:picMkLst>
-        </pc:picChg>
-        <pc:picChg chg="del">
-          <ac:chgData name="Jeong SangWoo" userId="8b3882065fa5c9e6" providerId="LiveId" clId="{30F86056-4561-4F85-80D8-2B9537299174}" dt="2018-05-12T05:46:10.036" v="291" actId="478"/>
-          <ac:picMkLst>
-            <pc:docMk/>
-            <pc:sldMk cId="121322230" sldId="375"/>
-            <ac:picMk id="4" creationId="{59019C09-98C6-49C4-9364-ADB911569F09}"/>
-          </ac:picMkLst>
-        </pc:picChg>
-        <pc:picChg chg="add mod">
-          <ac:chgData name="Jeong SangWoo" userId="8b3882065fa5c9e6" providerId="LiveId" clId="{30F86056-4561-4F85-80D8-2B9537299174}" dt="2018-05-12T05:46:22.751" v="294" actId="1076"/>
-          <ac:picMkLst>
-            <pc:docMk/>
-            <pc:sldMk cId="121322230" sldId="375"/>
-            <ac:picMk id="6" creationId="{F0781856-2FF9-4436-85C1-23D415B7D817}"/>
-          </ac:picMkLst>
-        </pc:picChg>
-      </pc:sldChg>
-    </pc:docChg>
-  </pc:docChgLst>
 </pc:chgInfo>
 </file>
 
@@ -2020,7 +2021,7 @@
           <a:p>
             <a:fld id="{F4D17925-1D2E-4024-850D-D1371936956D}" type="datetimeFigureOut">
               <a:rPr lang="ko-KR" altLang="en-US" smtClean="0"/>
-              <a:t>2018-05-27</a:t>
+              <a:t>2018-05-30</a:t>
             </a:fld>
             <a:endParaRPr lang="ko-KR" altLang="en-US"/>
           </a:p>
@@ -2197,7 +2198,7 @@
           <a:p>
             <a:fld id="{3389243F-B1BB-4202-BD78-416ACA555174}" type="datetimeFigureOut">
               <a:rPr lang="en-US" smtClean="0"/>
-              <a:t>5/27/2018</a:t>
+              <a:t>5/30/2018</a:t>
             </a:fld>
             <a:endParaRPr lang="en-US"/>
           </a:p>
@@ -4213,6 +4214,1271 @@
             <p:ph type="body" sz="quarter" idx="10"/>
           </p:nvPr>
         </p:nvSpPr>
+        <p:spPr>
+          <a:xfrm>
+            <a:off x="364676" y="3005206"/>
+            <a:ext cx="8414647" cy="847587"/>
+          </a:xfrm>
+        </p:spPr>
+        <p:txBody>
+          <a:bodyPr/>
+          <a:lstStyle/>
+          <a:p>
+            <a:pPr algn="ctr"/>
+            <a:r>
+              <a:rPr lang="ko-KR" altLang="en-US" dirty="0"/>
+              <a:t>백준 </a:t>
+            </a:r>
+            <a:r>
+              <a:rPr lang="en-US" altLang="ko-KR" dirty="0"/>
+              <a:t>4641</a:t>
+            </a:r>
+            <a:r>
+              <a:rPr lang="ko-KR" altLang="en-US" dirty="0"/>
+              <a:t>번 </a:t>
+            </a:r>
+            <a:r>
+              <a:rPr lang="en-US" altLang="ko-KR" dirty="0"/>
+              <a:t>– Doubles</a:t>
+            </a:r>
+            <a:endParaRPr lang="ko-KR" altLang="en-US" dirty="0"/>
+          </a:p>
+        </p:txBody>
+      </p:sp>
+    </p:spTree>
+    <p:extLst>
+      <p:ext uri="{BB962C8B-B14F-4D97-AF65-F5344CB8AC3E}">
+        <p14:creationId xmlns:p14="http://schemas.microsoft.com/office/powerpoint/2010/main" val="1949660028"/>
+      </p:ext>
+    </p:extLst>
+  </p:cSld>
+  <p:clrMapOvr>
+    <a:masterClrMapping/>
+  </p:clrMapOvr>
+  <mc:AlternateContent xmlns:mc="http://schemas.openxmlformats.org/markup-compatibility/2006" xmlns:p159="http://schemas.microsoft.com/office/powerpoint/2015/09/main">
+    <mc:Choice Requires="p159">
+      <p:transition xmlns:p14="http://schemas.microsoft.com/office/powerpoint/2010/main" p14:dur="300">
+        <p159:morph option="byChar"/>
+      </p:transition>
+    </mc:Choice>
+    <mc:Fallback xmlns="">
+      <p:transition>
+        <p:fade/>
+      </p:transition>
+    </mc:Fallback>
+  </mc:AlternateContent>
+</p:sld>
+</file>
+
+<file path=ppt/slides/slide11.xml><?xml version="1.0" encoding="utf-8"?>
+<p:sld xmlns:a="http://schemas.openxmlformats.org/drawingml/2006/main" xmlns:r="http://schemas.openxmlformats.org/officeDocument/2006/relationships" xmlns:p="http://schemas.openxmlformats.org/presentationml/2006/main">
+  <p:cSld>
+    <p:spTree>
+      <p:nvGrpSpPr>
+        <p:cNvPr id="1" name=""/>
+        <p:cNvGrpSpPr/>
+        <p:nvPr/>
+      </p:nvGrpSpPr>
+      <p:grpSpPr>
+        <a:xfrm>
+          <a:off x="0" y="0"/>
+          <a:ext cx="0" cy="0"/>
+          <a:chOff x="0" y="0"/>
+          <a:chExt cx="0" cy="0"/>
+        </a:xfrm>
+      </p:grpSpPr>
+      <p:sp>
+        <p:nvSpPr>
+          <p:cNvPr id="4" name="텍스트 개체 틀 3">
+            <a:extLst>
+              <a:ext uri="{FF2B5EF4-FFF2-40B4-BE49-F238E27FC236}">
+                <a16:creationId xmlns:a16="http://schemas.microsoft.com/office/drawing/2014/main" id="{EB0EBC6B-012A-4ACA-8760-6CC34C9635E0}"/>
+              </a:ext>
+            </a:extLst>
+          </p:cNvPr>
+          <p:cNvSpPr>
+            <a:spLocks noGrp="1"/>
+          </p:cNvSpPr>
+          <p:nvPr>
+            <p:ph type="body" sz="quarter" idx="10"/>
+          </p:nvPr>
+        </p:nvSpPr>
+        <p:spPr/>
+        <p:txBody>
+          <a:bodyPr/>
+          <a:lstStyle/>
+          <a:p>
+            <a:endParaRPr lang="ko-KR" altLang="en-US"/>
+          </a:p>
+        </p:txBody>
+      </p:sp>
+      <p:pic>
+        <p:nvPicPr>
+          <p:cNvPr id="3" name="그림 2">
+            <a:extLst>
+              <a:ext uri="{FF2B5EF4-FFF2-40B4-BE49-F238E27FC236}">
+                <a16:creationId xmlns:a16="http://schemas.microsoft.com/office/drawing/2014/main" id="{30F42F1C-CFA6-47D5-AE18-6A0AB58BC7F5}"/>
+              </a:ext>
+            </a:extLst>
+          </p:cNvPr>
+          <p:cNvPicPr>
+            <a:picLocks noChangeAspect="1"/>
+          </p:cNvPicPr>
+          <p:nvPr/>
+        </p:nvPicPr>
+        <p:blipFill>
+          <a:blip r:embed="rId2"/>
+          <a:stretch>
+            <a:fillRect/>
+          </a:stretch>
+        </p:blipFill>
+        <p:spPr>
+          <a:xfrm>
+            <a:off x="533400" y="800100"/>
+            <a:ext cx="8077200" cy="5257800"/>
+          </a:xfrm>
+          <a:prstGeom prst="rect">
+            <a:avLst/>
+          </a:prstGeom>
+        </p:spPr>
+      </p:pic>
+    </p:spTree>
+    <p:extLst>
+      <p:ext uri="{BB962C8B-B14F-4D97-AF65-F5344CB8AC3E}">
+        <p14:creationId xmlns:p14="http://schemas.microsoft.com/office/powerpoint/2010/main" val="2732440462"/>
+      </p:ext>
+    </p:extLst>
+  </p:cSld>
+  <p:clrMapOvr>
+    <a:masterClrMapping/>
+  </p:clrMapOvr>
+  <mc:AlternateContent xmlns:mc="http://schemas.openxmlformats.org/markup-compatibility/2006" xmlns:p159="http://schemas.microsoft.com/office/powerpoint/2015/09/main">
+    <mc:Choice Requires="p159">
+      <p:transition xmlns:p14="http://schemas.microsoft.com/office/powerpoint/2010/main" p14:dur="300">
+        <p159:morph option="byChar"/>
+      </p:transition>
+    </mc:Choice>
+    <mc:Fallback xmlns="">
+      <p:transition>
+        <p:fade/>
+      </p:transition>
+    </mc:Fallback>
+  </mc:AlternateContent>
+</p:sld>
+</file>
+
+<file path=ppt/slides/slide12.xml><?xml version="1.0" encoding="utf-8"?>
+<p:sld xmlns:a="http://schemas.openxmlformats.org/drawingml/2006/main" xmlns:r="http://schemas.openxmlformats.org/officeDocument/2006/relationships" xmlns:p="http://schemas.openxmlformats.org/presentationml/2006/main">
+  <p:cSld>
+    <p:spTree>
+      <p:nvGrpSpPr>
+        <p:cNvPr id="1" name=""/>
+        <p:cNvGrpSpPr/>
+        <p:nvPr/>
+      </p:nvGrpSpPr>
+      <p:grpSpPr>
+        <a:xfrm>
+          <a:off x="0" y="0"/>
+          <a:ext cx="0" cy="0"/>
+          <a:chOff x="0" y="0"/>
+          <a:chExt cx="0" cy="0"/>
+        </a:xfrm>
+      </p:grpSpPr>
+      <p:sp>
+        <p:nvSpPr>
+          <p:cNvPr id="4" name="텍스트 개체 틀 3">
+            <a:extLst>
+              <a:ext uri="{FF2B5EF4-FFF2-40B4-BE49-F238E27FC236}">
+                <a16:creationId xmlns:a16="http://schemas.microsoft.com/office/drawing/2014/main" id="{EB0EBC6B-012A-4ACA-8760-6CC34C9635E0}"/>
+              </a:ext>
+            </a:extLst>
+          </p:cNvPr>
+          <p:cNvSpPr>
+            <a:spLocks noGrp="1"/>
+          </p:cNvSpPr>
+          <p:nvPr>
+            <p:ph type="body" sz="quarter" idx="10"/>
+          </p:nvPr>
+        </p:nvSpPr>
+        <p:spPr/>
+        <p:txBody>
+          <a:bodyPr/>
+          <a:lstStyle/>
+          <a:p>
+            <a:r>
+              <a:rPr lang="ko-KR" altLang="en-US" dirty="0"/>
+              <a:t>예제</a:t>
+            </a:r>
+          </a:p>
+        </p:txBody>
+      </p:sp>
+      <p:graphicFrame>
+        <p:nvGraphicFramePr>
+          <p:cNvPr id="3" name="표 2">
+            <a:extLst>
+              <a:ext uri="{FF2B5EF4-FFF2-40B4-BE49-F238E27FC236}">
+                <a16:creationId xmlns:a16="http://schemas.microsoft.com/office/drawing/2014/main" id="{AA297D23-2656-43E6-948D-530B44AFF3AD}"/>
+              </a:ext>
+            </a:extLst>
+          </p:cNvPr>
+          <p:cNvGraphicFramePr>
+            <a:graphicFrameLocks noGrp="1"/>
+          </p:cNvGraphicFramePr>
+          <p:nvPr>
+            <p:extLst>
+              <p:ext uri="{D42A27DB-BD31-4B8C-83A1-F6EECF244321}">
+                <p14:modId xmlns:p14="http://schemas.microsoft.com/office/powerpoint/2010/main" val="2829885584"/>
+              </p:ext>
+            </p:extLst>
+          </p:nvPr>
+        </p:nvGraphicFramePr>
+        <p:xfrm>
+          <a:off x="1279075" y="2511552"/>
+          <a:ext cx="6096000" cy="3438144"/>
+        </p:xfrm>
+        <a:graphic>
+          <a:graphicData uri="http://schemas.openxmlformats.org/drawingml/2006/table">
+            <a:tbl>
+              <a:tblPr>
+                <a:tableStyleId>{5940675A-B579-460E-94D1-54222C63F5DA}</a:tableStyleId>
+              </a:tblPr>
+              <a:tblGrid>
+                <a:gridCol w="3048000">
+                  <a:extLst>
+                    <a:ext uri="{9D8B030D-6E8A-4147-A177-3AD203B41FA5}">
+                      <a16:colId xmlns:a16="http://schemas.microsoft.com/office/drawing/2014/main" val="2007221651"/>
+                    </a:ext>
+                  </a:extLst>
+                </a:gridCol>
+                <a:gridCol w="3048000">
+                  <a:extLst>
+                    <a:ext uri="{9D8B030D-6E8A-4147-A177-3AD203B41FA5}">
+                      <a16:colId xmlns:a16="http://schemas.microsoft.com/office/drawing/2014/main" val="1094752133"/>
+                    </a:ext>
+                  </a:extLst>
+                </a:gridCol>
+              </a:tblGrid>
+              <a:tr h="3438144">
+                <a:tc>
+                  <a:txBody>
+                    <a:bodyPr/>
+                    <a:lstStyle/>
+                    <a:p>
+                      <a:pPr latinLnBrk="1"/>
+                      <a:r>
+                        <a:rPr lang="en-US" altLang="ko-KR" sz="2000" b="0" i="0" u="none" strike="noStrike" kern="1200" dirty="0">
+                          <a:solidFill>
+                            <a:schemeClr val="tx1"/>
+                          </a:solidFill>
+                          <a:effectLst/>
+                          <a:latin typeface="+mn-lt"/>
+                          <a:ea typeface="+mn-ea"/>
+                          <a:cs typeface="+mn-cs"/>
+                        </a:rPr>
+                        <a:t>1 4 3 2 9 7 18 22 0</a:t>
+                      </a:r>
+                    </a:p>
+                    <a:p>
+                      <a:pPr latinLnBrk="1"/>
+                      <a:r>
+                        <a:rPr lang="en-US" altLang="ko-KR" sz="2000" b="0" i="0" u="none" strike="noStrike" kern="1200" dirty="0">
+                          <a:solidFill>
+                            <a:schemeClr val="tx1"/>
+                          </a:solidFill>
+                          <a:effectLst/>
+                          <a:latin typeface="+mn-lt"/>
+                          <a:ea typeface="+mn-ea"/>
+                          <a:cs typeface="+mn-cs"/>
+                        </a:rPr>
+                        <a:t>2 4 8 10 0</a:t>
+                      </a:r>
+                    </a:p>
+                    <a:p>
+                      <a:pPr latinLnBrk="1"/>
+                      <a:r>
+                        <a:rPr lang="en-US" altLang="ko-KR" sz="2000" b="0" i="0" u="none" strike="noStrike" kern="1200" dirty="0">
+                          <a:solidFill>
+                            <a:schemeClr val="tx1"/>
+                          </a:solidFill>
+                          <a:effectLst/>
+                          <a:latin typeface="+mn-lt"/>
+                          <a:ea typeface="+mn-ea"/>
+                          <a:cs typeface="+mn-cs"/>
+                        </a:rPr>
+                        <a:t>7 5 11 13 1 3 0</a:t>
+                      </a:r>
+                    </a:p>
+                    <a:p>
+                      <a:pPr latinLnBrk="1"/>
+                      <a:r>
+                        <a:rPr lang="en-US" altLang="ko-KR" sz="2000" b="0" i="0" u="none" strike="noStrike" kern="1200" dirty="0">
+                          <a:solidFill>
+                            <a:schemeClr val="tx1"/>
+                          </a:solidFill>
+                          <a:effectLst/>
+                          <a:latin typeface="+mn-lt"/>
+                          <a:ea typeface="+mn-ea"/>
+                          <a:cs typeface="+mn-cs"/>
+                        </a:rPr>
+                        <a:t>-1</a:t>
+                      </a:r>
+                      <a:endParaRPr lang="ko-KR" altLang="en-US" sz="2000" b="1" dirty="0"/>
+                    </a:p>
+                  </a:txBody>
+                  <a:tcPr>
+                    <a:solidFill>
+                      <a:schemeClr val="bg1"/>
+                    </a:solidFill>
+                  </a:tcPr>
+                </a:tc>
+                <a:tc>
+                  <a:txBody>
+                    <a:bodyPr/>
+                    <a:lstStyle/>
+                    <a:p>
+                      <a:pPr algn="r" latinLnBrk="1"/>
+                      <a:r>
+                        <a:rPr lang="en-US" altLang="ko-KR" sz="2000" dirty="0"/>
+                        <a:t>3</a:t>
+                      </a:r>
+                    </a:p>
+                    <a:p>
+                      <a:pPr algn="r" latinLnBrk="1"/>
+                      <a:r>
+                        <a:rPr lang="en-US" altLang="ko-KR" sz="2000" dirty="0"/>
+                        <a:t>2</a:t>
+                      </a:r>
+                    </a:p>
+                    <a:p>
+                      <a:pPr algn="r" latinLnBrk="1"/>
+                      <a:r>
+                        <a:rPr lang="en-US" altLang="ko-KR" sz="2000" dirty="0"/>
+                        <a:t>0</a:t>
+                      </a:r>
+                      <a:endParaRPr lang="ko-KR" altLang="en-US" sz="2000" dirty="0"/>
+                    </a:p>
+                  </a:txBody>
+                  <a:tcPr>
+                    <a:solidFill>
+                      <a:schemeClr val="bg1"/>
+                    </a:solidFill>
+                  </a:tcPr>
+                </a:tc>
+                <a:extLst>
+                  <a:ext uri="{0D108BD9-81ED-4DB2-BD59-A6C34878D82A}">
+                    <a16:rowId xmlns:a16="http://schemas.microsoft.com/office/drawing/2014/main" val="1791057616"/>
+                  </a:ext>
+                </a:extLst>
+              </a:tr>
+            </a:tbl>
+          </a:graphicData>
+        </a:graphic>
+      </p:graphicFrame>
+    </p:spTree>
+    <p:extLst>
+      <p:ext uri="{BB962C8B-B14F-4D97-AF65-F5344CB8AC3E}">
+        <p14:creationId xmlns:p14="http://schemas.microsoft.com/office/powerpoint/2010/main" val="2057087774"/>
+      </p:ext>
+    </p:extLst>
+  </p:cSld>
+  <p:clrMapOvr>
+    <a:masterClrMapping/>
+  </p:clrMapOvr>
+  <mc:AlternateContent xmlns:mc="http://schemas.openxmlformats.org/markup-compatibility/2006" xmlns:p159="http://schemas.microsoft.com/office/powerpoint/2015/09/main">
+    <mc:Choice Requires="p159">
+      <p:transition xmlns:p14="http://schemas.microsoft.com/office/powerpoint/2010/main" p14:dur="300">
+        <p159:morph option="byChar"/>
+      </p:transition>
+    </mc:Choice>
+    <mc:Fallback xmlns="">
+      <p:transition>
+        <p:fade/>
+      </p:transition>
+    </mc:Fallback>
+  </mc:AlternateContent>
+</p:sld>
+</file>
+
+<file path=ppt/slides/slide13.xml><?xml version="1.0" encoding="utf-8"?>
+<p:sld xmlns:a="http://schemas.openxmlformats.org/drawingml/2006/main" xmlns:r="http://schemas.openxmlformats.org/officeDocument/2006/relationships" xmlns:p="http://schemas.openxmlformats.org/presentationml/2006/main">
+  <p:cSld>
+    <p:spTree>
+      <p:nvGrpSpPr>
+        <p:cNvPr id="1" name=""/>
+        <p:cNvGrpSpPr/>
+        <p:nvPr/>
+      </p:nvGrpSpPr>
+      <p:grpSpPr>
+        <a:xfrm>
+          <a:off x="0" y="0"/>
+          <a:ext cx="0" cy="0"/>
+          <a:chOff x="0" y="0"/>
+          <a:chExt cx="0" cy="0"/>
+        </a:xfrm>
+      </p:grpSpPr>
+    </p:spTree>
+    <p:extLst>
+      <p:ext uri="{BB962C8B-B14F-4D97-AF65-F5344CB8AC3E}">
+        <p14:creationId xmlns:p14="http://schemas.microsoft.com/office/powerpoint/2010/main" val="1746186059"/>
+      </p:ext>
+    </p:extLst>
+  </p:cSld>
+  <p:clrMapOvr>
+    <a:masterClrMapping/>
+  </p:clrMapOvr>
+  <mc:AlternateContent xmlns:mc="http://schemas.openxmlformats.org/markup-compatibility/2006" xmlns:p159="http://schemas.microsoft.com/office/powerpoint/2015/09/main">
+    <mc:Choice Requires="p159">
+      <p:transition xmlns:p14="http://schemas.microsoft.com/office/powerpoint/2010/main" p14:dur="300">
+        <p159:morph option="byChar"/>
+      </p:transition>
+    </mc:Choice>
+    <mc:Fallback xmlns="">
+      <p:transition>
+        <p:fade/>
+      </p:transition>
+    </mc:Fallback>
+  </mc:AlternateContent>
+</p:sld>
+</file>
+
+<file path=ppt/slides/slide2.xml><?xml version="1.0" encoding="utf-8"?>
+<p:sld xmlns:a="http://schemas.openxmlformats.org/drawingml/2006/main" xmlns:r="http://schemas.openxmlformats.org/officeDocument/2006/relationships" xmlns:p="http://schemas.openxmlformats.org/presentationml/2006/main">
+  <p:cSld>
+    <p:spTree>
+      <p:nvGrpSpPr>
+        <p:cNvPr id="1" name=""/>
+        <p:cNvGrpSpPr/>
+        <p:nvPr/>
+      </p:nvGrpSpPr>
+      <p:grpSpPr>
+        <a:xfrm>
+          <a:off x="0" y="0"/>
+          <a:ext cx="0" cy="0"/>
+          <a:chOff x="0" y="0"/>
+          <a:chExt cx="0" cy="0"/>
+        </a:xfrm>
+      </p:grpSpPr>
+      <p:sp>
+        <p:nvSpPr>
+          <p:cNvPr id="3" name="텍스트 개체 틀 2">
+            <a:extLst>
+              <a:ext uri="{FF2B5EF4-FFF2-40B4-BE49-F238E27FC236}">
+                <a16:creationId xmlns:a16="http://schemas.microsoft.com/office/drawing/2014/main" id="{0FC59F62-5599-4C06-BB86-0FBA150BAF20}"/>
+              </a:ext>
+            </a:extLst>
+          </p:cNvPr>
+          <p:cNvSpPr>
+            <a:spLocks noGrp="1"/>
+          </p:cNvSpPr>
+          <p:nvPr>
+            <p:ph type="body" sz="quarter" idx="10"/>
+          </p:nvPr>
+        </p:nvSpPr>
+        <p:spPr/>
+        <p:txBody>
+          <a:bodyPr>
+            <a:noAutofit/>
+          </a:bodyPr>
+          <a:lstStyle/>
+          <a:p>
+            <a:pPr marL="0" indent="0">
+              <a:buNone/>
+            </a:pPr>
+            <a:r>
+              <a:rPr lang="ko-KR" altLang="en-US" dirty="0"/>
+              <a:t>목차</a:t>
+            </a:r>
+          </a:p>
+        </p:txBody>
+      </p:sp>
+      <p:sp>
+        <p:nvSpPr>
+          <p:cNvPr id="10" name="텍스트 개체 틀 2">
+            <a:extLst>
+              <a:ext uri="{FF2B5EF4-FFF2-40B4-BE49-F238E27FC236}">
+                <a16:creationId xmlns:a16="http://schemas.microsoft.com/office/drawing/2014/main" id="{8DCD2215-47E7-488C-B60E-EDC10E9EF5B2}"/>
+              </a:ext>
+            </a:extLst>
+          </p:cNvPr>
+          <p:cNvSpPr txBox="1">
+            <a:spLocks/>
+          </p:cNvSpPr>
+          <p:nvPr/>
+        </p:nvSpPr>
+        <p:spPr>
+          <a:xfrm>
+            <a:off x="1926943" y="3304964"/>
+            <a:ext cx="3943349" cy="476250"/>
+          </a:xfrm>
+          <a:prstGeom prst="rect">
+            <a:avLst/>
+          </a:prstGeom>
+        </p:spPr>
+        <p:txBody>
+          <a:bodyPr vert="horz" lIns="91440" tIns="45720" rIns="91440" bIns="45720" rtlCol="0">
+            <a:noAutofit/>
+          </a:bodyPr>
+          <a:lstStyle>
+            <a:lvl1pPr marL="228600" indent="-228600" algn="l" defTabSz="914400" rtl="0" eaLnBrk="1" latinLnBrk="0" hangingPunct="1">
+              <a:lnSpc>
+                <a:spcPct val="90000"/>
+              </a:lnSpc>
+              <a:spcBef>
+                <a:spcPts val="1000"/>
+              </a:spcBef>
+              <a:buFont typeface="Arial" panose="020B0604020202020204" pitchFamily="34" charset="0"/>
+              <a:buChar char="•"/>
+              <a:defRPr sz="2400" b="1" kern="1200">
+                <a:solidFill>
+                  <a:schemeClr val="bg1"/>
+                </a:solidFill>
+                <a:latin typeface="+mj-lt"/>
+                <a:ea typeface="+mn-ea"/>
+                <a:cs typeface="+mn-cs"/>
+              </a:defRPr>
+            </a:lvl1pPr>
+            <a:lvl2pPr marL="685800" indent="-228600" algn="l" defTabSz="914400" rtl="0" eaLnBrk="1" latinLnBrk="0" hangingPunct="1">
+              <a:lnSpc>
+                <a:spcPct val="90000"/>
+              </a:lnSpc>
+              <a:spcBef>
+                <a:spcPts val="500"/>
+              </a:spcBef>
+              <a:buFont typeface="Arial" panose="020B0604020202020204" pitchFamily="34" charset="0"/>
+              <a:buChar char="•"/>
+              <a:defRPr sz="2000" b="0" kern="1200">
+                <a:solidFill>
+                  <a:schemeClr val="bg1"/>
+                </a:solidFill>
+                <a:latin typeface="+mj-lt"/>
+                <a:ea typeface="+mn-ea"/>
+                <a:cs typeface="+mn-cs"/>
+              </a:defRPr>
+            </a:lvl2pPr>
+            <a:lvl3pPr marL="1143000" indent="-228600" algn="l" defTabSz="914400" rtl="0" eaLnBrk="1" latinLnBrk="0" hangingPunct="1">
+              <a:lnSpc>
+                <a:spcPct val="90000"/>
+              </a:lnSpc>
+              <a:spcBef>
+                <a:spcPts val="500"/>
+              </a:spcBef>
+              <a:buFont typeface="Arial" panose="020B0604020202020204" pitchFamily="34" charset="0"/>
+              <a:buChar char="•"/>
+              <a:defRPr sz="1800" b="0" kern="1200">
+                <a:solidFill>
+                  <a:schemeClr val="bg1"/>
+                </a:solidFill>
+                <a:latin typeface="+mj-lt"/>
+                <a:ea typeface="+mn-ea"/>
+                <a:cs typeface="+mn-cs"/>
+              </a:defRPr>
+            </a:lvl3pPr>
+            <a:lvl4pPr marL="1600200" indent="-228600" algn="l" defTabSz="914400" rtl="0" eaLnBrk="1" latinLnBrk="0" hangingPunct="1">
+              <a:lnSpc>
+                <a:spcPct val="90000"/>
+              </a:lnSpc>
+              <a:spcBef>
+                <a:spcPts val="500"/>
+              </a:spcBef>
+              <a:buFont typeface="Arial" panose="020B0604020202020204" pitchFamily="34" charset="0"/>
+              <a:buChar char="•"/>
+              <a:defRPr sz="1600" b="0" kern="1200">
+                <a:solidFill>
+                  <a:schemeClr val="bg1"/>
+                </a:solidFill>
+                <a:latin typeface="+mj-lt"/>
+                <a:ea typeface="+mn-ea"/>
+                <a:cs typeface="+mn-cs"/>
+              </a:defRPr>
+            </a:lvl4pPr>
+            <a:lvl5pPr marL="2057400" indent="-228600" algn="l" defTabSz="914400" rtl="0" eaLnBrk="1" latinLnBrk="0" hangingPunct="1">
+              <a:lnSpc>
+                <a:spcPct val="90000"/>
+              </a:lnSpc>
+              <a:spcBef>
+                <a:spcPts val="500"/>
+              </a:spcBef>
+              <a:buFont typeface="Arial" panose="020B0604020202020204" pitchFamily="34" charset="0"/>
+              <a:buChar char="•"/>
+              <a:defRPr sz="1600" b="0" kern="1200">
+                <a:solidFill>
+                  <a:schemeClr val="bg1"/>
+                </a:solidFill>
+                <a:latin typeface="+mj-lt"/>
+                <a:ea typeface="+mn-ea"/>
+                <a:cs typeface="+mn-cs"/>
+              </a:defRPr>
+            </a:lvl5pPr>
+            <a:lvl6pPr marL="2514600" indent="-228600" algn="l" defTabSz="914400" rtl="0" eaLnBrk="1" latinLnBrk="0" hangingPunct="1">
+              <a:lnSpc>
+                <a:spcPct val="90000"/>
+              </a:lnSpc>
+              <a:spcBef>
+                <a:spcPts val="500"/>
+              </a:spcBef>
+              <a:buFont typeface="Arial" panose="020B0604020202020204" pitchFamily="34" charset="0"/>
+              <a:buChar char="•"/>
+              <a:defRPr sz="1800" kern="1200">
+                <a:solidFill>
+                  <a:schemeClr val="tx1"/>
+                </a:solidFill>
+                <a:latin typeface="+mn-lt"/>
+                <a:ea typeface="+mn-ea"/>
+                <a:cs typeface="+mn-cs"/>
+              </a:defRPr>
+            </a:lvl6pPr>
+            <a:lvl7pPr marL="2971800" indent="-228600" algn="l" defTabSz="914400" rtl="0" eaLnBrk="1" latinLnBrk="0" hangingPunct="1">
+              <a:lnSpc>
+                <a:spcPct val="90000"/>
+              </a:lnSpc>
+              <a:spcBef>
+                <a:spcPts val="500"/>
+              </a:spcBef>
+              <a:buFont typeface="Arial" panose="020B0604020202020204" pitchFamily="34" charset="0"/>
+              <a:buChar char="•"/>
+              <a:defRPr sz="1800" kern="1200">
+                <a:solidFill>
+                  <a:schemeClr val="tx1"/>
+                </a:solidFill>
+                <a:latin typeface="+mn-lt"/>
+                <a:ea typeface="+mn-ea"/>
+                <a:cs typeface="+mn-cs"/>
+              </a:defRPr>
+            </a:lvl7pPr>
+            <a:lvl8pPr marL="3429000" indent="-228600" algn="l" defTabSz="914400" rtl="0" eaLnBrk="1" latinLnBrk="0" hangingPunct="1">
+              <a:lnSpc>
+                <a:spcPct val="90000"/>
+              </a:lnSpc>
+              <a:spcBef>
+                <a:spcPts val="500"/>
+              </a:spcBef>
+              <a:buFont typeface="Arial" panose="020B0604020202020204" pitchFamily="34" charset="0"/>
+              <a:buChar char="•"/>
+              <a:defRPr sz="1800" kern="1200">
+                <a:solidFill>
+                  <a:schemeClr val="tx1"/>
+                </a:solidFill>
+                <a:latin typeface="+mn-lt"/>
+                <a:ea typeface="+mn-ea"/>
+                <a:cs typeface="+mn-cs"/>
+              </a:defRPr>
+            </a:lvl8pPr>
+            <a:lvl9pPr marL="3886200" indent="-228600" algn="l" defTabSz="914400" rtl="0" eaLnBrk="1" latinLnBrk="0" hangingPunct="1">
+              <a:lnSpc>
+                <a:spcPct val="90000"/>
+              </a:lnSpc>
+              <a:spcBef>
+                <a:spcPts val="500"/>
+              </a:spcBef>
+              <a:buFont typeface="Arial" panose="020B0604020202020204" pitchFamily="34" charset="0"/>
+              <a:buChar char="•"/>
+              <a:defRPr sz="1800" kern="1200">
+                <a:solidFill>
+                  <a:schemeClr val="tx1"/>
+                </a:solidFill>
+                <a:latin typeface="+mn-lt"/>
+                <a:ea typeface="+mn-ea"/>
+                <a:cs typeface="+mn-cs"/>
+              </a:defRPr>
+            </a:lvl9pPr>
+          </a:lstStyle>
+          <a:p>
+            <a:pPr marL="0" indent="0">
+              <a:buFont typeface="Arial" panose="020B0604020202020204" pitchFamily="34" charset="0"/>
+              <a:buNone/>
+            </a:pPr>
+            <a:r>
+              <a:rPr lang="ko-KR" altLang="en-US" dirty="0"/>
+              <a:t>백준 </a:t>
+            </a:r>
+            <a:r>
+              <a:rPr lang="en-US" altLang="ko-KR" dirty="0"/>
+              <a:t>1913</a:t>
+            </a:r>
+            <a:r>
+              <a:rPr lang="ko-KR" altLang="en-US" dirty="0"/>
+              <a:t>번 달팽이</a:t>
+            </a:r>
+          </a:p>
+        </p:txBody>
+      </p:sp>
+      <p:sp>
+        <p:nvSpPr>
+          <p:cNvPr id="12" name="텍스트 개체 틀 2">
+            <a:extLst>
+              <a:ext uri="{FF2B5EF4-FFF2-40B4-BE49-F238E27FC236}">
+                <a16:creationId xmlns:a16="http://schemas.microsoft.com/office/drawing/2014/main" id="{76B24904-93BA-4FC7-8982-4F1A7AF6D7EC}"/>
+              </a:ext>
+            </a:extLst>
+          </p:cNvPr>
+          <p:cNvSpPr txBox="1">
+            <a:spLocks/>
+          </p:cNvSpPr>
+          <p:nvPr/>
+        </p:nvSpPr>
+        <p:spPr>
+          <a:xfrm>
+            <a:off x="915099" y="2359441"/>
+            <a:ext cx="3943349" cy="476250"/>
+          </a:xfrm>
+          <a:prstGeom prst="rect">
+            <a:avLst/>
+          </a:prstGeom>
+        </p:spPr>
+        <p:txBody>
+          <a:bodyPr vert="horz" lIns="91440" tIns="45720" rIns="91440" bIns="45720" rtlCol="0">
+            <a:noAutofit/>
+          </a:bodyPr>
+          <a:lstStyle>
+            <a:lvl1pPr marL="228600" indent="-228600" algn="l" defTabSz="914400" rtl="0" eaLnBrk="1" latinLnBrk="0" hangingPunct="1">
+              <a:lnSpc>
+                <a:spcPct val="90000"/>
+              </a:lnSpc>
+              <a:spcBef>
+                <a:spcPts val="1000"/>
+              </a:spcBef>
+              <a:buFont typeface="Arial" panose="020B0604020202020204" pitchFamily="34" charset="0"/>
+              <a:buChar char="•"/>
+              <a:defRPr sz="2400" b="1" kern="1200">
+                <a:solidFill>
+                  <a:schemeClr val="bg1"/>
+                </a:solidFill>
+                <a:latin typeface="+mj-lt"/>
+                <a:ea typeface="+mn-ea"/>
+                <a:cs typeface="+mn-cs"/>
+              </a:defRPr>
+            </a:lvl1pPr>
+            <a:lvl2pPr marL="685800" indent="-228600" algn="l" defTabSz="914400" rtl="0" eaLnBrk="1" latinLnBrk="0" hangingPunct="1">
+              <a:lnSpc>
+                <a:spcPct val="90000"/>
+              </a:lnSpc>
+              <a:spcBef>
+                <a:spcPts val="500"/>
+              </a:spcBef>
+              <a:buFont typeface="Arial" panose="020B0604020202020204" pitchFamily="34" charset="0"/>
+              <a:buChar char="•"/>
+              <a:defRPr sz="2000" b="0" kern="1200">
+                <a:solidFill>
+                  <a:schemeClr val="bg1"/>
+                </a:solidFill>
+                <a:latin typeface="+mj-lt"/>
+                <a:ea typeface="+mn-ea"/>
+                <a:cs typeface="+mn-cs"/>
+              </a:defRPr>
+            </a:lvl2pPr>
+            <a:lvl3pPr marL="1143000" indent="-228600" algn="l" defTabSz="914400" rtl="0" eaLnBrk="1" latinLnBrk="0" hangingPunct="1">
+              <a:lnSpc>
+                <a:spcPct val="90000"/>
+              </a:lnSpc>
+              <a:spcBef>
+                <a:spcPts val="500"/>
+              </a:spcBef>
+              <a:buFont typeface="Arial" panose="020B0604020202020204" pitchFamily="34" charset="0"/>
+              <a:buChar char="•"/>
+              <a:defRPr sz="1800" b="0" kern="1200">
+                <a:solidFill>
+                  <a:schemeClr val="bg1"/>
+                </a:solidFill>
+                <a:latin typeface="+mj-lt"/>
+                <a:ea typeface="+mn-ea"/>
+                <a:cs typeface="+mn-cs"/>
+              </a:defRPr>
+            </a:lvl3pPr>
+            <a:lvl4pPr marL="1600200" indent="-228600" algn="l" defTabSz="914400" rtl="0" eaLnBrk="1" latinLnBrk="0" hangingPunct="1">
+              <a:lnSpc>
+                <a:spcPct val="90000"/>
+              </a:lnSpc>
+              <a:spcBef>
+                <a:spcPts val="500"/>
+              </a:spcBef>
+              <a:buFont typeface="Arial" panose="020B0604020202020204" pitchFamily="34" charset="0"/>
+              <a:buChar char="•"/>
+              <a:defRPr sz="1600" b="0" kern="1200">
+                <a:solidFill>
+                  <a:schemeClr val="bg1"/>
+                </a:solidFill>
+                <a:latin typeface="+mj-lt"/>
+                <a:ea typeface="+mn-ea"/>
+                <a:cs typeface="+mn-cs"/>
+              </a:defRPr>
+            </a:lvl4pPr>
+            <a:lvl5pPr marL="2057400" indent="-228600" algn="l" defTabSz="914400" rtl="0" eaLnBrk="1" latinLnBrk="0" hangingPunct="1">
+              <a:lnSpc>
+                <a:spcPct val="90000"/>
+              </a:lnSpc>
+              <a:spcBef>
+                <a:spcPts val="500"/>
+              </a:spcBef>
+              <a:buFont typeface="Arial" panose="020B0604020202020204" pitchFamily="34" charset="0"/>
+              <a:buChar char="•"/>
+              <a:defRPr sz="1600" b="0" kern="1200">
+                <a:solidFill>
+                  <a:schemeClr val="bg1"/>
+                </a:solidFill>
+                <a:latin typeface="+mj-lt"/>
+                <a:ea typeface="+mn-ea"/>
+                <a:cs typeface="+mn-cs"/>
+              </a:defRPr>
+            </a:lvl5pPr>
+            <a:lvl6pPr marL="2514600" indent="-228600" algn="l" defTabSz="914400" rtl="0" eaLnBrk="1" latinLnBrk="0" hangingPunct="1">
+              <a:lnSpc>
+                <a:spcPct val="90000"/>
+              </a:lnSpc>
+              <a:spcBef>
+                <a:spcPts val="500"/>
+              </a:spcBef>
+              <a:buFont typeface="Arial" panose="020B0604020202020204" pitchFamily="34" charset="0"/>
+              <a:buChar char="•"/>
+              <a:defRPr sz="1800" kern="1200">
+                <a:solidFill>
+                  <a:schemeClr val="tx1"/>
+                </a:solidFill>
+                <a:latin typeface="+mn-lt"/>
+                <a:ea typeface="+mn-ea"/>
+                <a:cs typeface="+mn-cs"/>
+              </a:defRPr>
+            </a:lvl6pPr>
+            <a:lvl7pPr marL="2971800" indent="-228600" algn="l" defTabSz="914400" rtl="0" eaLnBrk="1" latinLnBrk="0" hangingPunct="1">
+              <a:lnSpc>
+                <a:spcPct val="90000"/>
+              </a:lnSpc>
+              <a:spcBef>
+                <a:spcPts val="500"/>
+              </a:spcBef>
+              <a:buFont typeface="Arial" panose="020B0604020202020204" pitchFamily="34" charset="0"/>
+              <a:buChar char="•"/>
+              <a:defRPr sz="1800" kern="1200">
+                <a:solidFill>
+                  <a:schemeClr val="tx1"/>
+                </a:solidFill>
+                <a:latin typeface="+mn-lt"/>
+                <a:ea typeface="+mn-ea"/>
+                <a:cs typeface="+mn-cs"/>
+              </a:defRPr>
+            </a:lvl7pPr>
+            <a:lvl8pPr marL="3429000" indent="-228600" algn="l" defTabSz="914400" rtl="0" eaLnBrk="1" latinLnBrk="0" hangingPunct="1">
+              <a:lnSpc>
+                <a:spcPct val="90000"/>
+              </a:lnSpc>
+              <a:spcBef>
+                <a:spcPts val="500"/>
+              </a:spcBef>
+              <a:buFont typeface="Arial" panose="020B0604020202020204" pitchFamily="34" charset="0"/>
+              <a:buChar char="•"/>
+              <a:defRPr sz="1800" kern="1200">
+                <a:solidFill>
+                  <a:schemeClr val="tx1"/>
+                </a:solidFill>
+                <a:latin typeface="+mn-lt"/>
+                <a:ea typeface="+mn-ea"/>
+                <a:cs typeface="+mn-cs"/>
+              </a:defRPr>
+            </a:lvl8pPr>
+            <a:lvl9pPr marL="3886200" indent="-228600" algn="l" defTabSz="914400" rtl="0" eaLnBrk="1" latinLnBrk="0" hangingPunct="1">
+              <a:lnSpc>
+                <a:spcPct val="90000"/>
+              </a:lnSpc>
+              <a:spcBef>
+                <a:spcPts val="500"/>
+              </a:spcBef>
+              <a:buFont typeface="Arial" panose="020B0604020202020204" pitchFamily="34" charset="0"/>
+              <a:buChar char="•"/>
+              <a:defRPr sz="1800" kern="1200">
+                <a:solidFill>
+                  <a:schemeClr val="tx1"/>
+                </a:solidFill>
+                <a:latin typeface="+mn-lt"/>
+                <a:ea typeface="+mn-ea"/>
+                <a:cs typeface="+mn-cs"/>
+              </a:defRPr>
+            </a:lvl9pPr>
+          </a:lstStyle>
+          <a:p>
+            <a:pPr marL="0" indent="0">
+              <a:buFont typeface="Arial" panose="020B0604020202020204" pitchFamily="34" charset="0"/>
+              <a:buNone/>
+            </a:pPr>
+            <a:r>
+              <a:rPr lang="ko-KR" altLang="en-US" dirty="0"/>
+              <a:t>백준 </a:t>
+            </a:r>
+            <a:r>
+              <a:rPr lang="en-US" altLang="ko-KR" dirty="0"/>
+              <a:t>1100</a:t>
+            </a:r>
+            <a:r>
+              <a:rPr lang="ko-KR" altLang="en-US" dirty="0"/>
+              <a:t>번 하얀 칸</a:t>
+            </a:r>
+          </a:p>
+        </p:txBody>
+      </p:sp>
+      <p:sp>
+        <p:nvSpPr>
+          <p:cNvPr id="15" name="텍스트 개체 틀 2">
+            <a:extLst>
+              <a:ext uri="{FF2B5EF4-FFF2-40B4-BE49-F238E27FC236}">
+                <a16:creationId xmlns:a16="http://schemas.microsoft.com/office/drawing/2014/main" id="{D948DB64-856F-4F59-AA89-995CCD12A3ED}"/>
+              </a:ext>
+            </a:extLst>
+          </p:cNvPr>
+          <p:cNvSpPr txBox="1">
+            <a:spLocks/>
+          </p:cNvSpPr>
+          <p:nvPr/>
+        </p:nvSpPr>
+        <p:spPr>
+          <a:xfrm>
+            <a:off x="2938787" y="4250487"/>
+            <a:ext cx="3943349" cy="476250"/>
+          </a:xfrm>
+          <a:prstGeom prst="rect">
+            <a:avLst/>
+          </a:prstGeom>
+        </p:spPr>
+        <p:txBody>
+          <a:bodyPr vert="horz" lIns="91440" tIns="45720" rIns="91440" bIns="45720" rtlCol="0">
+            <a:noAutofit/>
+          </a:bodyPr>
+          <a:lstStyle>
+            <a:lvl1pPr marL="228600" indent="-228600" algn="l" defTabSz="914400" rtl="0" eaLnBrk="1" latinLnBrk="0" hangingPunct="1">
+              <a:lnSpc>
+                <a:spcPct val="90000"/>
+              </a:lnSpc>
+              <a:spcBef>
+                <a:spcPts val="1000"/>
+              </a:spcBef>
+              <a:buFont typeface="Arial" panose="020B0604020202020204" pitchFamily="34" charset="0"/>
+              <a:buChar char="•"/>
+              <a:defRPr sz="2400" b="1" kern="1200">
+                <a:solidFill>
+                  <a:schemeClr val="bg1"/>
+                </a:solidFill>
+                <a:latin typeface="+mj-lt"/>
+                <a:ea typeface="+mn-ea"/>
+                <a:cs typeface="+mn-cs"/>
+              </a:defRPr>
+            </a:lvl1pPr>
+            <a:lvl2pPr marL="685800" indent="-228600" algn="l" defTabSz="914400" rtl="0" eaLnBrk="1" latinLnBrk="0" hangingPunct="1">
+              <a:lnSpc>
+                <a:spcPct val="90000"/>
+              </a:lnSpc>
+              <a:spcBef>
+                <a:spcPts val="500"/>
+              </a:spcBef>
+              <a:buFont typeface="Arial" panose="020B0604020202020204" pitchFamily="34" charset="0"/>
+              <a:buChar char="•"/>
+              <a:defRPr sz="2000" b="0" kern="1200">
+                <a:solidFill>
+                  <a:schemeClr val="bg1"/>
+                </a:solidFill>
+                <a:latin typeface="+mj-lt"/>
+                <a:ea typeface="+mn-ea"/>
+                <a:cs typeface="+mn-cs"/>
+              </a:defRPr>
+            </a:lvl2pPr>
+            <a:lvl3pPr marL="1143000" indent="-228600" algn="l" defTabSz="914400" rtl="0" eaLnBrk="1" latinLnBrk="0" hangingPunct="1">
+              <a:lnSpc>
+                <a:spcPct val="90000"/>
+              </a:lnSpc>
+              <a:spcBef>
+                <a:spcPts val="500"/>
+              </a:spcBef>
+              <a:buFont typeface="Arial" panose="020B0604020202020204" pitchFamily="34" charset="0"/>
+              <a:buChar char="•"/>
+              <a:defRPr sz="1800" b="0" kern="1200">
+                <a:solidFill>
+                  <a:schemeClr val="bg1"/>
+                </a:solidFill>
+                <a:latin typeface="+mj-lt"/>
+                <a:ea typeface="+mn-ea"/>
+                <a:cs typeface="+mn-cs"/>
+              </a:defRPr>
+            </a:lvl3pPr>
+            <a:lvl4pPr marL="1600200" indent="-228600" algn="l" defTabSz="914400" rtl="0" eaLnBrk="1" latinLnBrk="0" hangingPunct="1">
+              <a:lnSpc>
+                <a:spcPct val="90000"/>
+              </a:lnSpc>
+              <a:spcBef>
+                <a:spcPts val="500"/>
+              </a:spcBef>
+              <a:buFont typeface="Arial" panose="020B0604020202020204" pitchFamily="34" charset="0"/>
+              <a:buChar char="•"/>
+              <a:defRPr sz="1600" b="0" kern="1200">
+                <a:solidFill>
+                  <a:schemeClr val="bg1"/>
+                </a:solidFill>
+                <a:latin typeface="+mj-lt"/>
+                <a:ea typeface="+mn-ea"/>
+                <a:cs typeface="+mn-cs"/>
+              </a:defRPr>
+            </a:lvl4pPr>
+            <a:lvl5pPr marL="2057400" indent="-228600" algn="l" defTabSz="914400" rtl="0" eaLnBrk="1" latinLnBrk="0" hangingPunct="1">
+              <a:lnSpc>
+                <a:spcPct val="90000"/>
+              </a:lnSpc>
+              <a:spcBef>
+                <a:spcPts val="500"/>
+              </a:spcBef>
+              <a:buFont typeface="Arial" panose="020B0604020202020204" pitchFamily="34" charset="0"/>
+              <a:buChar char="•"/>
+              <a:defRPr sz="1600" b="0" kern="1200">
+                <a:solidFill>
+                  <a:schemeClr val="bg1"/>
+                </a:solidFill>
+                <a:latin typeface="+mj-lt"/>
+                <a:ea typeface="+mn-ea"/>
+                <a:cs typeface="+mn-cs"/>
+              </a:defRPr>
+            </a:lvl5pPr>
+            <a:lvl6pPr marL="2514600" indent="-228600" algn="l" defTabSz="914400" rtl="0" eaLnBrk="1" latinLnBrk="0" hangingPunct="1">
+              <a:lnSpc>
+                <a:spcPct val="90000"/>
+              </a:lnSpc>
+              <a:spcBef>
+                <a:spcPts val="500"/>
+              </a:spcBef>
+              <a:buFont typeface="Arial" panose="020B0604020202020204" pitchFamily="34" charset="0"/>
+              <a:buChar char="•"/>
+              <a:defRPr sz="1800" kern="1200">
+                <a:solidFill>
+                  <a:schemeClr val="tx1"/>
+                </a:solidFill>
+                <a:latin typeface="+mn-lt"/>
+                <a:ea typeface="+mn-ea"/>
+                <a:cs typeface="+mn-cs"/>
+              </a:defRPr>
+            </a:lvl6pPr>
+            <a:lvl7pPr marL="2971800" indent="-228600" algn="l" defTabSz="914400" rtl="0" eaLnBrk="1" latinLnBrk="0" hangingPunct="1">
+              <a:lnSpc>
+                <a:spcPct val="90000"/>
+              </a:lnSpc>
+              <a:spcBef>
+                <a:spcPts val="500"/>
+              </a:spcBef>
+              <a:buFont typeface="Arial" panose="020B0604020202020204" pitchFamily="34" charset="0"/>
+              <a:buChar char="•"/>
+              <a:defRPr sz="1800" kern="1200">
+                <a:solidFill>
+                  <a:schemeClr val="tx1"/>
+                </a:solidFill>
+                <a:latin typeface="+mn-lt"/>
+                <a:ea typeface="+mn-ea"/>
+                <a:cs typeface="+mn-cs"/>
+              </a:defRPr>
+            </a:lvl7pPr>
+            <a:lvl8pPr marL="3429000" indent="-228600" algn="l" defTabSz="914400" rtl="0" eaLnBrk="1" latinLnBrk="0" hangingPunct="1">
+              <a:lnSpc>
+                <a:spcPct val="90000"/>
+              </a:lnSpc>
+              <a:spcBef>
+                <a:spcPts val="500"/>
+              </a:spcBef>
+              <a:buFont typeface="Arial" panose="020B0604020202020204" pitchFamily="34" charset="0"/>
+              <a:buChar char="•"/>
+              <a:defRPr sz="1800" kern="1200">
+                <a:solidFill>
+                  <a:schemeClr val="tx1"/>
+                </a:solidFill>
+                <a:latin typeface="+mn-lt"/>
+                <a:ea typeface="+mn-ea"/>
+                <a:cs typeface="+mn-cs"/>
+              </a:defRPr>
+            </a:lvl8pPr>
+            <a:lvl9pPr marL="3886200" indent="-228600" algn="l" defTabSz="914400" rtl="0" eaLnBrk="1" latinLnBrk="0" hangingPunct="1">
+              <a:lnSpc>
+                <a:spcPct val="90000"/>
+              </a:lnSpc>
+              <a:spcBef>
+                <a:spcPts val="500"/>
+              </a:spcBef>
+              <a:buFont typeface="Arial" panose="020B0604020202020204" pitchFamily="34" charset="0"/>
+              <a:buChar char="•"/>
+              <a:defRPr sz="1800" kern="1200">
+                <a:solidFill>
+                  <a:schemeClr val="tx1"/>
+                </a:solidFill>
+                <a:latin typeface="+mn-lt"/>
+                <a:ea typeface="+mn-ea"/>
+                <a:cs typeface="+mn-cs"/>
+              </a:defRPr>
+            </a:lvl9pPr>
+          </a:lstStyle>
+          <a:p>
+            <a:pPr marL="0" indent="0">
+              <a:buFont typeface="Arial" panose="020B0604020202020204" pitchFamily="34" charset="0"/>
+              <a:buNone/>
+            </a:pPr>
+            <a:r>
+              <a:rPr lang="ko-KR" altLang="en-US" dirty="0"/>
+              <a:t>백준 </a:t>
+            </a:r>
+            <a:r>
+              <a:rPr lang="en-US" altLang="ko-KR" dirty="0"/>
+              <a:t>4641</a:t>
+            </a:r>
+            <a:r>
+              <a:rPr lang="ko-KR" altLang="en-US" dirty="0"/>
+              <a:t>번 </a:t>
+            </a:r>
+            <a:r>
+              <a:rPr lang="en-US" altLang="ko-KR" dirty="0"/>
+              <a:t>Doubles</a:t>
+            </a:r>
+            <a:endParaRPr lang="ko-KR" altLang="en-US" dirty="0"/>
+          </a:p>
+        </p:txBody>
+      </p:sp>
+    </p:spTree>
+    <p:extLst>
+      <p:ext uri="{BB962C8B-B14F-4D97-AF65-F5344CB8AC3E}">
+        <p14:creationId xmlns:p14="http://schemas.microsoft.com/office/powerpoint/2010/main" val="2828471371"/>
+      </p:ext>
+    </p:extLst>
+  </p:cSld>
+  <p:clrMapOvr>
+    <a:masterClrMapping/>
+  </p:clrMapOvr>
+  <mc:AlternateContent xmlns:mc="http://schemas.openxmlformats.org/markup-compatibility/2006" xmlns:p14="http://schemas.microsoft.com/office/powerpoint/2010/main">
+    <mc:Choice Requires="p14">
+      <p:transition p14:dur="200">
+        <p:fade/>
+      </p:transition>
+    </mc:Choice>
+    <mc:Fallback xmlns="">
+      <p:transition>
+        <p:fade/>
+      </p:transition>
+    </mc:Fallback>
+  </mc:AlternateContent>
+</p:sld>
+</file>
+
+<file path=ppt/slides/slide3.xml><?xml version="1.0" encoding="utf-8"?>
+<p:sld xmlns:a="http://schemas.openxmlformats.org/drawingml/2006/main" xmlns:r="http://schemas.openxmlformats.org/officeDocument/2006/relationships" xmlns:p="http://schemas.openxmlformats.org/presentationml/2006/main">
+  <p:cSld>
+    <p:spTree>
+      <p:nvGrpSpPr>
+        <p:cNvPr id="1" name=""/>
+        <p:cNvGrpSpPr/>
+        <p:nvPr/>
+      </p:nvGrpSpPr>
+      <p:grpSpPr>
+        <a:xfrm>
+          <a:off x="0" y="0"/>
+          <a:ext cx="0" cy="0"/>
+          <a:chOff x="0" y="0"/>
+          <a:chExt cx="0" cy="0"/>
+        </a:xfrm>
+      </p:grpSpPr>
+      <p:sp>
+        <p:nvSpPr>
+          <p:cNvPr id="4" name="텍스트 개체 틀 3">
+            <a:extLst>
+              <a:ext uri="{FF2B5EF4-FFF2-40B4-BE49-F238E27FC236}">
+                <a16:creationId xmlns:a16="http://schemas.microsoft.com/office/drawing/2014/main" id="{EB0EBC6B-012A-4ACA-8760-6CC34C9635E0}"/>
+              </a:ext>
+            </a:extLst>
+          </p:cNvPr>
+          <p:cNvSpPr>
+            <a:spLocks noGrp="1"/>
+          </p:cNvSpPr>
+          <p:nvPr>
+            <p:ph type="body" sz="quarter" idx="10"/>
+          </p:nvPr>
+        </p:nvSpPr>
+        <p:spPr>
+          <a:xfrm>
+            <a:off x="364676" y="3005206"/>
+            <a:ext cx="8414647" cy="847587"/>
+          </a:xfrm>
+        </p:spPr>
+        <p:txBody>
+          <a:bodyPr/>
+          <a:lstStyle/>
+          <a:p>
+            <a:pPr algn="ctr"/>
+            <a:r>
+              <a:rPr lang="ko-KR" altLang="en-US" dirty="0"/>
+              <a:t>백준 </a:t>
+            </a:r>
+            <a:r>
+              <a:rPr lang="en-US" altLang="ko-KR" dirty="0"/>
+              <a:t>1100</a:t>
+            </a:r>
+            <a:r>
+              <a:rPr lang="ko-KR" altLang="en-US" dirty="0"/>
+              <a:t>번 </a:t>
+            </a:r>
+            <a:r>
+              <a:rPr lang="en-US" altLang="ko-KR" dirty="0"/>
+              <a:t>– </a:t>
+            </a:r>
+            <a:r>
+              <a:rPr lang="ko-KR" altLang="en-US" dirty="0"/>
+              <a:t>하얀 칸</a:t>
+            </a:r>
+          </a:p>
+        </p:txBody>
+      </p:sp>
+    </p:spTree>
+    <p:extLst>
+      <p:ext uri="{BB962C8B-B14F-4D97-AF65-F5344CB8AC3E}">
+        <p14:creationId xmlns:p14="http://schemas.microsoft.com/office/powerpoint/2010/main" val="2794658932"/>
+      </p:ext>
+    </p:extLst>
+  </p:cSld>
+  <p:clrMapOvr>
+    <a:masterClrMapping/>
+  </p:clrMapOvr>
+  <mc:AlternateContent xmlns:mc="http://schemas.openxmlformats.org/markup-compatibility/2006" xmlns:p159="http://schemas.microsoft.com/office/powerpoint/2015/09/main">
+    <mc:Choice Requires="p159">
+      <p:transition xmlns:p14="http://schemas.microsoft.com/office/powerpoint/2010/main" p14:dur="300">
+        <p159:morph option="byChar"/>
+      </p:transition>
+    </mc:Choice>
+    <mc:Fallback xmlns="">
+      <p:transition>
+        <p:fade/>
+      </p:transition>
+    </mc:Fallback>
+  </mc:AlternateContent>
+</p:sld>
+</file>
+
+<file path=ppt/slides/slide4.xml><?xml version="1.0" encoding="utf-8"?>
+<p:sld xmlns:a="http://schemas.openxmlformats.org/drawingml/2006/main" xmlns:r="http://schemas.openxmlformats.org/officeDocument/2006/relationships" xmlns:p="http://schemas.openxmlformats.org/presentationml/2006/main">
+  <p:cSld>
+    <p:spTree>
+      <p:nvGrpSpPr>
+        <p:cNvPr id="1" name=""/>
+        <p:cNvGrpSpPr/>
+        <p:nvPr/>
+      </p:nvGrpSpPr>
+      <p:grpSpPr>
+        <a:xfrm>
+          <a:off x="0" y="0"/>
+          <a:ext cx="0" cy="0"/>
+          <a:chOff x="0" y="0"/>
+          <a:chExt cx="0" cy="0"/>
+        </a:xfrm>
+      </p:grpSpPr>
+      <p:sp>
+        <p:nvSpPr>
+          <p:cNvPr id="4" name="텍스트 개체 틀 3">
+            <a:extLst>
+              <a:ext uri="{FF2B5EF4-FFF2-40B4-BE49-F238E27FC236}">
+                <a16:creationId xmlns:a16="http://schemas.microsoft.com/office/drawing/2014/main" id="{EB0EBC6B-012A-4ACA-8760-6CC34C9635E0}"/>
+              </a:ext>
+            </a:extLst>
+          </p:cNvPr>
+          <p:cNvSpPr>
+            <a:spLocks noGrp="1"/>
+          </p:cNvSpPr>
+          <p:nvPr>
+            <p:ph type="body" sz="quarter" idx="10"/>
+          </p:nvPr>
+        </p:nvSpPr>
         <p:spPr/>
         <p:txBody>
           <a:bodyPr/>
@@ -4277,7 +5543,7 @@
 </p:sld>
 </file>
 
-<file path=ppt/slides/slide11.xml><?xml version="1.0" encoding="utf-8"?>
+<file path=ppt/slides/slide5.xml><?xml version="1.0" encoding="utf-8"?>
 <p:sld xmlns:a="http://schemas.openxmlformats.org/drawingml/2006/main" xmlns:r="http://schemas.openxmlformats.org/officeDocument/2006/relationships" xmlns:p="http://schemas.openxmlformats.org/presentationml/2006/main">
   <p:cSld>
     <p:spTree>
@@ -4555,634 +5821,6 @@
 </p:sld>
 </file>
 
-<file path=ppt/slides/slide12.xml><?xml version="1.0" encoding="utf-8"?>
-<p:sld xmlns:a="http://schemas.openxmlformats.org/drawingml/2006/main" xmlns:r="http://schemas.openxmlformats.org/officeDocument/2006/relationships" xmlns:p="http://schemas.openxmlformats.org/presentationml/2006/main">
-  <p:cSld>
-    <p:spTree>
-      <p:nvGrpSpPr>
-        <p:cNvPr id="1" name=""/>
-        <p:cNvGrpSpPr/>
-        <p:nvPr/>
-      </p:nvGrpSpPr>
-      <p:grpSpPr>
-        <a:xfrm>
-          <a:off x="0" y="0"/>
-          <a:ext cx="0" cy="0"/>
-          <a:chOff x="0" y="0"/>
-          <a:chExt cx="0" cy="0"/>
-        </a:xfrm>
-      </p:grpSpPr>
-    </p:spTree>
-    <p:extLst>
-      <p:ext uri="{BB962C8B-B14F-4D97-AF65-F5344CB8AC3E}">
-        <p14:creationId xmlns:p14="http://schemas.microsoft.com/office/powerpoint/2010/main" val="1746186059"/>
-      </p:ext>
-    </p:extLst>
-  </p:cSld>
-  <p:clrMapOvr>
-    <a:masterClrMapping/>
-  </p:clrMapOvr>
-  <mc:AlternateContent xmlns:mc="http://schemas.openxmlformats.org/markup-compatibility/2006" xmlns:p159="http://schemas.microsoft.com/office/powerpoint/2015/09/main">
-    <mc:Choice Requires="p159">
-      <p:transition xmlns:p14="http://schemas.microsoft.com/office/powerpoint/2010/main" p14:dur="300">
-        <p159:morph option="byChar"/>
-      </p:transition>
-    </mc:Choice>
-    <mc:Fallback xmlns="">
-      <p:transition>
-        <p:fade/>
-      </p:transition>
-    </mc:Fallback>
-  </mc:AlternateContent>
-</p:sld>
-</file>
-
-<file path=ppt/slides/slide2.xml><?xml version="1.0" encoding="utf-8"?>
-<p:sld xmlns:a="http://schemas.openxmlformats.org/drawingml/2006/main" xmlns:r="http://schemas.openxmlformats.org/officeDocument/2006/relationships" xmlns:p="http://schemas.openxmlformats.org/presentationml/2006/main">
-  <p:cSld>
-    <p:spTree>
-      <p:nvGrpSpPr>
-        <p:cNvPr id="1" name=""/>
-        <p:cNvGrpSpPr/>
-        <p:nvPr/>
-      </p:nvGrpSpPr>
-      <p:grpSpPr>
-        <a:xfrm>
-          <a:off x="0" y="0"/>
-          <a:ext cx="0" cy="0"/>
-          <a:chOff x="0" y="0"/>
-          <a:chExt cx="0" cy="0"/>
-        </a:xfrm>
-      </p:grpSpPr>
-      <p:sp>
-        <p:nvSpPr>
-          <p:cNvPr id="3" name="텍스트 개체 틀 2">
-            <a:extLst>
-              <a:ext uri="{FF2B5EF4-FFF2-40B4-BE49-F238E27FC236}">
-                <a16:creationId xmlns:a16="http://schemas.microsoft.com/office/drawing/2014/main" id="{76DEDF3D-AD3E-4C60-A62E-779C9266CAD4}"/>
-              </a:ext>
-            </a:extLst>
-          </p:cNvPr>
-          <p:cNvSpPr>
-            <a:spLocks noGrp="1"/>
-          </p:cNvSpPr>
-          <p:nvPr>
-            <p:ph type="body" sz="quarter" idx="10"/>
-          </p:nvPr>
-        </p:nvSpPr>
-        <p:spPr>
-          <a:xfrm>
-            <a:off x="217288" y="3005206"/>
-            <a:ext cx="8414647" cy="847587"/>
-          </a:xfrm>
-        </p:spPr>
-        <p:txBody>
-          <a:bodyPr/>
-          <a:lstStyle/>
-          <a:p>
-            <a:pPr algn="ctr"/>
-            <a:r>
-              <a:rPr lang="ko-KR" altLang="en-US" dirty="0"/>
-              <a:t>백준 </a:t>
-            </a:r>
-            <a:r>
-              <a:rPr lang="en-US" altLang="ko-KR" dirty="0"/>
-              <a:t>1094</a:t>
-            </a:r>
-            <a:r>
-              <a:rPr lang="ko-KR" altLang="en-US" dirty="0"/>
-              <a:t>번 </a:t>
-            </a:r>
-            <a:r>
-              <a:rPr lang="en-US" altLang="ko-KR" dirty="0"/>
-              <a:t>- </a:t>
-            </a:r>
-            <a:r>
-              <a:rPr lang="ko-KR" altLang="en-US" dirty="0"/>
-              <a:t>막대기</a:t>
-            </a:r>
-          </a:p>
-        </p:txBody>
-      </p:sp>
-    </p:spTree>
-    <p:extLst>
-      <p:ext uri="{BB962C8B-B14F-4D97-AF65-F5344CB8AC3E}">
-        <p14:creationId xmlns:p14="http://schemas.microsoft.com/office/powerpoint/2010/main" val="121322230"/>
-      </p:ext>
-    </p:extLst>
-  </p:cSld>
-  <p:clrMapOvr>
-    <a:masterClrMapping/>
-  </p:clrMapOvr>
-  <mc:AlternateContent xmlns:mc="http://schemas.openxmlformats.org/markup-compatibility/2006" xmlns:p159="http://schemas.microsoft.com/office/powerpoint/2015/09/main">
-    <mc:Choice Requires="p159">
-      <p:transition xmlns:p14="http://schemas.microsoft.com/office/powerpoint/2010/main" p14:dur="300">
-        <p159:morph option="byChar"/>
-      </p:transition>
-    </mc:Choice>
-    <mc:Fallback xmlns="">
-      <p:transition>
-        <p:fade/>
-      </p:transition>
-    </mc:Fallback>
-  </mc:AlternateContent>
-</p:sld>
-</file>
-
-<file path=ppt/slides/slide3.xml><?xml version="1.0" encoding="utf-8"?>
-<p:sld xmlns:a="http://schemas.openxmlformats.org/drawingml/2006/main" xmlns:r="http://schemas.openxmlformats.org/officeDocument/2006/relationships" xmlns:p="http://schemas.openxmlformats.org/presentationml/2006/main">
-  <p:cSld>
-    <p:spTree>
-      <p:nvGrpSpPr>
-        <p:cNvPr id="1" name=""/>
-        <p:cNvGrpSpPr/>
-        <p:nvPr/>
-      </p:nvGrpSpPr>
-      <p:grpSpPr>
-        <a:xfrm>
-          <a:off x="0" y="0"/>
-          <a:ext cx="0" cy="0"/>
-          <a:chOff x="0" y="0"/>
-          <a:chExt cx="0" cy="0"/>
-        </a:xfrm>
-      </p:grpSpPr>
-      <p:sp>
-        <p:nvSpPr>
-          <p:cNvPr id="4" name="텍스트 개체 틀 3">
-            <a:extLst>
-              <a:ext uri="{FF2B5EF4-FFF2-40B4-BE49-F238E27FC236}">
-                <a16:creationId xmlns:a16="http://schemas.microsoft.com/office/drawing/2014/main" id="{EB0EBC6B-012A-4ACA-8760-6CC34C9635E0}"/>
-              </a:ext>
-            </a:extLst>
-          </p:cNvPr>
-          <p:cNvSpPr>
-            <a:spLocks noGrp="1"/>
-          </p:cNvSpPr>
-          <p:nvPr>
-            <p:ph type="body" sz="quarter" idx="10"/>
-          </p:nvPr>
-        </p:nvSpPr>
-        <p:spPr/>
-        <p:txBody>
-          <a:bodyPr/>
-          <a:lstStyle/>
-          <a:p>
-            <a:endParaRPr lang="ko-KR" altLang="en-US"/>
-          </a:p>
-        </p:txBody>
-      </p:sp>
-      <p:pic>
-        <p:nvPicPr>
-          <p:cNvPr id="5" name="그림 4">
-            <a:extLst>
-              <a:ext uri="{FF2B5EF4-FFF2-40B4-BE49-F238E27FC236}">
-                <a16:creationId xmlns:a16="http://schemas.microsoft.com/office/drawing/2014/main" id="{DB154649-6ED9-4EE1-A9C5-E8703DBC38E3}"/>
-              </a:ext>
-            </a:extLst>
-          </p:cNvPr>
-          <p:cNvPicPr>
-            <a:picLocks noChangeAspect="1"/>
-          </p:cNvPicPr>
-          <p:nvPr/>
-        </p:nvPicPr>
-        <p:blipFill>
-          <a:blip r:embed="rId2"/>
-          <a:stretch>
-            <a:fillRect/>
-          </a:stretch>
-        </p:blipFill>
-        <p:spPr>
-          <a:xfrm>
-            <a:off x="452437" y="1070038"/>
-            <a:ext cx="8239125" cy="5400675"/>
-          </a:xfrm>
-          <a:prstGeom prst="rect">
-            <a:avLst/>
-          </a:prstGeom>
-        </p:spPr>
-      </p:pic>
-    </p:spTree>
-    <p:extLst>
-      <p:ext uri="{BB962C8B-B14F-4D97-AF65-F5344CB8AC3E}">
-        <p14:creationId xmlns:p14="http://schemas.microsoft.com/office/powerpoint/2010/main" val="2053696221"/>
-      </p:ext>
-    </p:extLst>
-  </p:cSld>
-  <p:clrMapOvr>
-    <a:masterClrMapping/>
-  </p:clrMapOvr>
-  <mc:AlternateContent xmlns:mc="http://schemas.openxmlformats.org/markup-compatibility/2006" xmlns:p159="http://schemas.microsoft.com/office/powerpoint/2015/09/main">
-    <mc:Choice Requires="p159">
-      <p:transition xmlns:p14="http://schemas.microsoft.com/office/powerpoint/2010/main" p14:dur="300">
-        <p159:morph option="byChar"/>
-      </p:transition>
-    </mc:Choice>
-    <mc:Fallback xmlns="">
-      <p:transition>
-        <p:fade/>
-      </p:transition>
-    </mc:Fallback>
-  </mc:AlternateContent>
-</p:sld>
-</file>
-
-<file path=ppt/slides/slide4.xml><?xml version="1.0" encoding="utf-8"?>
-<p:sld xmlns:a="http://schemas.openxmlformats.org/drawingml/2006/main" xmlns:r="http://schemas.openxmlformats.org/officeDocument/2006/relationships" xmlns:p="http://schemas.openxmlformats.org/presentationml/2006/main">
-  <p:cSld>
-    <p:spTree>
-      <p:nvGrpSpPr>
-        <p:cNvPr id="1" name=""/>
-        <p:cNvGrpSpPr/>
-        <p:nvPr/>
-      </p:nvGrpSpPr>
-      <p:grpSpPr>
-        <a:xfrm>
-          <a:off x="0" y="0"/>
-          <a:ext cx="0" cy="0"/>
-          <a:chOff x="0" y="0"/>
-          <a:chExt cx="0" cy="0"/>
-        </a:xfrm>
-      </p:grpSpPr>
-      <p:sp>
-        <p:nvSpPr>
-          <p:cNvPr id="4" name="텍스트 개체 틀 3">
-            <a:extLst>
-              <a:ext uri="{FF2B5EF4-FFF2-40B4-BE49-F238E27FC236}">
-                <a16:creationId xmlns:a16="http://schemas.microsoft.com/office/drawing/2014/main" id="{EB0EBC6B-012A-4ACA-8760-6CC34C9635E0}"/>
-              </a:ext>
-            </a:extLst>
-          </p:cNvPr>
-          <p:cNvSpPr>
-            <a:spLocks noGrp="1"/>
-          </p:cNvSpPr>
-          <p:nvPr>
-            <p:ph type="body" sz="quarter" idx="10"/>
-          </p:nvPr>
-        </p:nvSpPr>
-        <p:spPr/>
-        <p:txBody>
-          <a:bodyPr/>
-          <a:lstStyle/>
-          <a:p>
-            <a:endParaRPr lang="ko-KR" altLang="en-US"/>
-          </a:p>
-        </p:txBody>
-      </p:sp>
-      <p:pic>
-        <p:nvPicPr>
-          <p:cNvPr id="2" name="그림 1">
-            <a:extLst>
-              <a:ext uri="{FF2B5EF4-FFF2-40B4-BE49-F238E27FC236}">
-                <a16:creationId xmlns:a16="http://schemas.microsoft.com/office/drawing/2014/main" id="{1B8FF623-91F4-4F70-BB08-6D6E21D6467B}"/>
-              </a:ext>
-            </a:extLst>
-          </p:cNvPr>
-          <p:cNvPicPr>
-            <a:picLocks noChangeAspect="1"/>
-          </p:cNvPicPr>
-          <p:nvPr/>
-        </p:nvPicPr>
-        <p:blipFill>
-          <a:blip r:embed="rId2"/>
-          <a:stretch>
-            <a:fillRect/>
-          </a:stretch>
-        </p:blipFill>
-        <p:spPr>
-          <a:xfrm>
-            <a:off x="900112" y="2462421"/>
-            <a:ext cx="7343775" cy="2381250"/>
-          </a:xfrm>
-          <a:prstGeom prst="rect">
-            <a:avLst/>
-          </a:prstGeom>
-        </p:spPr>
-      </p:pic>
-    </p:spTree>
-    <p:extLst>
-      <p:ext uri="{BB962C8B-B14F-4D97-AF65-F5344CB8AC3E}">
-        <p14:creationId xmlns:p14="http://schemas.microsoft.com/office/powerpoint/2010/main" val="2394875296"/>
-      </p:ext>
-    </p:extLst>
-  </p:cSld>
-  <p:clrMapOvr>
-    <a:masterClrMapping/>
-  </p:clrMapOvr>
-  <mc:AlternateContent xmlns:mc="http://schemas.openxmlformats.org/markup-compatibility/2006" xmlns:p159="http://schemas.microsoft.com/office/powerpoint/2015/09/main">
-    <mc:Choice Requires="p159">
-      <p:transition xmlns:p14="http://schemas.microsoft.com/office/powerpoint/2010/main" p14:dur="300">
-        <p159:morph option="byChar"/>
-      </p:transition>
-    </mc:Choice>
-    <mc:Fallback xmlns="">
-      <p:transition>
-        <p:fade/>
-      </p:transition>
-    </mc:Fallback>
-  </mc:AlternateContent>
-</p:sld>
-</file>
-
-<file path=ppt/slides/slide5.xml><?xml version="1.0" encoding="utf-8"?>
-<p:sld xmlns:a="http://schemas.openxmlformats.org/drawingml/2006/main" xmlns:r="http://schemas.openxmlformats.org/officeDocument/2006/relationships" xmlns:p="http://schemas.openxmlformats.org/presentationml/2006/main">
-  <p:cSld>
-    <p:spTree>
-      <p:nvGrpSpPr>
-        <p:cNvPr id="1" name=""/>
-        <p:cNvGrpSpPr/>
-        <p:nvPr/>
-      </p:nvGrpSpPr>
-      <p:grpSpPr>
-        <a:xfrm>
-          <a:off x="0" y="0"/>
-          <a:ext cx="0" cy="0"/>
-          <a:chOff x="0" y="0"/>
-          <a:chExt cx="0" cy="0"/>
-        </a:xfrm>
-      </p:grpSpPr>
-      <p:sp>
-        <p:nvSpPr>
-          <p:cNvPr id="4" name="텍스트 개체 틀 3">
-            <a:extLst>
-              <a:ext uri="{FF2B5EF4-FFF2-40B4-BE49-F238E27FC236}">
-                <a16:creationId xmlns:a16="http://schemas.microsoft.com/office/drawing/2014/main" id="{EB0EBC6B-012A-4ACA-8760-6CC34C9635E0}"/>
-              </a:ext>
-            </a:extLst>
-          </p:cNvPr>
-          <p:cNvSpPr>
-            <a:spLocks noGrp="1"/>
-          </p:cNvSpPr>
-          <p:nvPr>
-            <p:ph type="body" sz="quarter" idx="10"/>
-          </p:nvPr>
-        </p:nvSpPr>
-        <p:spPr/>
-        <p:txBody>
-          <a:bodyPr/>
-          <a:lstStyle/>
-          <a:p>
-            <a:r>
-              <a:rPr lang="ko-KR" altLang="en-US" dirty="0"/>
-              <a:t>예제</a:t>
-            </a:r>
-          </a:p>
-        </p:txBody>
-      </p:sp>
-      <p:graphicFrame>
-        <p:nvGraphicFramePr>
-          <p:cNvPr id="3" name="표 2">
-            <a:extLst>
-              <a:ext uri="{FF2B5EF4-FFF2-40B4-BE49-F238E27FC236}">
-                <a16:creationId xmlns:a16="http://schemas.microsoft.com/office/drawing/2014/main" id="{6B39A3A4-4A6D-4A2D-986B-4159AA46198E}"/>
-              </a:ext>
-            </a:extLst>
-          </p:cNvPr>
-          <p:cNvGraphicFramePr>
-            <a:graphicFrameLocks noGrp="1"/>
-          </p:cNvGraphicFramePr>
-          <p:nvPr>
-            <p:extLst>
-              <p:ext uri="{D42A27DB-BD31-4B8C-83A1-F6EECF244321}">
-                <p14:modId xmlns:p14="http://schemas.microsoft.com/office/powerpoint/2010/main" val="1064481479"/>
-              </p:ext>
-            </p:extLst>
-          </p:nvPr>
-        </p:nvGraphicFramePr>
-        <p:xfrm>
-          <a:off x="1279075" y="2511552"/>
-          <a:ext cx="6096000" cy="3438144"/>
-        </p:xfrm>
-        <a:graphic>
-          <a:graphicData uri="http://schemas.openxmlformats.org/drawingml/2006/table">
-            <a:tbl>
-              <a:tblPr>
-                <a:tableStyleId>{5940675A-B579-460E-94D1-54222C63F5DA}</a:tableStyleId>
-              </a:tblPr>
-              <a:tblGrid>
-                <a:gridCol w="3048000">
-                  <a:extLst>
-                    <a:ext uri="{9D8B030D-6E8A-4147-A177-3AD203B41FA5}">
-                      <a16:colId xmlns:a16="http://schemas.microsoft.com/office/drawing/2014/main" val="2007221651"/>
-                    </a:ext>
-                  </a:extLst>
-                </a:gridCol>
-                <a:gridCol w="3048000">
-                  <a:extLst>
-                    <a:ext uri="{9D8B030D-6E8A-4147-A177-3AD203B41FA5}">
-                      <a16:colId xmlns:a16="http://schemas.microsoft.com/office/drawing/2014/main" val="1094752133"/>
-                    </a:ext>
-                  </a:extLst>
-                </a:gridCol>
-              </a:tblGrid>
-              <a:tr h="859536">
-                <a:tc>
-                  <a:txBody>
-                    <a:bodyPr/>
-                    <a:lstStyle/>
-                    <a:p>
-                      <a:pPr latinLnBrk="1"/>
-                      <a:r>
-                        <a:rPr lang="en-US" altLang="ko-KR" sz="3600" dirty="0"/>
-                        <a:t>23</a:t>
-                      </a:r>
-                      <a:endParaRPr lang="ko-KR" altLang="en-US" sz="3600" dirty="0"/>
-                    </a:p>
-                  </a:txBody>
-                  <a:tcPr>
-                    <a:solidFill>
-                      <a:schemeClr val="bg1"/>
-                    </a:solidFill>
-                  </a:tcPr>
-                </a:tc>
-                <a:tc>
-                  <a:txBody>
-                    <a:bodyPr/>
-                    <a:lstStyle/>
-                    <a:p>
-                      <a:pPr algn="r" latinLnBrk="1"/>
-                      <a:r>
-                        <a:rPr lang="en-US" altLang="ko-KR" sz="3600" dirty="0"/>
-                        <a:t>4</a:t>
-                      </a:r>
-                      <a:endParaRPr lang="ko-KR" altLang="en-US" sz="3600" dirty="0"/>
-                    </a:p>
-                  </a:txBody>
-                  <a:tcPr>
-                    <a:solidFill>
-                      <a:schemeClr val="bg1"/>
-                    </a:solidFill>
-                  </a:tcPr>
-                </a:tc>
-                <a:extLst>
-                  <a:ext uri="{0D108BD9-81ED-4DB2-BD59-A6C34878D82A}">
-                    <a16:rowId xmlns:a16="http://schemas.microsoft.com/office/drawing/2014/main" val="1791057616"/>
-                  </a:ext>
-                </a:extLst>
-              </a:tr>
-              <a:tr h="859536">
-                <a:tc>
-                  <a:txBody>
-                    <a:bodyPr/>
-                    <a:lstStyle/>
-                    <a:p>
-                      <a:pPr latinLnBrk="1"/>
-                      <a:r>
-                        <a:rPr lang="en-US" altLang="ko-KR" sz="3600" dirty="0"/>
-                        <a:t>32</a:t>
-                      </a:r>
-                      <a:endParaRPr lang="ko-KR" altLang="en-US" sz="3600" dirty="0"/>
-                    </a:p>
-                  </a:txBody>
-                  <a:tcPr>
-                    <a:solidFill>
-                      <a:schemeClr val="bg1"/>
-                    </a:solidFill>
-                  </a:tcPr>
-                </a:tc>
-                <a:tc>
-                  <a:txBody>
-                    <a:bodyPr/>
-                    <a:lstStyle/>
-                    <a:p>
-                      <a:pPr algn="r" latinLnBrk="1"/>
-                      <a:r>
-                        <a:rPr lang="en-US" altLang="ko-KR" sz="3600" dirty="0"/>
-                        <a:t>1</a:t>
-                      </a:r>
-                      <a:endParaRPr lang="ko-KR" altLang="en-US" sz="3600" dirty="0"/>
-                    </a:p>
-                  </a:txBody>
-                  <a:tcPr>
-                    <a:solidFill>
-                      <a:schemeClr val="bg1"/>
-                    </a:solidFill>
-                  </a:tcPr>
-                </a:tc>
-                <a:extLst>
-                  <a:ext uri="{0D108BD9-81ED-4DB2-BD59-A6C34878D82A}">
-                    <a16:rowId xmlns:a16="http://schemas.microsoft.com/office/drawing/2014/main" val="937412184"/>
-                  </a:ext>
-                </a:extLst>
-              </a:tr>
-              <a:tr h="859536">
-                <a:tc>
-                  <a:txBody>
-                    <a:bodyPr/>
-                    <a:lstStyle/>
-                    <a:p>
-                      <a:pPr latinLnBrk="1"/>
-                      <a:r>
-                        <a:rPr lang="en-US" altLang="ko-KR" sz="3600" dirty="0"/>
-                        <a:t>64</a:t>
-                      </a:r>
-                      <a:endParaRPr lang="ko-KR" altLang="en-US" sz="3600" dirty="0"/>
-                    </a:p>
-                  </a:txBody>
-                  <a:tcPr>
-                    <a:solidFill>
-                      <a:schemeClr val="bg1"/>
-                    </a:solidFill>
-                  </a:tcPr>
-                </a:tc>
-                <a:tc>
-                  <a:txBody>
-                    <a:bodyPr/>
-                    <a:lstStyle/>
-                    <a:p>
-                      <a:pPr algn="r" latinLnBrk="1"/>
-                      <a:r>
-                        <a:rPr lang="en-US" altLang="ko-KR" sz="3600" dirty="0"/>
-                        <a:t>1</a:t>
-                      </a:r>
-                      <a:endParaRPr lang="ko-KR" altLang="en-US" sz="3600" dirty="0"/>
-                    </a:p>
-                  </a:txBody>
-                  <a:tcPr>
-                    <a:solidFill>
-                      <a:schemeClr val="bg1"/>
-                    </a:solidFill>
-                  </a:tcPr>
-                </a:tc>
-                <a:extLst>
-                  <a:ext uri="{0D108BD9-81ED-4DB2-BD59-A6C34878D82A}">
-                    <a16:rowId xmlns:a16="http://schemas.microsoft.com/office/drawing/2014/main" val="804384951"/>
-                  </a:ext>
-                </a:extLst>
-              </a:tr>
-              <a:tr h="859536">
-                <a:tc>
-                  <a:txBody>
-                    <a:bodyPr/>
-                    <a:lstStyle/>
-                    <a:p>
-                      <a:pPr latinLnBrk="1"/>
-                      <a:r>
-                        <a:rPr lang="en-US" altLang="ko-KR" sz="3600" dirty="0"/>
-                        <a:t>48</a:t>
-                      </a:r>
-                      <a:endParaRPr lang="ko-KR" altLang="en-US" sz="3600" dirty="0"/>
-                    </a:p>
-                  </a:txBody>
-                  <a:tcPr>
-                    <a:solidFill>
-                      <a:schemeClr val="bg1"/>
-                    </a:solidFill>
-                  </a:tcPr>
-                </a:tc>
-                <a:tc>
-                  <a:txBody>
-                    <a:bodyPr/>
-                    <a:lstStyle/>
-                    <a:p>
-                      <a:pPr algn="r" latinLnBrk="1"/>
-                      <a:r>
-                        <a:rPr lang="en-US" altLang="ko-KR" sz="3600" dirty="0"/>
-                        <a:t>2</a:t>
-                      </a:r>
-                      <a:endParaRPr lang="ko-KR" altLang="en-US" sz="3600" dirty="0"/>
-                    </a:p>
-                  </a:txBody>
-                  <a:tcPr>
-                    <a:solidFill>
-                      <a:schemeClr val="bg1"/>
-                    </a:solidFill>
-                  </a:tcPr>
-                </a:tc>
-                <a:extLst>
-                  <a:ext uri="{0D108BD9-81ED-4DB2-BD59-A6C34878D82A}">
-                    <a16:rowId xmlns:a16="http://schemas.microsoft.com/office/drawing/2014/main" val="3188155959"/>
-                  </a:ext>
-                </a:extLst>
-              </a:tr>
-            </a:tbl>
-          </a:graphicData>
-        </a:graphic>
-      </p:graphicFrame>
-    </p:spTree>
-    <p:extLst>
-      <p:ext uri="{BB962C8B-B14F-4D97-AF65-F5344CB8AC3E}">
-        <p14:creationId xmlns:p14="http://schemas.microsoft.com/office/powerpoint/2010/main" val="2092208707"/>
-      </p:ext>
-    </p:extLst>
-  </p:cSld>
-  <p:clrMapOvr>
-    <a:masterClrMapping/>
-  </p:clrMapOvr>
-  <mc:AlternateContent xmlns:mc="http://schemas.openxmlformats.org/markup-compatibility/2006" xmlns:p159="http://schemas.microsoft.com/office/powerpoint/2015/09/main">
-    <mc:Choice Requires="p159">
-      <p:transition xmlns:p14="http://schemas.microsoft.com/office/powerpoint/2010/main" p14:dur="300">
-        <p159:morph option="byChar"/>
-      </p:transition>
-    </mc:Choice>
-    <mc:Fallback xmlns="">
-      <p:transition>
-        <p:fade/>
-      </p:transition>
-    </mc:Fallback>
-  </mc:AlternateContent>
-</p:sld>
-</file>
-
 <file path=ppt/slides/slide6.xml><?xml version="1.0" encoding="utf-8"?>
 <p:sld xmlns:a="http://schemas.openxmlformats.org/drawingml/2006/main" xmlns:r="http://schemas.openxmlformats.org/officeDocument/2006/relationships" xmlns:p="http://schemas.openxmlformats.org/presentationml/2006/main">
   <p:cSld>
@@ -5233,7 +5871,7 @@
             </a:r>
             <a:r>
               <a:rPr lang="en-US" altLang="ko-KR" dirty="0"/>
-              <a:t>2086</a:t>
+              <a:t>1913</a:t>
             </a:r>
             <a:r>
               <a:rPr lang="ko-KR" altLang="en-US" dirty="0"/>
@@ -5245,7 +5883,7 @@
             </a:r>
             <a:r>
               <a:rPr lang="ko-KR" altLang="en-US" dirty="0"/>
-              <a:t>피보나치 수의 합</a:t>
+              <a:t>달팽이</a:t>
             </a:r>
           </a:p>
         </p:txBody>
@@ -5253,7 +5891,7 @@
     </p:spTree>
     <p:extLst>
       <p:ext uri="{BB962C8B-B14F-4D97-AF65-F5344CB8AC3E}">
-        <p14:creationId xmlns:p14="http://schemas.microsoft.com/office/powerpoint/2010/main" val="3544114982"/>
+        <p14:creationId xmlns:p14="http://schemas.microsoft.com/office/powerpoint/2010/main" val="3572536769"/>
       </p:ext>
     </p:extLst>
   </p:cSld>
@@ -5319,10 +5957,10 @@
       </p:sp>
       <p:pic>
         <p:nvPicPr>
-          <p:cNvPr id="2" name="그림 1">
+          <p:cNvPr id="5" name="그림 4">
             <a:extLst>
               <a:ext uri="{FF2B5EF4-FFF2-40B4-BE49-F238E27FC236}">
-                <a16:creationId xmlns:a16="http://schemas.microsoft.com/office/drawing/2014/main" id="{551EC926-2B8E-4015-A003-89BDB6AF112B}"/>
+                <a16:creationId xmlns:a16="http://schemas.microsoft.com/office/drawing/2014/main" id="{870771AB-6122-4F3A-B666-BDDF1758DB58}"/>
               </a:ext>
             </a:extLst>
           </p:cNvPr>
@@ -5339,8 +5977,8 @@
         </p:blipFill>
         <p:spPr>
           <a:xfrm>
-            <a:off x="495300" y="1305687"/>
-            <a:ext cx="8153400" cy="4514850"/>
+            <a:off x="461962" y="352425"/>
+            <a:ext cx="8220075" cy="6153150"/>
           </a:xfrm>
           <a:prstGeom prst="rect">
             <a:avLst/>
@@ -5350,7 +5988,7 @@
     </p:spTree>
     <p:extLst>
       <p:ext uri="{BB962C8B-B14F-4D97-AF65-F5344CB8AC3E}">
-        <p14:creationId xmlns:p14="http://schemas.microsoft.com/office/powerpoint/2010/main" val="459164807"/>
+        <p14:creationId xmlns:p14="http://schemas.microsoft.com/office/powerpoint/2010/main" val="3524049955"/>
       </p:ext>
     </p:extLst>
   </p:cSld>
@@ -5410,247 +6048,44 @@
           <a:bodyPr/>
           <a:lstStyle/>
           <a:p>
-            <a:r>
-              <a:rPr lang="ko-KR" altLang="en-US" dirty="0"/>
-              <a:t>예제</a:t>
-            </a:r>
+            <a:endParaRPr lang="ko-KR" altLang="en-US"/>
           </a:p>
         </p:txBody>
       </p:sp>
-      <p:graphicFrame>
-        <p:nvGraphicFramePr>
-          <p:cNvPr id="3" name="표 2">
+      <p:pic>
+        <p:nvPicPr>
+          <p:cNvPr id="2" name="그림 1">
             <a:extLst>
               <a:ext uri="{FF2B5EF4-FFF2-40B4-BE49-F238E27FC236}">
-                <a16:creationId xmlns:a16="http://schemas.microsoft.com/office/drawing/2014/main" id="{7B226D33-72C0-43C3-933A-6784C48F14BC}"/>
+                <a16:creationId xmlns:a16="http://schemas.microsoft.com/office/drawing/2014/main" id="{625D2C0C-8666-477B-A0B5-AE37307167C4}"/>
               </a:ext>
             </a:extLst>
           </p:cNvPr>
-          <p:cNvGraphicFramePr>
-            <a:graphicFrameLocks noGrp="1"/>
-          </p:cNvGraphicFramePr>
-          <p:nvPr>
-            <p:extLst>
-              <p:ext uri="{D42A27DB-BD31-4B8C-83A1-F6EECF244321}">
-                <p14:modId xmlns:p14="http://schemas.microsoft.com/office/powerpoint/2010/main" val="610155548"/>
-              </p:ext>
-            </p:extLst>
-          </p:nvPr>
-        </p:nvGraphicFramePr>
-        <p:xfrm>
-          <a:off x="1279075" y="2511552"/>
-          <a:ext cx="6096000" cy="3438144"/>
-        </p:xfrm>
-        <a:graphic>
-          <a:graphicData uri="http://schemas.openxmlformats.org/drawingml/2006/table">
-            <a:tbl>
-              <a:tblPr>
-                <a:tableStyleId>{5940675A-B579-460E-94D1-54222C63F5DA}</a:tableStyleId>
-              </a:tblPr>
-              <a:tblGrid>
-                <a:gridCol w="3048000">
-                  <a:extLst>
-                    <a:ext uri="{9D8B030D-6E8A-4147-A177-3AD203B41FA5}">
-                      <a16:colId xmlns:a16="http://schemas.microsoft.com/office/drawing/2014/main" val="2007221651"/>
-                    </a:ext>
-                  </a:extLst>
-                </a:gridCol>
-                <a:gridCol w="3048000">
-                  <a:extLst>
-                    <a:ext uri="{9D8B030D-6E8A-4147-A177-3AD203B41FA5}">
-                      <a16:colId xmlns:a16="http://schemas.microsoft.com/office/drawing/2014/main" val="1094752133"/>
-                    </a:ext>
-                  </a:extLst>
-                </a:gridCol>
-              </a:tblGrid>
-              <a:tr h="859536">
-                <a:tc>
-                  <a:txBody>
-                    <a:bodyPr/>
-                    <a:lstStyle/>
-                    <a:p>
-                      <a:pPr latinLnBrk="1"/>
-                      <a:r>
-                        <a:rPr lang="en-US" altLang="ko-KR" sz="3600" dirty="0"/>
-                        <a:t>4 10</a:t>
-                      </a:r>
-                      <a:endParaRPr lang="ko-KR" altLang="en-US" sz="3600" dirty="0"/>
-                    </a:p>
-                  </a:txBody>
-                  <a:tcPr>
-                    <a:solidFill>
-                      <a:schemeClr val="bg1"/>
-                    </a:solidFill>
-                  </a:tcPr>
-                </a:tc>
-                <a:tc>
-                  <a:txBody>
-                    <a:bodyPr/>
-                    <a:lstStyle/>
-                    <a:p>
-                      <a:pPr algn="r" latinLnBrk="1"/>
-                      <a:r>
-                        <a:rPr lang="en-US" altLang="ko-KR" sz="3600" dirty="0"/>
-                        <a:t>139</a:t>
-                      </a:r>
-                      <a:endParaRPr lang="ko-KR" altLang="en-US" sz="3600" dirty="0"/>
-                    </a:p>
-                  </a:txBody>
-                  <a:tcPr>
-                    <a:solidFill>
-                      <a:schemeClr val="bg1"/>
-                    </a:solidFill>
-                  </a:tcPr>
-                </a:tc>
-                <a:extLst>
-                  <a:ext uri="{0D108BD9-81ED-4DB2-BD59-A6C34878D82A}">
-                    <a16:rowId xmlns:a16="http://schemas.microsoft.com/office/drawing/2014/main" val="1791057616"/>
-                  </a:ext>
-                </a:extLst>
-              </a:tr>
-              <a:tr h="859536">
-                <a:tc>
-                  <a:txBody>
-                    <a:bodyPr/>
-                    <a:lstStyle/>
-                    <a:p>
-                      <a:pPr latinLnBrk="1"/>
-                      <a:r>
-                        <a:rPr lang="en-US" altLang="ko-KR" sz="3600" dirty="0"/>
-                        <a:t>1 5</a:t>
-                      </a:r>
-                      <a:endParaRPr lang="ko-KR" altLang="en-US" sz="3600" dirty="0"/>
-                    </a:p>
-                  </a:txBody>
-                  <a:tcPr>
-                    <a:solidFill>
-                      <a:schemeClr val="bg1"/>
-                    </a:solidFill>
-                  </a:tcPr>
-                </a:tc>
-                <a:tc>
-                  <a:txBody>
-                    <a:bodyPr/>
-                    <a:lstStyle/>
-                    <a:p>
-                      <a:pPr algn="r" latinLnBrk="1"/>
-                      <a:r>
-                        <a:rPr lang="en-US" altLang="ko-KR" sz="3600" dirty="0"/>
-                        <a:t>12</a:t>
-                      </a:r>
-                      <a:endParaRPr lang="ko-KR" altLang="en-US" sz="3600" dirty="0"/>
-                    </a:p>
-                  </a:txBody>
-                  <a:tcPr>
-                    <a:solidFill>
-                      <a:schemeClr val="bg1"/>
-                    </a:solidFill>
-                  </a:tcPr>
-                </a:tc>
-                <a:extLst>
-                  <a:ext uri="{0D108BD9-81ED-4DB2-BD59-A6C34878D82A}">
-                    <a16:rowId xmlns:a16="http://schemas.microsoft.com/office/drawing/2014/main" val="937412184"/>
-                  </a:ext>
-                </a:extLst>
-              </a:tr>
-              <a:tr h="859536">
-                <a:tc>
-                  <a:txBody>
-                    <a:bodyPr/>
-                    <a:lstStyle/>
-                    <a:p>
-                      <a:pPr latinLnBrk="1"/>
-                      <a:r>
-                        <a:rPr lang="en-US" altLang="ko-KR" sz="3600" dirty="0"/>
-                        <a:t>5 7</a:t>
-                      </a:r>
-                      <a:endParaRPr lang="ko-KR" altLang="en-US" sz="3600" dirty="0"/>
-                    </a:p>
-                  </a:txBody>
-                  <a:tcPr>
-                    <a:solidFill>
-                      <a:schemeClr val="bg1"/>
-                    </a:solidFill>
-                  </a:tcPr>
-                </a:tc>
-                <a:tc>
-                  <a:txBody>
-                    <a:bodyPr/>
-                    <a:lstStyle/>
-                    <a:p>
-                      <a:pPr algn="r" latinLnBrk="1"/>
-                      <a:r>
-                        <a:rPr lang="en-US" altLang="ko-KR" sz="3600" dirty="0"/>
-                        <a:t>26</a:t>
-                      </a:r>
-                      <a:endParaRPr lang="ko-KR" altLang="en-US" sz="3600" dirty="0"/>
-                    </a:p>
-                  </a:txBody>
-                  <a:tcPr>
-                    <a:solidFill>
-                      <a:schemeClr val="bg1"/>
-                    </a:solidFill>
-                  </a:tcPr>
-                </a:tc>
-                <a:extLst>
-                  <a:ext uri="{0D108BD9-81ED-4DB2-BD59-A6C34878D82A}">
-                    <a16:rowId xmlns:a16="http://schemas.microsoft.com/office/drawing/2014/main" val="804384951"/>
-                  </a:ext>
-                </a:extLst>
-              </a:tr>
-              <a:tr h="859536">
-                <a:tc>
-                  <a:txBody>
-                    <a:bodyPr/>
-                    <a:lstStyle/>
-                    <a:p>
-                      <a:pPr latinLnBrk="1"/>
-                      <a:r>
-                        <a:rPr lang="en-US" altLang="ko-KR" sz="3600" dirty="0"/>
-                        <a:t>3 9</a:t>
-                      </a:r>
-                      <a:endParaRPr lang="ko-KR" altLang="en-US" sz="3600" dirty="0"/>
-                    </a:p>
-                  </a:txBody>
-                  <a:tcPr>
-                    <a:solidFill>
-                      <a:schemeClr val="bg1"/>
-                    </a:solidFill>
-                  </a:tcPr>
-                </a:tc>
-                <a:tc>
-                  <a:txBody>
-                    <a:bodyPr/>
-                    <a:lstStyle/>
-                    <a:p>
-                      <a:pPr algn="r" latinLnBrk="1"/>
-                      <a:r>
-                        <a:rPr lang="en-US" altLang="ko-KR" sz="3600" dirty="0"/>
-                        <a:t>86</a:t>
-                      </a:r>
-                      <a:endParaRPr lang="ko-KR" altLang="en-US" sz="3600" dirty="0"/>
-                    </a:p>
-                  </a:txBody>
-                  <a:tcPr>
-                    <a:solidFill>
-                      <a:schemeClr val="bg1"/>
-                    </a:solidFill>
-                  </a:tcPr>
-                </a:tc>
-                <a:extLst>
-                  <a:ext uri="{0D108BD9-81ED-4DB2-BD59-A6C34878D82A}">
-                    <a16:rowId xmlns:a16="http://schemas.microsoft.com/office/drawing/2014/main" val="3188155959"/>
-                  </a:ext>
-                </a:extLst>
-              </a:tr>
-            </a:tbl>
-          </a:graphicData>
-        </a:graphic>
-      </p:graphicFrame>
+          <p:cNvPicPr>
+            <a:picLocks noChangeAspect="1"/>
+          </p:cNvPicPr>
+          <p:nvPr/>
+        </p:nvPicPr>
+        <p:blipFill>
+          <a:blip r:embed="rId2"/>
+          <a:stretch>
+            <a:fillRect/>
+          </a:stretch>
+        </p:blipFill>
+        <p:spPr>
+          <a:xfrm>
+            <a:off x="452437" y="1947862"/>
+            <a:ext cx="8239125" cy="2962275"/>
+          </a:xfrm>
+          <a:prstGeom prst="rect">
+            <a:avLst/>
+          </a:prstGeom>
+        </p:spPr>
+      </p:pic>
     </p:spTree>
     <p:extLst>
       <p:ext uri="{BB962C8B-B14F-4D97-AF65-F5344CB8AC3E}">
-        <p14:creationId xmlns:p14="http://schemas.microsoft.com/office/powerpoint/2010/main" val="4053553878"/>
+        <p14:creationId xmlns:p14="http://schemas.microsoft.com/office/powerpoint/2010/main" val="439579981"/>
       </p:ext>
     </p:extLst>
   </p:cSld>
@@ -5705,44 +6140,133 @@
             <p:ph type="body" sz="quarter" idx="10"/>
           </p:nvPr>
         </p:nvSpPr>
-        <p:spPr>
-          <a:xfrm>
-            <a:off x="364676" y="3005206"/>
-            <a:ext cx="8414647" cy="847587"/>
-          </a:xfrm>
-        </p:spPr>
+        <p:spPr/>
         <p:txBody>
           <a:bodyPr/>
           <a:lstStyle/>
           <a:p>
-            <a:pPr algn="ctr"/>
             <a:r>
               <a:rPr lang="ko-KR" altLang="en-US" dirty="0"/>
-              <a:t>백준 </a:t>
-            </a:r>
-            <a:r>
-              <a:rPr lang="en-US" altLang="ko-KR" dirty="0"/>
-              <a:t>1100</a:t>
-            </a:r>
-            <a:r>
-              <a:rPr lang="ko-KR" altLang="en-US" dirty="0"/>
-              <a:t>번 </a:t>
-            </a:r>
-            <a:r>
-              <a:rPr lang="en-US" altLang="ko-KR" dirty="0"/>
-              <a:t>– </a:t>
-            </a:r>
-            <a:r>
-              <a:rPr lang="ko-KR" altLang="en-US" dirty="0"/>
-              <a:t>하얀 칸</a:t>
+              <a:t>예제</a:t>
             </a:r>
           </a:p>
         </p:txBody>
       </p:sp>
+      <p:graphicFrame>
+        <p:nvGraphicFramePr>
+          <p:cNvPr id="3" name="표 2">
+            <a:extLst>
+              <a:ext uri="{FF2B5EF4-FFF2-40B4-BE49-F238E27FC236}">
+                <a16:creationId xmlns:a16="http://schemas.microsoft.com/office/drawing/2014/main" id="{AA297D23-2656-43E6-948D-530B44AFF3AD}"/>
+              </a:ext>
+            </a:extLst>
+          </p:cNvPr>
+          <p:cNvGraphicFramePr>
+            <a:graphicFrameLocks noGrp="1"/>
+          </p:cNvGraphicFramePr>
+          <p:nvPr>
+            <p:extLst>
+              <p:ext uri="{D42A27DB-BD31-4B8C-83A1-F6EECF244321}">
+                <p14:modId xmlns:p14="http://schemas.microsoft.com/office/powerpoint/2010/main" val="3585833811"/>
+              </p:ext>
+            </p:extLst>
+          </p:nvPr>
+        </p:nvGraphicFramePr>
+        <p:xfrm>
+          <a:off x="1279075" y="2511552"/>
+          <a:ext cx="6096000" cy="3438144"/>
+        </p:xfrm>
+        <a:graphic>
+          <a:graphicData uri="http://schemas.openxmlformats.org/drawingml/2006/table">
+            <a:tbl>
+              <a:tblPr>
+                <a:tableStyleId>{5940675A-B579-460E-94D1-54222C63F5DA}</a:tableStyleId>
+              </a:tblPr>
+              <a:tblGrid>
+                <a:gridCol w="3048000">
+                  <a:extLst>
+                    <a:ext uri="{9D8B030D-6E8A-4147-A177-3AD203B41FA5}">
+                      <a16:colId xmlns:a16="http://schemas.microsoft.com/office/drawing/2014/main" val="2007221651"/>
+                    </a:ext>
+                  </a:extLst>
+                </a:gridCol>
+                <a:gridCol w="3048000">
+                  <a:extLst>
+                    <a:ext uri="{9D8B030D-6E8A-4147-A177-3AD203B41FA5}">
+                      <a16:colId xmlns:a16="http://schemas.microsoft.com/office/drawing/2014/main" val="1094752133"/>
+                    </a:ext>
+                  </a:extLst>
+                </a:gridCol>
+              </a:tblGrid>
+              <a:tr h="3438144">
+                <a:tc>
+                  <a:txBody>
+                    <a:bodyPr/>
+                    <a:lstStyle/>
+                    <a:p>
+                      <a:pPr latinLnBrk="1"/>
+                      <a:r>
+                        <a:rPr lang="en-US" altLang="ko-KR" sz="2400" b="0" i="0" u="none" strike="noStrike" kern="1200" dirty="0">
+                          <a:solidFill>
+                            <a:schemeClr val="tx1"/>
+                          </a:solidFill>
+                          <a:effectLst/>
+                          <a:latin typeface="+mn-lt"/>
+                          <a:ea typeface="+mn-ea"/>
+                          <a:cs typeface="+mn-cs"/>
+                        </a:rPr>
+                        <a:t>7 35</a:t>
+                      </a:r>
+                      <a:endParaRPr lang="ko-KR" altLang="en-US" sz="2400" b="1" dirty="0"/>
+                    </a:p>
+                  </a:txBody>
+                  <a:tcPr>
+                    <a:solidFill>
+                      <a:schemeClr val="bg1"/>
+                    </a:solidFill>
+                  </a:tcPr>
+                </a:tc>
+                <a:tc>
+                  <a:txBody>
+                    <a:bodyPr/>
+                    <a:lstStyle/>
+                    <a:p>
+                      <a:pPr algn="r" latinLnBrk="1"/>
+                      <a:r>
+                        <a:rPr lang="en-US" altLang="ko-KR" sz="2400" b="0" i="0" u="none" strike="noStrike" kern="1200" dirty="0">
+                          <a:solidFill>
+                            <a:schemeClr val="tx1"/>
+                          </a:solidFill>
+                          <a:effectLst/>
+                          <a:latin typeface="+mn-lt"/>
+                          <a:ea typeface="+mn-ea"/>
+                          <a:cs typeface="+mn-cs"/>
+                        </a:rPr>
+                        <a:t>49 26 27 28 29 30 31 48 25 10 11 12 13 32 47 24 9 2 3 14 33 46 23 8 1 4 15 34 45 22 7 6 5 16 35 44 21 20 19 18 17 36 43 42 41 40 39 38 37 5 7</a:t>
+                      </a:r>
+                      <a:endParaRPr lang="ko-KR" altLang="en-US" sz="2400" dirty="0"/>
+                    </a:p>
+                  </a:txBody>
+                  <a:tcPr>
+                    <a:solidFill>
+                      <a:schemeClr val="bg1"/>
+                    </a:solidFill>
+                  </a:tcPr>
+                </a:tc>
+                <a:extLst>
+                  <a:ext uri="{0D108BD9-81ED-4DB2-BD59-A6C34878D82A}">
+                    <a16:rowId xmlns:a16="http://schemas.microsoft.com/office/drawing/2014/main" val="1791057616"/>
+                  </a:ext>
+                </a:extLst>
+              </a:tr>
+            </a:tbl>
+          </a:graphicData>
+        </a:graphic>
+      </p:graphicFrame>
     </p:spTree>
     <p:extLst>
       <p:ext uri="{BB962C8B-B14F-4D97-AF65-F5344CB8AC3E}">
-        <p14:creationId xmlns:p14="http://schemas.microsoft.com/office/powerpoint/2010/main" val="2794658932"/>
+        <p14:creationId xmlns:p14="http://schemas.microsoft.com/office/powerpoint/2010/main" val="618458695"/>
       </p:ext>
     </p:extLst>
   </p:cSld>

</xml_diff>

<commit_message>
6th week add example code add
</commit_message>
<xml_diff>
--- a/5th week 2.pptx
+++ b/5th week 2.pptx
@@ -147,13 +147,145 @@
 <file path=ppt/revisionInfo.xml><?xml version="1.0" encoding="utf-8"?>
 <p1510:revInfo xmlns:a="http://schemas.openxmlformats.org/drawingml/2006/main" xmlns:r="http://schemas.openxmlformats.org/officeDocument/2006/relationships" xmlns:p1510="http://schemas.microsoft.com/office/powerpoint/2015/10/main">
   <p1510:revLst>
-    <p1510:client id="{CBAE06D3-3B81-449F-A7F3-FAD05C0BB75D}" v="404" dt="2018-05-27T10:14:07.291"/>
+    <p1510:client id="{10132A40-9C80-4074-B33A-E8B17A431EE9}" v="5" dt="2018-05-31T05:15:37.442"/>
   </p1510:revLst>
 </p1510:revInfo>
 </file>
 
 <file path=ppt/changesInfos/changesInfo1.xml><?xml version="1.0" encoding="utf-8"?>
 <pc:chgInfo xmlns:a="http://schemas.openxmlformats.org/drawingml/2006/main" xmlns:r="http://schemas.openxmlformats.org/officeDocument/2006/relationships" xmlns:ac="http://schemas.microsoft.com/office/drawing/2013/main/command" xmlns:pc="http://schemas.microsoft.com/office/powerpoint/2013/main/command">
+  <pc:docChgLst>
+    <pc:chgData name="Jeong SangWoo" userId="8b3882065fa5c9e6" providerId="LiveId" clId="{CBAE06D3-3B81-449F-A7F3-FAD05C0BB75D}"/>
+    <pc:docChg chg="undo custSel addSld delSld modSld">
+      <pc:chgData name="Jeong SangWoo" userId="8b3882065fa5c9e6" providerId="LiveId" clId="{CBAE06D3-3B81-449F-A7F3-FAD05C0BB75D}" dt="2018-05-27T10:14:07.291" v="403" actId="2696"/>
+      <pc:docMkLst>
+        <pc:docMk/>
+      </pc:docMkLst>
+      <pc:sldChg chg="modSp">
+        <pc:chgData name="Jeong SangWoo" userId="8b3882065fa5c9e6" providerId="LiveId" clId="{CBAE06D3-3B81-449F-A7F3-FAD05C0BB75D}" dt="2018-05-27T09:50:16.464" v="27" actId="2696"/>
+        <pc:sldMkLst>
+          <pc:docMk/>
+          <pc:sldMk cId="3655051314" sldId="256"/>
+        </pc:sldMkLst>
+        <pc:spChg chg="mod">
+          <ac:chgData name="Jeong SangWoo" userId="8b3882065fa5c9e6" providerId="LiveId" clId="{CBAE06D3-3B81-449F-A7F3-FAD05C0BB75D}" dt="2018-05-27T09:50:04.172" v="9" actId="20577"/>
+          <ac:spMkLst>
+            <pc:docMk/>
+            <pc:sldMk cId="3655051314" sldId="256"/>
+            <ac:spMk id="2" creationId="{87F2F9A8-35A7-4878-8B78-89685E5866F5}"/>
+          </ac:spMkLst>
+        </pc:spChg>
+        <pc:spChg chg="mod">
+          <ac:chgData name="Jeong SangWoo" userId="8b3882065fa5c9e6" providerId="LiveId" clId="{CBAE06D3-3B81-449F-A7F3-FAD05C0BB75D}" dt="2018-05-27T09:50:16.464" v="27" actId="2696"/>
+          <ac:spMkLst>
+            <pc:docMk/>
+            <pc:sldMk cId="3655051314" sldId="256"/>
+            <ac:spMk id="3" creationId="{DE6C901A-D1F1-4F84-82A0-6259DA1FA2B3}"/>
+          </ac:spMkLst>
+        </pc:spChg>
+      </pc:sldChg>
+      <pc:sldChg chg="addSp delSp modSp add del">
+        <pc:chgData name="Jeong SangWoo" userId="8b3882065fa5c9e6" providerId="LiveId" clId="{CBAE06D3-3B81-449F-A7F3-FAD05C0BB75D}" dt="2018-05-27T09:52:07.050" v="47" actId="2696"/>
+        <pc:sldMkLst>
+          <pc:docMk/>
+          <pc:sldMk cId="2828471371" sldId="257"/>
+        </pc:sldMkLst>
+        <pc:grpChg chg="add del mod">
+          <ac:chgData name="Jeong SangWoo" userId="8b3882065fa5c9e6" providerId="LiveId" clId="{CBAE06D3-3B81-449F-A7F3-FAD05C0BB75D}" dt="2018-05-27T09:50:25.332" v="32" actId="478"/>
+          <ac:grpSpMkLst>
+            <pc:docMk/>
+            <pc:sldMk cId="2828471371" sldId="257"/>
+            <ac:grpSpMk id="8" creationId="{A85BE140-0EE9-44DF-B619-0E61E4630013}"/>
+          </ac:grpSpMkLst>
+        </pc:grpChg>
+        <pc:grpChg chg="add del mod">
+          <ac:chgData name="Jeong SangWoo" userId="8b3882065fa5c9e6" providerId="LiveId" clId="{CBAE06D3-3B81-449F-A7F3-FAD05C0BB75D}" dt="2018-05-27T09:50:25.332" v="32" actId="478"/>
+          <ac:grpSpMkLst>
+            <pc:docMk/>
+            <pc:sldMk cId="2828471371" sldId="257"/>
+            <ac:grpSpMk id="9" creationId="{60EF4181-1834-4E09-B6A0-C6E29400622B}"/>
+          </ac:grpSpMkLst>
+        </pc:grpChg>
+      </pc:sldChg>
+      <pc:sldChg chg="modSp add">
+        <pc:chgData name="Jeong SangWoo" userId="8b3882065fa5c9e6" providerId="LiveId" clId="{CBAE06D3-3B81-449F-A7F3-FAD05C0BB75D}" dt="2018-05-27T10:09:50.992" v="294" actId="2696"/>
+        <pc:sldMkLst>
+          <pc:docMk/>
+          <pc:sldMk cId="2794658932" sldId="382"/>
+        </pc:sldMkLst>
+        <pc:spChg chg="mod">
+          <ac:chgData name="Jeong SangWoo" userId="8b3882065fa5c9e6" providerId="LiveId" clId="{CBAE06D3-3B81-449F-A7F3-FAD05C0BB75D}" dt="2018-05-27T10:09:50.992" v="294" actId="2696"/>
+          <ac:spMkLst>
+            <pc:docMk/>
+            <pc:sldMk cId="2794658932" sldId="382"/>
+            <ac:spMk id="4" creationId="{EB0EBC6B-012A-4ACA-8760-6CC34C9635E0}"/>
+          </ac:spMkLst>
+        </pc:spChg>
+      </pc:sldChg>
+      <pc:sldChg chg="addSp add">
+        <pc:chgData name="Jeong SangWoo" userId="8b3882065fa5c9e6" providerId="LiveId" clId="{CBAE06D3-3B81-449F-A7F3-FAD05C0BB75D}" dt="2018-05-27T10:10:05.382" v="295" actId="2696"/>
+        <pc:sldMkLst>
+          <pc:docMk/>
+          <pc:sldMk cId="3647005457" sldId="383"/>
+        </pc:sldMkLst>
+        <pc:picChg chg="add">
+          <ac:chgData name="Jeong SangWoo" userId="8b3882065fa5c9e6" providerId="LiveId" clId="{CBAE06D3-3B81-449F-A7F3-FAD05C0BB75D}" dt="2018-05-27T10:10:05.382" v="295" actId="2696"/>
+          <ac:picMkLst>
+            <pc:docMk/>
+            <pc:sldMk cId="3647005457" sldId="383"/>
+            <ac:picMk id="2" creationId="{94A30234-8284-40C9-BEC4-92DAA7D97796}"/>
+          </ac:picMkLst>
+        </pc:picChg>
+      </pc:sldChg>
+      <pc:sldChg chg="addSp modSp add">
+        <pc:chgData name="Jeong SangWoo" userId="8b3882065fa5c9e6" providerId="LiveId" clId="{CBAE06D3-3B81-449F-A7F3-FAD05C0BB75D}" dt="2018-05-27T10:12:13.971" v="401" actId="20577"/>
+        <pc:sldMkLst>
+          <pc:docMk/>
+          <pc:sldMk cId="1921309914" sldId="384"/>
+        </pc:sldMkLst>
+        <pc:spChg chg="mod">
+          <ac:chgData name="Jeong SangWoo" userId="8b3882065fa5c9e6" providerId="LiveId" clId="{CBAE06D3-3B81-449F-A7F3-FAD05C0BB75D}" dt="2018-05-27T10:10:22.541" v="302" actId="20577"/>
+          <ac:spMkLst>
+            <pc:docMk/>
+            <pc:sldMk cId="1921309914" sldId="384"/>
+            <ac:spMk id="4" creationId="{EB0EBC6B-012A-4ACA-8760-6CC34C9635E0}"/>
+          </ac:spMkLst>
+        </pc:spChg>
+        <pc:graphicFrameChg chg="add mod modGraphic">
+          <ac:chgData name="Jeong SangWoo" userId="8b3882065fa5c9e6" providerId="LiveId" clId="{CBAE06D3-3B81-449F-A7F3-FAD05C0BB75D}" dt="2018-05-27T10:12:13.971" v="401" actId="20577"/>
+          <ac:graphicFrameMkLst>
+            <pc:docMk/>
+            <pc:sldMk cId="1921309914" sldId="384"/>
+            <ac:graphicFrameMk id="3" creationId="{AA297D23-2656-43E6-948D-530B44AFF3AD}"/>
+          </ac:graphicFrameMkLst>
+        </pc:graphicFrameChg>
+      </pc:sldChg>
+    </pc:docChg>
+  </pc:docChgLst>
+  <pc:docChgLst>
+    <pc:chgData name="Jeong SangWoo" userId="8b3882065fa5c9e6" providerId="LiveId" clId="{C1AC0F52-5356-4E5E-A33B-7BBA7A5173E9}"/>
+    <pc:docChg chg="undo custSel addSld delSld modSld">
+      <pc:chgData name="Jeong SangWoo" userId="8b3882065fa5c9e6" providerId="LiveId" clId="{C1AC0F52-5356-4E5E-A33B-7BBA7A5173E9}" dt="2018-05-21T04:31:10.286" v="4457" actId="207"/>
+      <pc:docMkLst>
+        <pc:docMk/>
+      </pc:docMkLst>
+      <pc:sldChg chg="modSp">
+        <pc:chgData name="Jeong SangWoo" userId="8b3882065fa5c9e6" providerId="LiveId" clId="{C1AC0F52-5356-4E5E-A33B-7BBA7A5173E9}" dt="2018-05-21T03:57:32.491" v="1557" actId="20577"/>
+        <pc:sldMkLst>
+          <pc:docMk/>
+          <pc:sldMk cId="3655051314" sldId="256"/>
+        </pc:sldMkLst>
+        <pc:spChg chg="mod">
+          <ac:chgData name="Jeong SangWoo" userId="8b3882065fa5c9e6" providerId="LiveId" clId="{C1AC0F52-5356-4E5E-A33B-7BBA7A5173E9}" dt="2018-05-21T03:57:32.491" v="1557" actId="20577"/>
+          <ac:spMkLst>
+            <pc:docMk/>
+            <pc:sldMk cId="3655051314" sldId="256"/>
+            <ac:spMk id="3" creationId="{DE6C901A-D1F1-4F84-82A0-6259DA1FA2B3}"/>
+          </ac:spMkLst>
+        </pc:spChg>
+      </pc:sldChg>
+    </pc:docChg>
+  </pc:docChgLst>
   <pc:docChgLst>
     <pc:chgData name="Jeong SangWoo" userId="8b3882065fa5c9e6" providerId="LiveId" clId="{011F9E2D-D950-44AA-B44F-C45AD29B05C9}"/>
     <pc:docChg chg="undo custSel addSld delSld modSld sldOrd">
@@ -305,28 +437,20 @@
     </pc:docChg>
   </pc:docChgLst>
   <pc:docChgLst>
-    <pc:chgData name="Jeong SangWoo" userId="8b3882065fa5c9e6" providerId="LiveId" clId="{CBAE06D3-3B81-449F-A7F3-FAD05C0BB75D}"/>
+    <pc:chgData name="Jeong SangWoo" userId="8b3882065fa5c9e6" providerId="LiveId" clId="{30F86056-4561-4F85-80D8-2B9537299174}"/>
     <pc:docChg chg="undo custSel addSld delSld modSld">
-      <pc:chgData name="Jeong SangWoo" userId="8b3882065fa5c9e6" providerId="LiveId" clId="{CBAE06D3-3B81-449F-A7F3-FAD05C0BB75D}" dt="2018-05-27T10:14:07.291" v="403" actId="2696"/>
+      <pc:chgData name="Jeong SangWoo" userId="8b3882065fa5c9e6" providerId="LiveId" clId="{30F86056-4561-4F85-80D8-2B9537299174}" dt="2018-05-12T08:00:07.890" v="1445"/>
       <pc:docMkLst>
         <pc:docMk/>
       </pc:docMkLst>
       <pc:sldChg chg="modSp">
-        <pc:chgData name="Jeong SangWoo" userId="8b3882065fa5c9e6" providerId="LiveId" clId="{CBAE06D3-3B81-449F-A7F3-FAD05C0BB75D}" dt="2018-05-27T09:50:16.464" v="27" actId="2696"/>
+        <pc:chgData name="Jeong SangWoo" userId="8b3882065fa5c9e6" providerId="LiveId" clId="{30F86056-4561-4F85-80D8-2B9537299174}" dt="2018-05-12T05:42:48.390" v="207" actId="20577"/>
         <pc:sldMkLst>
           <pc:docMk/>
           <pc:sldMk cId="3655051314" sldId="256"/>
         </pc:sldMkLst>
         <pc:spChg chg="mod">
-          <ac:chgData name="Jeong SangWoo" userId="8b3882065fa5c9e6" providerId="LiveId" clId="{CBAE06D3-3B81-449F-A7F3-FAD05C0BB75D}" dt="2018-05-27T09:50:04.172" v="9" actId="20577"/>
-          <ac:spMkLst>
-            <pc:docMk/>
-            <pc:sldMk cId="3655051314" sldId="256"/>
-            <ac:spMk id="2" creationId="{87F2F9A8-35A7-4878-8B78-89685E5866F5}"/>
-          </ac:spMkLst>
-        </pc:spChg>
-        <pc:spChg chg="mod">
-          <ac:chgData name="Jeong SangWoo" userId="8b3882065fa5c9e6" providerId="LiveId" clId="{CBAE06D3-3B81-449F-A7F3-FAD05C0BB75D}" dt="2018-05-27T09:50:16.464" v="27" actId="2696"/>
+          <ac:chgData name="Jeong SangWoo" userId="8b3882065fa5c9e6" providerId="LiveId" clId="{30F86056-4561-4F85-80D8-2B9537299174}" dt="2018-05-12T05:42:48.390" v="207" actId="20577"/>
           <ac:spMkLst>
             <pc:docMk/>
             <pc:sldMk cId="3655051314" sldId="256"/>
@@ -334,386 +458,39 @@
           </ac:spMkLst>
         </pc:spChg>
       </pc:sldChg>
-      <pc:sldChg chg="addSp delSp modSp add del">
-        <pc:chgData name="Jeong SangWoo" userId="8b3882065fa5c9e6" providerId="LiveId" clId="{CBAE06D3-3B81-449F-A7F3-FAD05C0BB75D}" dt="2018-05-27T09:52:07.050" v="47" actId="2696"/>
+    </pc:docChg>
+  </pc:docChgLst>
+  <pc:docChgLst>
+    <pc:chgData name="Jeong SangWoo" userId="8b3882065fa5c9e6" providerId="LiveId" clId="{10132A40-9C80-4074-B33A-E8B17A431EE9}"/>
+    <pc:docChg chg="modSld">
+      <pc:chgData name="Jeong SangWoo" userId="8b3882065fa5c9e6" providerId="LiveId" clId="{10132A40-9C80-4074-B33A-E8B17A431EE9}" dt="2018-05-31T05:15:37.440" v="4"/>
+      <pc:docMkLst>
+        <pc:docMk/>
+      </pc:docMkLst>
+      <pc:sldChg chg="modSp">
+        <pc:chgData name="Jeong SangWoo" userId="8b3882065fa5c9e6" providerId="LiveId" clId="{10132A40-9C80-4074-B33A-E8B17A431EE9}" dt="2018-05-31T05:15:37.440" v="4"/>
         <pc:sldMkLst>
           <pc:docMk/>
-          <pc:sldMk cId="2828471371" sldId="257"/>
+          <pc:sldMk cId="3655051314" sldId="256"/>
         </pc:sldMkLst>
-        <pc:grpChg chg="add del mod">
-          <ac:chgData name="Jeong SangWoo" userId="8b3882065fa5c9e6" providerId="LiveId" clId="{CBAE06D3-3B81-449F-A7F3-FAD05C0BB75D}" dt="2018-05-27T09:50:25.332" v="32" actId="478"/>
-          <ac:grpSpMkLst>
-            <pc:docMk/>
-            <pc:sldMk cId="2828471371" sldId="257"/>
-            <ac:grpSpMk id="8" creationId="{A85BE140-0EE9-44DF-B619-0E61E4630013}"/>
-          </ac:grpSpMkLst>
-        </pc:grpChg>
-        <pc:grpChg chg="add del mod">
-          <ac:chgData name="Jeong SangWoo" userId="8b3882065fa5c9e6" providerId="LiveId" clId="{CBAE06D3-3B81-449F-A7F3-FAD05C0BB75D}" dt="2018-05-27T09:50:25.332" v="32" actId="478"/>
-          <ac:grpSpMkLst>
-            <pc:docMk/>
-            <pc:sldMk cId="2828471371" sldId="257"/>
-            <ac:grpSpMk id="9" creationId="{60EF4181-1834-4E09-B6A0-C6E29400622B}"/>
-          </ac:grpSpMkLst>
-        </pc:grpChg>
-      </pc:sldChg>
-      <pc:sldChg chg="del">
-        <pc:chgData name="Jeong SangWoo" userId="8b3882065fa5c9e6" providerId="LiveId" clId="{CBAE06D3-3B81-449F-A7F3-FAD05C0BB75D}" dt="2018-05-27T09:52:08.913" v="48" actId="2696"/>
-        <pc:sldMkLst>
-          <pc:docMk/>
-          <pc:sldMk cId="2747549357" sldId="374"/>
-        </pc:sldMkLst>
-      </pc:sldChg>
-      <pc:sldChg chg="addSp delSp modSp">
-        <pc:chgData name="Jeong SangWoo" userId="8b3882065fa5c9e6" providerId="LiveId" clId="{CBAE06D3-3B81-449F-A7F3-FAD05C0BB75D}" dt="2018-05-27T09:54:39.702" v="101" actId="1076"/>
-        <pc:sldMkLst>
-          <pc:docMk/>
-          <pc:sldMk cId="121322230" sldId="375"/>
-        </pc:sldMkLst>
-        <pc:spChg chg="add del">
-          <ac:chgData name="Jeong SangWoo" userId="8b3882065fa5c9e6" providerId="LiveId" clId="{CBAE06D3-3B81-449F-A7F3-FAD05C0BB75D}" dt="2018-05-27T09:52:46.741" v="83" actId="1076"/>
+        <pc:spChg chg="mod">
+          <ac:chgData name="Jeong SangWoo" userId="8b3882065fa5c9e6" providerId="LiveId" clId="{10132A40-9C80-4074-B33A-E8B17A431EE9}" dt="2018-05-31T05:15:37.440" v="4"/>
           <ac:spMkLst>
             <pc:docMk/>
-            <pc:sldMk cId="121322230" sldId="375"/>
-            <ac:spMk id="2" creationId="{93E89F17-41B1-42E3-88EA-5BD59B737BED}"/>
-          </ac:spMkLst>
-        </pc:spChg>
-        <pc:spChg chg="mod">
-          <ac:chgData name="Jeong SangWoo" userId="8b3882065fa5c9e6" providerId="LiveId" clId="{CBAE06D3-3B81-449F-A7F3-FAD05C0BB75D}" dt="2018-05-27T09:54:39.702" v="101" actId="1076"/>
-          <ac:spMkLst>
-            <pc:docMk/>
-            <pc:sldMk cId="121322230" sldId="375"/>
-            <ac:spMk id="3" creationId="{76DEDF3D-AD3E-4C60-A62E-779C9266CAD4}"/>
-          </ac:spMkLst>
-        </pc:spChg>
-        <pc:spChg chg="del mod">
-          <ac:chgData name="Jeong SangWoo" userId="8b3882065fa5c9e6" providerId="LiveId" clId="{CBAE06D3-3B81-449F-A7F3-FAD05C0BB75D}" dt="2018-05-27T09:53:25.549" v="92" actId="478"/>
-          <ac:spMkLst>
-            <pc:docMk/>
-            <pc:sldMk cId="121322230" sldId="375"/>
-            <ac:spMk id="11" creationId="{AC22DCD9-5B4C-4536-93E8-1FF813C69FF0}"/>
-          </ac:spMkLst>
-        </pc:spChg>
-        <pc:picChg chg="add del mod">
-          <ac:chgData name="Jeong SangWoo" userId="8b3882065fa5c9e6" providerId="LiveId" clId="{CBAE06D3-3B81-449F-A7F3-FAD05C0BB75D}" dt="2018-05-27T09:54:20.097" v="95" actId="1076"/>
-          <ac:picMkLst>
-            <pc:docMk/>
-            <pc:sldMk cId="121322230" sldId="375"/>
-            <ac:picMk id="4" creationId="{5D71804E-B1DE-4467-8837-C0AC2346E030}"/>
-          </ac:picMkLst>
-        </pc:picChg>
-        <pc:picChg chg="del">
-          <ac:chgData name="Jeong SangWoo" userId="8b3882065fa5c9e6" providerId="LiveId" clId="{CBAE06D3-3B81-449F-A7F3-FAD05C0BB75D}" dt="2018-05-27T09:52:17.409" v="49" actId="478"/>
-          <ac:picMkLst>
-            <pc:docMk/>
-            <pc:sldMk cId="121322230" sldId="375"/>
-            <ac:picMk id="5" creationId="{2FB3B230-3C40-4D6C-B7F3-B0EC848C8276}"/>
-          </ac:picMkLst>
-        </pc:picChg>
-      </pc:sldChg>
-      <pc:sldChg chg="del">
-        <pc:chgData name="Jeong SangWoo" userId="8b3882065fa5c9e6" providerId="LiveId" clId="{CBAE06D3-3B81-449F-A7F3-FAD05C0BB75D}" dt="2018-05-27T09:50:35.171" v="33" actId="2696"/>
-        <pc:sldMkLst>
-          <pc:docMk/>
-          <pc:sldMk cId="1450421919" sldId="376"/>
-        </pc:sldMkLst>
-      </pc:sldChg>
-      <pc:sldChg chg="addSp delSp modSp add">
-        <pc:chgData name="Jeong SangWoo" userId="8b3882065fa5c9e6" providerId="LiveId" clId="{CBAE06D3-3B81-449F-A7F3-FAD05C0BB75D}" dt="2018-05-27T09:54:28.348" v="98" actId="2696"/>
-        <pc:sldMkLst>
-          <pc:docMk/>
-          <pc:sldMk cId="2053696221" sldId="376"/>
-        </pc:sldMkLst>
-        <pc:spChg chg="del">
-          <ac:chgData name="Jeong SangWoo" userId="8b3882065fa5c9e6" providerId="LiveId" clId="{CBAE06D3-3B81-449F-A7F3-FAD05C0BB75D}" dt="2018-05-27T09:54:27.211" v="97" actId="478"/>
-          <ac:spMkLst>
-            <pc:docMk/>
-            <pc:sldMk cId="2053696221" sldId="376"/>
-            <ac:spMk id="3" creationId="{76DEDF3D-AD3E-4C60-A62E-779C9266CAD4}"/>
-          </ac:spMkLst>
-        </pc:spChg>
-        <pc:spChg chg="add mod">
-          <ac:chgData name="Jeong SangWoo" userId="8b3882065fa5c9e6" providerId="LiveId" clId="{CBAE06D3-3B81-449F-A7F3-FAD05C0BB75D}" dt="2018-05-27T09:54:27.211" v="97" actId="478"/>
-          <ac:spMkLst>
-            <pc:docMk/>
-            <pc:sldMk cId="2053696221" sldId="376"/>
-            <ac:spMk id="4" creationId="{EB0EBC6B-012A-4ACA-8760-6CC34C9635E0}"/>
-          </ac:spMkLst>
-        </pc:spChg>
-        <pc:picChg chg="add">
-          <ac:chgData name="Jeong SangWoo" userId="8b3882065fa5c9e6" providerId="LiveId" clId="{CBAE06D3-3B81-449F-A7F3-FAD05C0BB75D}" dt="2018-05-27T09:54:28.348" v="98" actId="2696"/>
-          <ac:picMkLst>
-            <pc:docMk/>
-            <pc:sldMk cId="2053696221" sldId="376"/>
-            <ac:picMk id="5" creationId="{DB154649-6ED9-4EE1-A9C5-E8703DBC38E3}"/>
-          </ac:picMkLst>
-        </pc:picChg>
-      </pc:sldChg>
-      <pc:sldChg chg="addSp delSp modSp add">
-        <pc:chgData name="Jeong SangWoo" userId="8b3882065fa5c9e6" providerId="LiveId" clId="{CBAE06D3-3B81-449F-A7F3-FAD05C0BB75D}" dt="2018-05-27T09:54:59.199" v="105" actId="1076"/>
-        <pc:sldMkLst>
-          <pc:docMk/>
-          <pc:sldMk cId="2394875296" sldId="377"/>
-        </pc:sldMkLst>
-        <pc:picChg chg="add mod">
-          <ac:chgData name="Jeong SangWoo" userId="8b3882065fa5c9e6" providerId="LiveId" clId="{CBAE06D3-3B81-449F-A7F3-FAD05C0BB75D}" dt="2018-05-27T09:54:59.199" v="105" actId="1076"/>
-          <ac:picMkLst>
-            <pc:docMk/>
-            <pc:sldMk cId="2394875296" sldId="377"/>
-            <ac:picMk id="2" creationId="{1B8FF623-91F4-4F70-BB08-6D6E21D6467B}"/>
-          </ac:picMkLst>
-        </pc:picChg>
-        <pc:picChg chg="del">
-          <ac:chgData name="Jeong SangWoo" userId="8b3882065fa5c9e6" providerId="LiveId" clId="{CBAE06D3-3B81-449F-A7F3-FAD05C0BB75D}" dt="2018-05-27T09:54:57.685" v="103" actId="478"/>
-          <ac:picMkLst>
-            <pc:docMk/>
-            <pc:sldMk cId="2394875296" sldId="377"/>
-            <ac:picMk id="5" creationId="{DB154649-6ED9-4EE1-A9C5-E8703DBC38E3}"/>
-          </ac:picMkLst>
-        </pc:picChg>
-      </pc:sldChg>
-      <pc:sldChg chg="del">
-        <pc:chgData name="Jeong SangWoo" userId="8b3882065fa5c9e6" providerId="LiveId" clId="{CBAE06D3-3B81-449F-A7F3-FAD05C0BB75D}" dt="2018-05-27T09:50:35.180" v="34" actId="2696"/>
-        <pc:sldMkLst>
-          <pc:docMk/>
-          <pc:sldMk cId="4046101176" sldId="377"/>
-        </pc:sldMkLst>
-      </pc:sldChg>
-      <pc:sldChg chg="addSp delSp modSp add">
-        <pc:chgData name="Jeong SangWoo" userId="8b3882065fa5c9e6" providerId="LiveId" clId="{CBAE06D3-3B81-449F-A7F3-FAD05C0BB75D}" dt="2018-05-27T09:59:50.872" v="154" actId="121"/>
-        <pc:sldMkLst>
-          <pc:docMk/>
-          <pc:sldMk cId="2092208707" sldId="378"/>
-        </pc:sldMkLst>
-        <pc:spChg chg="mod">
-          <ac:chgData name="Jeong SangWoo" userId="8b3882065fa5c9e6" providerId="LiveId" clId="{CBAE06D3-3B81-449F-A7F3-FAD05C0BB75D}" dt="2018-05-27T09:55:17.752" v="127" actId="121"/>
-          <ac:spMkLst>
-            <pc:docMk/>
-            <pc:sldMk cId="2092208707" sldId="378"/>
-            <ac:spMk id="4" creationId="{EB0EBC6B-012A-4ACA-8760-6CC34C9635E0}"/>
-          </ac:spMkLst>
-        </pc:spChg>
-        <pc:graphicFrameChg chg="add mod modGraphic">
-          <ac:chgData name="Jeong SangWoo" userId="8b3882065fa5c9e6" providerId="LiveId" clId="{CBAE06D3-3B81-449F-A7F3-FAD05C0BB75D}" dt="2018-05-27T09:59:50.872" v="154" actId="121"/>
-          <ac:graphicFrameMkLst>
-            <pc:docMk/>
-            <pc:sldMk cId="2092208707" sldId="378"/>
-            <ac:graphicFrameMk id="3" creationId="{6B39A3A4-4A6D-4A2D-986B-4159AA46198E}"/>
-          </ac:graphicFrameMkLst>
-        </pc:graphicFrameChg>
-        <pc:picChg chg="del">
-          <ac:chgData name="Jeong SangWoo" userId="8b3882065fa5c9e6" providerId="LiveId" clId="{CBAE06D3-3B81-449F-A7F3-FAD05C0BB75D}" dt="2018-05-27T09:55:02.887" v="107" actId="478"/>
-          <ac:picMkLst>
-            <pc:docMk/>
-            <pc:sldMk cId="2092208707" sldId="378"/>
-            <ac:picMk id="2" creationId="{1B8FF623-91F4-4F70-BB08-6D6E21D6467B}"/>
-          </ac:picMkLst>
-        </pc:picChg>
-      </pc:sldChg>
-      <pc:sldChg chg="del">
-        <pc:chgData name="Jeong SangWoo" userId="8b3882065fa5c9e6" providerId="LiveId" clId="{CBAE06D3-3B81-449F-A7F3-FAD05C0BB75D}" dt="2018-05-27T09:50:45.095" v="41" actId="2696"/>
-        <pc:sldMkLst>
-          <pc:docMk/>
-          <pc:sldMk cId="1613427096" sldId="379"/>
-        </pc:sldMkLst>
-      </pc:sldChg>
-      <pc:sldChg chg="modSp add">
-        <pc:chgData name="Jeong SangWoo" userId="8b3882065fa5c9e6" providerId="LiveId" clId="{CBAE06D3-3B81-449F-A7F3-FAD05C0BB75D}" dt="2018-05-27T10:03:10.275" v="217" actId="122"/>
-        <pc:sldMkLst>
-          <pc:docMk/>
-          <pc:sldMk cId="3544114982" sldId="379"/>
-        </pc:sldMkLst>
-        <pc:spChg chg="mod">
-          <ac:chgData name="Jeong SangWoo" userId="8b3882065fa5c9e6" providerId="LiveId" clId="{CBAE06D3-3B81-449F-A7F3-FAD05C0BB75D}" dt="2018-05-27T10:03:10.275" v="217" actId="122"/>
-          <ac:spMkLst>
-            <pc:docMk/>
-            <pc:sldMk cId="3544114982" sldId="379"/>
-            <ac:spMk id="4" creationId="{EB0EBC6B-012A-4ACA-8760-6CC34C9635E0}"/>
+            <pc:sldMk cId="3655051314" sldId="256"/>
+            <ac:spMk id="3" creationId="{DE6C901A-D1F1-4F84-82A0-6259DA1FA2B3}"/>
           </ac:spMkLst>
         </pc:spChg>
       </pc:sldChg>
-      <pc:sldChg chg="addSp modSp add">
-        <pc:chgData name="Jeong SangWoo" userId="8b3882065fa5c9e6" providerId="LiveId" clId="{CBAE06D3-3B81-449F-A7F3-FAD05C0BB75D}" dt="2018-05-27T10:04:11.810" v="219" actId="1076"/>
-        <pc:sldMkLst>
-          <pc:docMk/>
-          <pc:sldMk cId="459164807" sldId="380"/>
-        </pc:sldMkLst>
-        <pc:picChg chg="add mod">
-          <ac:chgData name="Jeong SangWoo" userId="8b3882065fa5c9e6" providerId="LiveId" clId="{CBAE06D3-3B81-449F-A7F3-FAD05C0BB75D}" dt="2018-05-27T10:04:11.810" v="219" actId="1076"/>
-          <ac:picMkLst>
-            <pc:docMk/>
-            <pc:sldMk cId="459164807" sldId="380"/>
-            <ac:picMk id="2" creationId="{551EC926-2B8E-4015-A003-89BDB6AF112B}"/>
-          </ac:picMkLst>
-        </pc:picChg>
-      </pc:sldChg>
-      <pc:sldChg chg="del">
-        <pc:chgData name="Jeong SangWoo" userId="8b3882065fa5c9e6" providerId="LiveId" clId="{CBAE06D3-3B81-449F-A7F3-FAD05C0BB75D}" dt="2018-05-27T09:50:45.108" v="42" actId="2696"/>
-        <pc:sldMkLst>
-          <pc:docMk/>
-          <pc:sldMk cId="859655405" sldId="380"/>
-        </pc:sldMkLst>
-      </pc:sldChg>
-      <pc:sldChg chg="del">
-        <pc:chgData name="Jeong SangWoo" userId="8b3882065fa5c9e6" providerId="LiveId" clId="{CBAE06D3-3B81-449F-A7F3-FAD05C0BB75D}" dt="2018-05-27T09:50:45.132" v="44" actId="2696"/>
-        <pc:sldMkLst>
-          <pc:docMk/>
-          <pc:sldMk cId="486618669" sldId="381"/>
-        </pc:sldMkLst>
-      </pc:sldChg>
-      <pc:sldChg chg="addSp modSp add">
-        <pc:chgData name="Jeong SangWoo" userId="8b3882065fa5c9e6" providerId="LiveId" clId="{CBAE06D3-3B81-449F-A7F3-FAD05C0BB75D}" dt="2018-05-27T10:06:58.505" v="259" actId="20577"/>
-        <pc:sldMkLst>
-          <pc:docMk/>
-          <pc:sldMk cId="4053553878" sldId="381"/>
-        </pc:sldMkLst>
-        <pc:spChg chg="mod">
-          <ac:chgData name="Jeong SangWoo" userId="8b3882065fa5c9e6" providerId="LiveId" clId="{CBAE06D3-3B81-449F-A7F3-FAD05C0BB75D}" dt="2018-05-27T10:04:31.664" v="226" actId="20577"/>
-          <ac:spMkLst>
-            <pc:docMk/>
-            <pc:sldMk cId="4053553878" sldId="381"/>
-            <ac:spMk id="4" creationId="{EB0EBC6B-012A-4ACA-8760-6CC34C9635E0}"/>
-          </ac:spMkLst>
-        </pc:spChg>
-        <pc:graphicFrameChg chg="add modGraphic">
-          <ac:chgData name="Jeong SangWoo" userId="8b3882065fa5c9e6" providerId="LiveId" clId="{CBAE06D3-3B81-449F-A7F3-FAD05C0BB75D}" dt="2018-05-27T10:06:58.505" v="259" actId="20577"/>
-          <ac:graphicFrameMkLst>
-            <pc:docMk/>
-            <pc:sldMk cId="4053553878" sldId="381"/>
-            <ac:graphicFrameMk id="3" creationId="{7B226D33-72C0-43C3-933A-6784C48F14BC}"/>
-          </ac:graphicFrameMkLst>
-        </pc:graphicFrameChg>
-      </pc:sldChg>
-      <pc:sldChg chg="del">
-        <pc:chgData name="Jeong SangWoo" userId="8b3882065fa5c9e6" providerId="LiveId" clId="{CBAE06D3-3B81-449F-A7F3-FAD05C0BB75D}" dt="2018-05-27T09:50:45.118" v="43" actId="2696"/>
-        <pc:sldMkLst>
-          <pc:docMk/>
-          <pc:sldMk cId="478563443" sldId="382"/>
-        </pc:sldMkLst>
-      </pc:sldChg>
-      <pc:sldChg chg="modSp add">
-        <pc:chgData name="Jeong SangWoo" userId="8b3882065fa5c9e6" providerId="LiveId" clId="{CBAE06D3-3B81-449F-A7F3-FAD05C0BB75D}" dt="2018-05-27T10:09:50.992" v="294" actId="2696"/>
-        <pc:sldMkLst>
-          <pc:docMk/>
-          <pc:sldMk cId="2794658932" sldId="382"/>
-        </pc:sldMkLst>
-        <pc:spChg chg="mod">
-          <ac:chgData name="Jeong SangWoo" userId="8b3882065fa5c9e6" providerId="LiveId" clId="{CBAE06D3-3B81-449F-A7F3-FAD05C0BB75D}" dt="2018-05-27T10:09:50.992" v="294" actId="2696"/>
-          <ac:spMkLst>
-            <pc:docMk/>
-            <pc:sldMk cId="2794658932" sldId="382"/>
-            <ac:spMk id="4" creationId="{EB0EBC6B-012A-4ACA-8760-6CC34C9635E0}"/>
-          </ac:spMkLst>
-        </pc:spChg>
-      </pc:sldChg>
-      <pc:sldChg chg="addSp add">
-        <pc:chgData name="Jeong SangWoo" userId="8b3882065fa5c9e6" providerId="LiveId" clId="{CBAE06D3-3B81-449F-A7F3-FAD05C0BB75D}" dt="2018-05-27T10:10:05.382" v="295" actId="2696"/>
-        <pc:sldMkLst>
-          <pc:docMk/>
-          <pc:sldMk cId="3647005457" sldId="383"/>
-        </pc:sldMkLst>
-        <pc:picChg chg="add">
-          <ac:chgData name="Jeong SangWoo" userId="8b3882065fa5c9e6" providerId="LiveId" clId="{CBAE06D3-3B81-449F-A7F3-FAD05C0BB75D}" dt="2018-05-27T10:10:05.382" v="295" actId="2696"/>
-          <ac:picMkLst>
-            <pc:docMk/>
-            <pc:sldMk cId="3647005457" sldId="383"/>
-            <ac:picMk id="2" creationId="{94A30234-8284-40C9-BEC4-92DAA7D97796}"/>
-          </ac:picMkLst>
-        </pc:picChg>
-      </pc:sldChg>
-      <pc:sldChg chg="del">
-        <pc:chgData name="Jeong SangWoo" userId="8b3882065fa5c9e6" providerId="LiveId" clId="{CBAE06D3-3B81-449F-A7F3-FAD05C0BB75D}" dt="2018-05-27T09:50:45.147" v="45" actId="2696"/>
-        <pc:sldMkLst>
-          <pc:docMk/>
-          <pc:sldMk cId="3862583093" sldId="383"/>
-        </pc:sldMkLst>
-      </pc:sldChg>
-      <pc:sldChg chg="addSp modSp add">
-        <pc:chgData name="Jeong SangWoo" userId="8b3882065fa5c9e6" providerId="LiveId" clId="{CBAE06D3-3B81-449F-A7F3-FAD05C0BB75D}" dt="2018-05-27T10:12:13.971" v="401" actId="20577"/>
-        <pc:sldMkLst>
-          <pc:docMk/>
-          <pc:sldMk cId="1921309914" sldId="384"/>
-        </pc:sldMkLst>
-        <pc:spChg chg="mod">
-          <ac:chgData name="Jeong SangWoo" userId="8b3882065fa5c9e6" providerId="LiveId" clId="{CBAE06D3-3B81-449F-A7F3-FAD05C0BB75D}" dt="2018-05-27T10:10:22.541" v="302" actId="20577"/>
-          <ac:spMkLst>
-            <pc:docMk/>
-            <pc:sldMk cId="1921309914" sldId="384"/>
-            <ac:spMk id="4" creationId="{EB0EBC6B-012A-4ACA-8760-6CC34C9635E0}"/>
-          </ac:spMkLst>
-        </pc:spChg>
-        <pc:graphicFrameChg chg="add mod modGraphic">
-          <ac:chgData name="Jeong SangWoo" userId="8b3882065fa5c9e6" providerId="LiveId" clId="{CBAE06D3-3B81-449F-A7F3-FAD05C0BB75D}" dt="2018-05-27T10:12:13.971" v="401" actId="20577"/>
-          <ac:graphicFrameMkLst>
-            <pc:docMk/>
-            <pc:sldMk cId="1921309914" sldId="384"/>
-            <ac:graphicFrameMk id="3" creationId="{AA297D23-2656-43E6-948D-530B44AFF3AD}"/>
-          </ac:graphicFrameMkLst>
-        </pc:graphicFrameChg>
-      </pc:sldChg>
-      <pc:sldChg chg="del">
-        <pc:chgData name="Jeong SangWoo" userId="8b3882065fa5c9e6" providerId="LiveId" clId="{CBAE06D3-3B81-449F-A7F3-FAD05C0BB75D}" dt="2018-05-27T09:50:45.154" v="46" actId="2696"/>
-        <pc:sldMkLst>
-          <pc:docMk/>
-          <pc:sldMk cId="3256850263" sldId="384"/>
-        </pc:sldMkLst>
-      </pc:sldChg>
-      <pc:sldChg chg="del">
-        <pc:chgData name="Jeong SangWoo" userId="8b3882065fa5c9e6" providerId="LiveId" clId="{CBAE06D3-3B81-449F-A7F3-FAD05C0BB75D}" dt="2018-05-27T09:50:35.189" v="35" actId="2696"/>
-        <pc:sldMkLst>
-          <pc:docMk/>
-          <pc:sldMk cId="2809608429" sldId="385"/>
-        </pc:sldMkLst>
-      </pc:sldChg>
-      <pc:sldChg chg="add del">
-        <pc:chgData name="Jeong SangWoo" userId="8b3882065fa5c9e6" providerId="LiveId" clId="{CBAE06D3-3B81-449F-A7F3-FAD05C0BB75D}" dt="2018-05-27T10:14:07.291" v="403" actId="2696"/>
-        <pc:sldMkLst>
-          <pc:docMk/>
-          <pc:sldMk cId="3240517434" sldId="385"/>
-        </pc:sldMkLst>
-      </pc:sldChg>
-      <pc:sldChg chg="del">
-        <pc:chgData name="Jeong SangWoo" userId="8b3882065fa5c9e6" providerId="LiveId" clId="{CBAE06D3-3B81-449F-A7F3-FAD05C0BB75D}" dt="2018-05-27T09:50:35.207" v="36" actId="2696"/>
-        <pc:sldMkLst>
-          <pc:docMk/>
-          <pc:sldMk cId="1608468357" sldId="386"/>
-        </pc:sldMkLst>
-      </pc:sldChg>
-      <pc:sldChg chg="add del">
-        <pc:chgData name="Jeong SangWoo" userId="8b3882065fa5c9e6" providerId="LiveId" clId="{CBAE06D3-3B81-449F-A7F3-FAD05C0BB75D}" dt="2018-05-27T10:14:07.290" v="402" actId="2696"/>
-        <pc:sldMkLst>
-          <pc:docMk/>
-          <pc:sldMk cId="2063371977" sldId="386"/>
-        </pc:sldMkLst>
-      </pc:sldChg>
-      <pc:sldChg chg="del">
-        <pc:chgData name="Jeong SangWoo" userId="8b3882065fa5c9e6" providerId="LiveId" clId="{CBAE06D3-3B81-449F-A7F3-FAD05C0BB75D}" dt="2018-05-27T09:50:35.222" v="37" actId="2696"/>
-        <pc:sldMkLst>
-          <pc:docMk/>
-          <pc:sldMk cId="928948610" sldId="387"/>
-        </pc:sldMkLst>
-      </pc:sldChg>
-      <pc:sldChg chg="del">
-        <pc:chgData name="Jeong SangWoo" userId="8b3882065fa5c9e6" providerId="LiveId" clId="{CBAE06D3-3B81-449F-A7F3-FAD05C0BB75D}" dt="2018-05-27T09:50:35.255" v="40" actId="2696"/>
-        <pc:sldMkLst>
-          <pc:docMk/>
-          <pc:sldMk cId="2280014155" sldId="388"/>
-        </pc:sldMkLst>
-      </pc:sldChg>
-      <pc:sldChg chg="del">
-        <pc:chgData name="Jeong SangWoo" userId="8b3882065fa5c9e6" providerId="LiveId" clId="{CBAE06D3-3B81-449F-A7F3-FAD05C0BB75D}" dt="2018-05-27T09:50:35.233" v="38" actId="2696"/>
-        <pc:sldMkLst>
-          <pc:docMk/>
-          <pc:sldMk cId="1669710602" sldId="389"/>
-        </pc:sldMkLst>
-      </pc:sldChg>
-      <pc:sldChg chg="del">
-        <pc:chgData name="Jeong SangWoo" userId="8b3882065fa5c9e6" providerId="LiveId" clId="{CBAE06D3-3B81-449F-A7F3-FAD05C0BB75D}" dt="2018-05-27T09:50:35.248" v="39" actId="2696"/>
-        <pc:sldMkLst>
-          <pc:docMk/>
-          <pc:sldMk cId="68581250" sldId="390"/>
-        </pc:sldMkLst>
-      </pc:sldChg>
+    </pc:docChg>
+  </pc:docChgLst>
+  <pc:docChgLst>
+    <pc:chgData name="SangWoo Jeong" userId="8b3882065fa5c9e6" providerId="LiveId" clId="{14CFD2A0-69CA-4966-9D0D-364737176734}"/>
+    <pc:docChg chg="custSel modSld">
+      <pc:chgData name="SangWoo Jeong" userId="8b3882065fa5c9e6" providerId="LiveId" clId="{14CFD2A0-69CA-4966-9D0D-364737176734}" dt="2018-04-05T05:53:57.977" v="3" actId="1076"/>
+      <pc:docMkLst>
+        <pc:docMk/>
+      </pc:docMkLst>
     </pc:docChg>
   </pc:docChgLst>
   <pc:docChgLst>
@@ -737,315 +514,6 @@
           <pc:sldMk cId="1746186059" sldId="260"/>
         </pc:sldMkLst>
       </pc:sldChg>
-    </pc:docChg>
-  </pc:docChgLst>
-  <pc:docChgLst>
-    <pc:chgData name="Jeong SangWoo" userId="8b3882065fa5c9e6" providerId="LiveId" clId="{C6948998-872D-4478-91A8-92141DC3D95E}"/>
-    <pc:docChg chg="undo custSel delSld modSld modMainMaster">
-      <pc:chgData name="Jeong SangWoo" userId="8b3882065fa5c9e6" providerId="LiveId" clId="{C6948998-872D-4478-91A8-92141DC3D95E}" dt="2018-04-26T07:31:53.689" v="521" actId="20577"/>
-      <pc:docMkLst>
-        <pc:docMk/>
-      </pc:docMkLst>
-      <pc:sldChg chg="addSp delSp">
-        <pc:chgData name="Jeong SangWoo" userId="8b3882065fa5c9e6" providerId="LiveId" clId="{C6948998-872D-4478-91A8-92141DC3D95E}" dt="2018-04-21T04:58:17.137" v="28" actId="20577"/>
-        <pc:sldMkLst>
-          <pc:docMk/>
-          <pc:sldMk cId="3655051314" sldId="256"/>
-        </pc:sldMkLst>
-        <pc:spChg chg="add del">
-          <ac:chgData name="Jeong SangWoo" userId="8b3882065fa5c9e6" providerId="LiveId" clId="{C6948998-872D-4478-91A8-92141DC3D95E}" dt="2018-04-21T04:58:17.137" v="28" actId="20577"/>
-          <ac:spMkLst>
-            <pc:docMk/>
-            <pc:sldMk cId="3655051314" sldId="256"/>
-            <ac:spMk id="4" creationId="{826D4A64-0108-4B3E-8EEB-9BB7C2B8247B}"/>
-          </ac:spMkLst>
-        </pc:spChg>
-        <pc:spChg chg="add del">
-          <ac:chgData name="Jeong SangWoo" userId="8b3882065fa5c9e6" providerId="LiveId" clId="{C6948998-872D-4478-91A8-92141DC3D95E}" dt="2018-04-21T04:58:16.755" v="27" actId="20577"/>
-          <ac:spMkLst>
-            <pc:docMk/>
-            <pc:sldMk cId="3655051314" sldId="256"/>
-            <ac:spMk id="5" creationId="{6AC4B7A6-1303-47BF-904B-DC5B460069CB}"/>
-          </ac:spMkLst>
-        </pc:spChg>
-      </pc:sldChg>
-      <pc:sldMasterChg chg="modSldLayout">
-        <pc:chgData name="Jeong SangWoo" userId="8b3882065fa5c9e6" providerId="LiveId" clId="{C6948998-872D-4478-91A8-92141DC3D95E}" dt="2018-04-21T05:02:36.268" v="110" actId="478"/>
-        <pc:sldMasterMkLst>
-          <pc:docMk/>
-          <pc:sldMasterMk cId="2055134626" sldId="2147483676"/>
-        </pc:sldMasterMkLst>
-        <pc:sldLayoutChg chg="addSp modSp">
-          <pc:chgData name="Jeong SangWoo" userId="8b3882065fa5c9e6" providerId="LiveId" clId="{C6948998-872D-4478-91A8-92141DC3D95E}" dt="2018-04-21T04:58:54.841" v="30" actId="167"/>
-          <pc:sldLayoutMkLst>
-            <pc:docMk/>
-            <pc:sldMasterMk cId="2055134626" sldId="2147483676"/>
-            <pc:sldLayoutMk cId="2888695832" sldId="2147483688"/>
-          </pc:sldLayoutMkLst>
-          <pc:spChg chg="add ord">
-            <ac:chgData name="Jeong SangWoo" userId="8b3882065fa5c9e6" providerId="LiveId" clId="{C6948998-872D-4478-91A8-92141DC3D95E}" dt="2018-04-21T04:58:54.841" v="30" actId="167"/>
-            <ac:spMkLst>
-              <pc:docMk/>
-              <pc:sldMasterMk cId="2055134626" sldId="2147483676"/>
-              <pc:sldLayoutMk cId="2888695832" sldId="2147483688"/>
-              <ac:spMk id="4" creationId="{468BB1C5-36C9-4DE9-B6ED-4174A55FE657}"/>
-            </ac:spMkLst>
-          </pc:spChg>
-        </pc:sldLayoutChg>
-        <pc:sldLayoutChg chg="addSp delSp modSp">
-          <pc:chgData name="Jeong SangWoo" userId="8b3882065fa5c9e6" providerId="LiveId" clId="{C6948998-872D-4478-91A8-92141DC3D95E}" dt="2018-04-21T05:02:36.268" v="110" actId="478"/>
-          <pc:sldLayoutMkLst>
-            <pc:docMk/>
-            <pc:sldMasterMk cId="2055134626" sldId="2147483676"/>
-            <pc:sldLayoutMk cId="251237391" sldId="2147483693"/>
-          </pc:sldLayoutMkLst>
-          <pc:spChg chg="del">
-            <ac:chgData name="Jeong SangWoo" userId="8b3882065fa5c9e6" providerId="LiveId" clId="{C6948998-872D-4478-91A8-92141DC3D95E}" dt="2018-04-21T04:59:33.869" v="32" actId="478"/>
-            <ac:spMkLst>
-              <pc:docMk/>
-              <pc:sldMasterMk cId="2055134626" sldId="2147483676"/>
-              <pc:sldLayoutMk cId="251237391" sldId="2147483693"/>
-              <ac:spMk id="2" creationId="{5F97810C-4C17-4BE0-8726-B25C42F8CB64}"/>
-            </ac:spMkLst>
-          </pc:spChg>
-          <pc:spChg chg="add mod">
-            <ac:chgData name="Jeong SangWoo" userId="8b3882065fa5c9e6" providerId="LiveId" clId="{C6948998-872D-4478-91A8-92141DC3D95E}" dt="2018-04-21T05:01:35.147" v="84" actId="1036"/>
-            <ac:spMkLst>
-              <pc:docMk/>
-              <pc:sldMasterMk cId="2055134626" sldId="2147483676"/>
-              <pc:sldLayoutMk cId="251237391" sldId="2147483693"/>
-              <ac:spMk id="3" creationId="{C98E057A-AEE1-4C1C-BFE3-17126FA4FE0B}"/>
-            </ac:spMkLst>
-          </pc:spChg>
-          <pc:spChg chg="add del mod">
-            <ac:chgData name="Jeong SangWoo" userId="8b3882065fa5c9e6" providerId="LiveId" clId="{C6948998-872D-4478-91A8-92141DC3D95E}" dt="2018-04-21T04:59:41.610" v="43" actId="478"/>
-            <ac:spMkLst>
-              <pc:docMk/>
-              <pc:sldMasterMk cId="2055134626" sldId="2147483676"/>
-              <pc:sldLayoutMk cId="251237391" sldId="2147483693"/>
-              <ac:spMk id="4" creationId="{5C60DAD3-BFF8-4E12-A226-4DAFBEB0CC43}"/>
-            </ac:spMkLst>
-          </pc:spChg>
-          <pc:spChg chg="add del">
-            <ac:chgData name="Jeong SangWoo" userId="8b3882065fa5c9e6" providerId="LiveId" clId="{C6948998-872D-4478-91A8-92141DC3D95E}" dt="2018-04-21T05:00:19.885" v="44" actId="11529"/>
-            <ac:spMkLst>
-              <pc:docMk/>
-              <pc:sldMasterMk cId="2055134626" sldId="2147483676"/>
-              <pc:sldLayoutMk cId="251237391" sldId="2147483693"/>
-              <ac:spMk id="5" creationId="{CC37E7FB-7D07-4574-A666-81F1EA3A8E8B}"/>
-            </ac:spMkLst>
-          </pc:spChg>
-          <pc:spChg chg="add mod">
-            <ac:chgData name="Jeong SangWoo" userId="8b3882065fa5c9e6" providerId="LiveId" clId="{C6948998-872D-4478-91A8-92141DC3D95E}" dt="2018-04-21T05:02:07.188" v="86" actId="207"/>
-            <ac:spMkLst>
-              <pc:docMk/>
-              <pc:sldMasterMk cId="2055134626" sldId="2147483676"/>
-              <pc:sldLayoutMk cId="251237391" sldId="2147483693"/>
-              <ac:spMk id="6" creationId="{18578E54-A616-43ED-8A3C-845AB70F0129}"/>
-            </ac:spMkLst>
-          </pc:spChg>
-          <pc:spChg chg="add del">
-            <ac:chgData name="Jeong SangWoo" userId="8b3882065fa5c9e6" providerId="LiveId" clId="{C6948998-872D-4478-91A8-92141DC3D95E}" dt="2018-04-21T05:01:22.520" v="52" actId="478"/>
-            <ac:spMkLst>
-              <pc:docMk/>
-              <pc:sldMasterMk cId="2055134626" sldId="2147483676"/>
-              <pc:sldLayoutMk cId="251237391" sldId="2147483693"/>
-              <ac:spMk id="7" creationId="{BC18FCE7-69B9-4D08-9707-66C9D60AB495}"/>
-            </ac:spMkLst>
-          </pc:spChg>
-          <pc:spChg chg="add del mod">
-            <ac:chgData name="Jeong SangWoo" userId="8b3882065fa5c9e6" providerId="LiveId" clId="{C6948998-872D-4478-91A8-92141DC3D95E}" dt="2018-04-21T05:02:36.268" v="110" actId="478"/>
-            <ac:spMkLst>
-              <pc:docMk/>
-              <pc:sldMasterMk cId="2055134626" sldId="2147483676"/>
-              <pc:sldLayoutMk cId="251237391" sldId="2147483693"/>
-              <ac:spMk id="8" creationId="{3115D617-9B8F-420F-8C4A-434005D73927}"/>
-            </ac:spMkLst>
-          </pc:spChg>
-        </pc:sldLayoutChg>
-      </pc:sldMasterChg>
-    </pc:docChg>
-  </pc:docChgLst>
-  <pc:docChgLst>
-    <pc:chgData name="Jeong SangWoo" userId="8b3882065fa5c9e6" providerId="LiveId" clId="{30F86056-4561-4F85-80D8-2B9537299174}"/>
-    <pc:docChg chg="undo custSel addSld delSld modSld">
-      <pc:chgData name="Jeong SangWoo" userId="8b3882065fa5c9e6" providerId="LiveId" clId="{30F86056-4561-4F85-80D8-2B9537299174}" dt="2018-05-12T08:00:07.890" v="1445"/>
-      <pc:docMkLst>
-        <pc:docMk/>
-      </pc:docMkLst>
-      <pc:sldChg chg="modSp">
-        <pc:chgData name="Jeong SangWoo" userId="8b3882065fa5c9e6" providerId="LiveId" clId="{30F86056-4561-4F85-80D8-2B9537299174}" dt="2018-05-12T05:42:48.390" v="207" actId="20577"/>
-        <pc:sldMkLst>
-          <pc:docMk/>
-          <pc:sldMk cId="3655051314" sldId="256"/>
-        </pc:sldMkLst>
-        <pc:spChg chg="mod">
-          <ac:chgData name="Jeong SangWoo" userId="8b3882065fa5c9e6" providerId="LiveId" clId="{30F86056-4561-4F85-80D8-2B9537299174}" dt="2018-05-12T05:42:48.390" v="207" actId="20577"/>
-          <ac:spMkLst>
-            <pc:docMk/>
-            <pc:sldMk cId="3655051314" sldId="256"/>
-            <ac:spMk id="3" creationId="{DE6C901A-D1F1-4F84-82A0-6259DA1FA2B3}"/>
-          </ac:spMkLst>
-        </pc:spChg>
-      </pc:sldChg>
-      <pc:sldChg chg="addSp delSp modSp add">
-        <pc:chgData name="Jeong SangWoo" userId="8b3882065fa5c9e6" providerId="LiveId" clId="{30F86056-4561-4F85-80D8-2B9537299174}" dt="2018-05-12T07:38:39.017" v="953"/>
-        <pc:sldMkLst>
-          <pc:docMk/>
-          <pc:sldMk cId="121322230" sldId="375"/>
-        </pc:sldMkLst>
-        <pc:spChg chg="mod">
-          <ac:chgData name="Jeong SangWoo" userId="8b3882065fa5c9e6" providerId="LiveId" clId="{30F86056-4561-4F85-80D8-2B9537299174}" dt="2018-05-12T05:53:06.328" v="393" actId="20577"/>
-          <ac:spMkLst>
-            <pc:docMk/>
-            <pc:sldMk cId="121322230" sldId="375"/>
-            <ac:spMk id="3" creationId="{76DEDF3D-AD3E-4C60-A62E-779C9266CAD4}"/>
-          </ac:spMkLst>
-        </pc:spChg>
-        <pc:spChg chg="add del mod">
-          <ac:chgData name="Jeong SangWoo" userId="8b3882065fa5c9e6" providerId="LiveId" clId="{30F86056-4561-4F85-80D8-2B9537299174}" dt="2018-05-12T07:33:54.744" v="562"/>
-          <ac:spMkLst>
-            <pc:docMk/>
-            <pc:sldMk cId="121322230" sldId="375"/>
-            <ac:spMk id="5" creationId="{AEA421EB-CA79-4829-8E24-13F707363D89}"/>
-          </ac:spMkLst>
-        </pc:spChg>
-        <pc:spChg chg="mod">
-          <ac:chgData name="Jeong SangWoo" userId="8b3882065fa5c9e6" providerId="LiveId" clId="{30F86056-4561-4F85-80D8-2B9537299174}" dt="2018-05-12T07:38:39.017" v="953"/>
-          <ac:spMkLst>
-            <pc:docMk/>
-            <pc:sldMk cId="121322230" sldId="375"/>
-            <ac:spMk id="11" creationId="{AC22DCD9-5B4C-4536-93E8-1FF813C69FF0}"/>
-          </ac:spMkLst>
-        </pc:spChg>
-        <pc:picChg chg="del">
-          <ac:chgData name="Jeong SangWoo" userId="8b3882065fa5c9e6" providerId="LiveId" clId="{30F86056-4561-4F85-80D8-2B9537299174}" dt="2018-05-12T05:46:28.957" v="313" actId="478"/>
-          <ac:picMkLst>
-            <pc:docMk/>
-            <pc:sldMk cId="121322230" sldId="375"/>
-            <ac:picMk id="2" creationId="{70B1EB07-5F48-4333-BAE5-6B336C8EDB16}"/>
-          </ac:picMkLst>
-        </pc:picChg>
-        <pc:picChg chg="del">
-          <ac:chgData name="Jeong SangWoo" userId="8b3882065fa5c9e6" providerId="LiveId" clId="{30F86056-4561-4F85-80D8-2B9537299174}" dt="2018-05-12T05:46:10.036" v="291" actId="478"/>
-          <ac:picMkLst>
-            <pc:docMk/>
-            <pc:sldMk cId="121322230" sldId="375"/>
-            <ac:picMk id="4" creationId="{59019C09-98C6-49C4-9364-ADB911569F09}"/>
-          </ac:picMkLst>
-        </pc:picChg>
-        <pc:picChg chg="add mod">
-          <ac:chgData name="Jeong SangWoo" userId="8b3882065fa5c9e6" providerId="LiveId" clId="{30F86056-4561-4F85-80D8-2B9537299174}" dt="2018-05-12T05:46:22.751" v="294" actId="1076"/>
-          <ac:picMkLst>
-            <pc:docMk/>
-            <pc:sldMk cId="121322230" sldId="375"/>
-            <ac:picMk id="6" creationId="{F0781856-2FF9-4436-85C1-23D415B7D817}"/>
-          </ac:picMkLst>
-        </pc:picChg>
-      </pc:sldChg>
-    </pc:docChg>
-  </pc:docChgLst>
-  <pc:docChgLst>
-    <pc:chgData name="Jeong SangWoo" userId="8b3882065fa5c9e6" providerId="LiveId" clId="{C1AC0F52-5356-4E5E-A33B-7BBA7A5173E9}"/>
-    <pc:docChg chg="undo custSel addSld delSld modSld">
-      <pc:chgData name="Jeong SangWoo" userId="8b3882065fa5c9e6" providerId="LiveId" clId="{C1AC0F52-5356-4E5E-A33B-7BBA7A5173E9}" dt="2018-05-21T04:31:10.286" v="4457" actId="207"/>
-      <pc:docMkLst>
-        <pc:docMk/>
-      </pc:docMkLst>
-      <pc:sldChg chg="modSp">
-        <pc:chgData name="Jeong SangWoo" userId="8b3882065fa5c9e6" providerId="LiveId" clId="{C1AC0F52-5356-4E5E-A33B-7BBA7A5173E9}" dt="2018-05-21T03:57:32.491" v="1557" actId="20577"/>
-        <pc:sldMkLst>
-          <pc:docMk/>
-          <pc:sldMk cId="3655051314" sldId="256"/>
-        </pc:sldMkLst>
-        <pc:spChg chg="mod">
-          <ac:chgData name="Jeong SangWoo" userId="8b3882065fa5c9e6" providerId="LiveId" clId="{C1AC0F52-5356-4E5E-A33B-7BBA7A5173E9}" dt="2018-05-21T03:57:32.491" v="1557" actId="20577"/>
-          <ac:spMkLst>
-            <pc:docMk/>
-            <pc:sldMk cId="3655051314" sldId="256"/>
-            <ac:spMk id="3" creationId="{DE6C901A-D1F1-4F84-82A0-6259DA1FA2B3}"/>
-          </ac:spMkLst>
-        </pc:spChg>
-      </pc:sldChg>
-      <pc:sldChg chg="addSp delSp modSp">
-        <pc:chgData name="Jeong SangWoo" userId="8b3882065fa5c9e6" providerId="LiveId" clId="{C1AC0F52-5356-4E5E-A33B-7BBA7A5173E9}" dt="2018-05-21T03:16:55.297" v="288" actId="207"/>
-        <pc:sldMkLst>
-          <pc:docMk/>
-          <pc:sldMk cId="121322230" sldId="375"/>
-        </pc:sldMkLst>
-        <pc:spChg chg="mod">
-          <ac:chgData name="Jeong SangWoo" userId="8b3882065fa5c9e6" providerId="LiveId" clId="{C1AC0F52-5356-4E5E-A33B-7BBA7A5173E9}" dt="2018-05-21T03:16:05.939" v="130" actId="20577"/>
-          <ac:spMkLst>
-            <pc:docMk/>
-            <pc:sldMk cId="121322230" sldId="375"/>
-            <ac:spMk id="3" creationId="{76DEDF3D-AD3E-4C60-A62E-779C9266CAD4}"/>
-          </ac:spMkLst>
-        </pc:spChg>
-        <pc:spChg chg="mod">
-          <ac:chgData name="Jeong SangWoo" userId="8b3882065fa5c9e6" providerId="LiveId" clId="{C1AC0F52-5356-4E5E-A33B-7BBA7A5173E9}" dt="2018-05-21T03:16:55.297" v="288" actId="207"/>
-          <ac:spMkLst>
-            <pc:docMk/>
-            <pc:sldMk cId="121322230" sldId="375"/>
-            <ac:spMk id="11" creationId="{AC22DCD9-5B4C-4536-93E8-1FF813C69FF0}"/>
-          </ac:spMkLst>
-        </pc:spChg>
-        <pc:picChg chg="add mod">
-          <ac:chgData name="Jeong SangWoo" userId="8b3882065fa5c9e6" providerId="LiveId" clId="{C1AC0F52-5356-4E5E-A33B-7BBA7A5173E9}" dt="2018-05-21T03:15:51.095" v="101" actId="1076"/>
-          <ac:picMkLst>
-            <pc:docMk/>
-            <pc:sldMk cId="121322230" sldId="375"/>
-            <ac:picMk id="5" creationId="{2FB3B230-3C40-4D6C-B7F3-B0EC848C8276}"/>
-          </ac:picMkLst>
-        </pc:picChg>
-        <pc:picChg chg="del">
-          <ac:chgData name="Jeong SangWoo" userId="8b3882065fa5c9e6" providerId="LiveId" clId="{C1AC0F52-5356-4E5E-A33B-7BBA7A5173E9}" dt="2018-05-21T03:15:48.563" v="100" actId="478"/>
-          <ac:picMkLst>
-            <pc:docMk/>
-            <pc:sldMk cId="121322230" sldId="375"/>
-            <ac:picMk id="6" creationId="{F0781856-2FF9-4436-85C1-23D415B7D817}"/>
-          </ac:picMkLst>
-        </pc:picChg>
-      </pc:sldChg>
-    </pc:docChg>
-  </pc:docChgLst>
-  <pc:docChgLst>
-    <pc:chgData name="Jeong SangWoo" userId="8b3882065fa5c9e6" providerId="LiveId" clId="{0E483734-3ECC-475D-BC3C-3922CEBCACE7}"/>
-    <pc:docChg chg="undo custSel addSld delSld modSld sldOrd">
-      <pc:chgData name="Jeong SangWoo" userId="8b3882065fa5c9e6" providerId="LiveId" clId="{0E483734-3ECC-475D-BC3C-3922CEBCACE7}" dt="2018-04-30T10:00:26.146" v="3661" actId="20577"/>
-      <pc:docMkLst>
-        <pc:docMk/>
-      </pc:docMkLst>
-      <pc:sldChg chg="modSp modTransition">
-        <pc:chgData name="Jeong SangWoo" userId="8b3882065fa5c9e6" providerId="LiveId" clId="{0E483734-3ECC-475D-BC3C-3922CEBCACE7}" dt="2018-04-30T10:00:26.146" v="3661" actId="20577"/>
-        <pc:sldMkLst>
-          <pc:docMk/>
-          <pc:sldMk cId="3655051314" sldId="256"/>
-        </pc:sldMkLst>
-        <pc:spChg chg="mod">
-          <ac:chgData name="Jeong SangWoo" userId="8b3882065fa5c9e6" providerId="LiveId" clId="{0E483734-3ECC-475D-BC3C-3922CEBCACE7}" dt="2018-04-30T10:00:26.146" v="3661" actId="20577"/>
-          <ac:spMkLst>
-            <pc:docMk/>
-            <pc:sldMk cId="3655051314" sldId="256"/>
-            <ac:spMk id="3" creationId="{DE6C901A-D1F1-4F84-82A0-6259DA1FA2B3}"/>
-          </ac:spMkLst>
-        </pc:spChg>
-      </pc:sldChg>
-      <pc:sldChg chg="modTransition">
-        <pc:chgData name="Jeong SangWoo" userId="8b3882065fa5c9e6" providerId="LiveId" clId="{0E483734-3ECC-475D-BC3C-3922CEBCACE7}" dt="2018-04-30T07:25:40.543" v="3631" actId="20577"/>
-        <pc:sldMkLst>
-          <pc:docMk/>
-          <pc:sldMk cId="1746186059" sldId="260"/>
-        </pc:sldMkLst>
-      </pc:sldChg>
-    </pc:docChg>
-  </pc:docChgLst>
-  <pc:docChgLst>
-    <pc:chgData name="SangWoo Jeong" userId="8b3882065fa5c9e6" providerId="LiveId" clId="{14CFD2A0-69CA-4966-9D0D-364737176734}"/>
-    <pc:docChg chg="custSel modSld">
-      <pc:chgData name="SangWoo Jeong" userId="8b3882065fa5c9e6" providerId="LiveId" clId="{14CFD2A0-69CA-4966-9D0D-364737176734}" dt="2018-04-05T05:53:57.977" v="3" actId="1076"/>
-      <pc:docMkLst>
-        <pc:docMk/>
-      </pc:docMkLst>
     </pc:docChg>
   </pc:docChgLst>
   <pc:docChgLst>
@@ -1924,6 +1392,164 @@
       </pc:sldMasterChg>
     </pc:docChg>
   </pc:docChgLst>
+  <pc:docChgLst>
+    <pc:chgData name="Jeong SangWoo" userId="8b3882065fa5c9e6" providerId="LiveId" clId="{0E483734-3ECC-475D-BC3C-3922CEBCACE7}"/>
+    <pc:docChg chg="undo custSel addSld delSld modSld sldOrd">
+      <pc:chgData name="Jeong SangWoo" userId="8b3882065fa5c9e6" providerId="LiveId" clId="{0E483734-3ECC-475D-BC3C-3922CEBCACE7}" dt="2018-04-30T10:00:26.146" v="3661" actId="20577"/>
+      <pc:docMkLst>
+        <pc:docMk/>
+      </pc:docMkLst>
+      <pc:sldChg chg="modSp modTransition">
+        <pc:chgData name="Jeong SangWoo" userId="8b3882065fa5c9e6" providerId="LiveId" clId="{0E483734-3ECC-475D-BC3C-3922CEBCACE7}" dt="2018-04-30T10:00:26.146" v="3661" actId="20577"/>
+        <pc:sldMkLst>
+          <pc:docMk/>
+          <pc:sldMk cId="3655051314" sldId="256"/>
+        </pc:sldMkLst>
+        <pc:spChg chg="mod">
+          <ac:chgData name="Jeong SangWoo" userId="8b3882065fa5c9e6" providerId="LiveId" clId="{0E483734-3ECC-475D-BC3C-3922CEBCACE7}" dt="2018-04-30T10:00:26.146" v="3661" actId="20577"/>
+          <ac:spMkLst>
+            <pc:docMk/>
+            <pc:sldMk cId="3655051314" sldId="256"/>
+            <ac:spMk id="3" creationId="{DE6C901A-D1F1-4F84-82A0-6259DA1FA2B3}"/>
+          </ac:spMkLst>
+        </pc:spChg>
+      </pc:sldChg>
+      <pc:sldChg chg="modTransition">
+        <pc:chgData name="Jeong SangWoo" userId="8b3882065fa5c9e6" providerId="LiveId" clId="{0E483734-3ECC-475D-BC3C-3922CEBCACE7}" dt="2018-04-30T07:25:40.543" v="3631" actId="20577"/>
+        <pc:sldMkLst>
+          <pc:docMk/>
+          <pc:sldMk cId="1746186059" sldId="260"/>
+        </pc:sldMkLst>
+      </pc:sldChg>
+    </pc:docChg>
+  </pc:docChgLst>
+  <pc:docChgLst>
+    <pc:chgData name="Jeong SangWoo" userId="8b3882065fa5c9e6" providerId="LiveId" clId="{C6948998-872D-4478-91A8-92141DC3D95E}"/>
+    <pc:docChg chg="undo custSel delSld modSld modMainMaster">
+      <pc:chgData name="Jeong SangWoo" userId="8b3882065fa5c9e6" providerId="LiveId" clId="{C6948998-872D-4478-91A8-92141DC3D95E}" dt="2018-04-26T07:31:53.689" v="521" actId="20577"/>
+      <pc:docMkLst>
+        <pc:docMk/>
+      </pc:docMkLst>
+      <pc:sldChg chg="addSp delSp">
+        <pc:chgData name="Jeong SangWoo" userId="8b3882065fa5c9e6" providerId="LiveId" clId="{C6948998-872D-4478-91A8-92141DC3D95E}" dt="2018-04-21T04:58:17.137" v="28" actId="20577"/>
+        <pc:sldMkLst>
+          <pc:docMk/>
+          <pc:sldMk cId="3655051314" sldId="256"/>
+        </pc:sldMkLst>
+        <pc:spChg chg="add del">
+          <ac:chgData name="Jeong SangWoo" userId="8b3882065fa5c9e6" providerId="LiveId" clId="{C6948998-872D-4478-91A8-92141DC3D95E}" dt="2018-04-21T04:58:17.137" v="28" actId="20577"/>
+          <ac:spMkLst>
+            <pc:docMk/>
+            <pc:sldMk cId="3655051314" sldId="256"/>
+            <ac:spMk id="4" creationId="{826D4A64-0108-4B3E-8EEB-9BB7C2B8247B}"/>
+          </ac:spMkLst>
+        </pc:spChg>
+        <pc:spChg chg="add del">
+          <ac:chgData name="Jeong SangWoo" userId="8b3882065fa5c9e6" providerId="LiveId" clId="{C6948998-872D-4478-91A8-92141DC3D95E}" dt="2018-04-21T04:58:16.755" v="27" actId="20577"/>
+          <ac:spMkLst>
+            <pc:docMk/>
+            <pc:sldMk cId="3655051314" sldId="256"/>
+            <ac:spMk id="5" creationId="{6AC4B7A6-1303-47BF-904B-DC5B460069CB}"/>
+          </ac:spMkLst>
+        </pc:spChg>
+      </pc:sldChg>
+      <pc:sldMasterChg chg="modSldLayout">
+        <pc:chgData name="Jeong SangWoo" userId="8b3882065fa5c9e6" providerId="LiveId" clId="{C6948998-872D-4478-91A8-92141DC3D95E}" dt="2018-04-21T05:02:36.268" v="110" actId="478"/>
+        <pc:sldMasterMkLst>
+          <pc:docMk/>
+          <pc:sldMasterMk cId="2055134626" sldId="2147483676"/>
+        </pc:sldMasterMkLst>
+        <pc:sldLayoutChg chg="addSp modSp">
+          <pc:chgData name="Jeong SangWoo" userId="8b3882065fa5c9e6" providerId="LiveId" clId="{C6948998-872D-4478-91A8-92141DC3D95E}" dt="2018-04-21T04:58:54.841" v="30" actId="167"/>
+          <pc:sldLayoutMkLst>
+            <pc:docMk/>
+            <pc:sldMasterMk cId="2055134626" sldId="2147483676"/>
+            <pc:sldLayoutMk cId="2888695832" sldId="2147483688"/>
+          </pc:sldLayoutMkLst>
+          <pc:spChg chg="add ord">
+            <ac:chgData name="Jeong SangWoo" userId="8b3882065fa5c9e6" providerId="LiveId" clId="{C6948998-872D-4478-91A8-92141DC3D95E}" dt="2018-04-21T04:58:54.841" v="30" actId="167"/>
+            <ac:spMkLst>
+              <pc:docMk/>
+              <pc:sldMasterMk cId="2055134626" sldId="2147483676"/>
+              <pc:sldLayoutMk cId="2888695832" sldId="2147483688"/>
+              <ac:spMk id="4" creationId="{468BB1C5-36C9-4DE9-B6ED-4174A55FE657}"/>
+            </ac:spMkLst>
+          </pc:spChg>
+        </pc:sldLayoutChg>
+        <pc:sldLayoutChg chg="addSp delSp modSp">
+          <pc:chgData name="Jeong SangWoo" userId="8b3882065fa5c9e6" providerId="LiveId" clId="{C6948998-872D-4478-91A8-92141DC3D95E}" dt="2018-04-21T05:02:36.268" v="110" actId="478"/>
+          <pc:sldLayoutMkLst>
+            <pc:docMk/>
+            <pc:sldMasterMk cId="2055134626" sldId="2147483676"/>
+            <pc:sldLayoutMk cId="251237391" sldId="2147483693"/>
+          </pc:sldLayoutMkLst>
+          <pc:spChg chg="del">
+            <ac:chgData name="Jeong SangWoo" userId="8b3882065fa5c9e6" providerId="LiveId" clId="{C6948998-872D-4478-91A8-92141DC3D95E}" dt="2018-04-21T04:59:33.869" v="32" actId="478"/>
+            <ac:spMkLst>
+              <pc:docMk/>
+              <pc:sldMasterMk cId="2055134626" sldId="2147483676"/>
+              <pc:sldLayoutMk cId="251237391" sldId="2147483693"/>
+              <ac:spMk id="2" creationId="{5F97810C-4C17-4BE0-8726-B25C42F8CB64}"/>
+            </ac:spMkLst>
+          </pc:spChg>
+          <pc:spChg chg="add mod">
+            <ac:chgData name="Jeong SangWoo" userId="8b3882065fa5c9e6" providerId="LiveId" clId="{C6948998-872D-4478-91A8-92141DC3D95E}" dt="2018-04-21T05:01:35.147" v="84" actId="1036"/>
+            <ac:spMkLst>
+              <pc:docMk/>
+              <pc:sldMasterMk cId="2055134626" sldId="2147483676"/>
+              <pc:sldLayoutMk cId="251237391" sldId="2147483693"/>
+              <ac:spMk id="3" creationId="{C98E057A-AEE1-4C1C-BFE3-17126FA4FE0B}"/>
+            </ac:spMkLst>
+          </pc:spChg>
+          <pc:spChg chg="add del mod">
+            <ac:chgData name="Jeong SangWoo" userId="8b3882065fa5c9e6" providerId="LiveId" clId="{C6948998-872D-4478-91A8-92141DC3D95E}" dt="2018-04-21T04:59:41.610" v="43" actId="478"/>
+            <ac:spMkLst>
+              <pc:docMk/>
+              <pc:sldMasterMk cId="2055134626" sldId="2147483676"/>
+              <pc:sldLayoutMk cId="251237391" sldId="2147483693"/>
+              <ac:spMk id="4" creationId="{5C60DAD3-BFF8-4E12-A226-4DAFBEB0CC43}"/>
+            </ac:spMkLst>
+          </pc:spChg>
+          <pc:spChg chg="add del">
+            <ac:chgData name="Jeong SangWoo" userId="8b3882065fa5c9e6" providerId="LiveId" clId="{C6948998-872D-4478-91A8-92141DC3D95E}" dt="2018-04-21T05:00:19.885" v="44" actId="11529"/>
+            <ac:spMkLst>
+              <pc:docMk/>
+              <pc:sldMasterMk cId="2055134626" sldId="2147483676"/>
+              <pc:sldLayoutMk cId="251237391" sldId="2147483693"/>
+              <ac:spMk id="5" creationId="{CC37E7FB-7D07-4574-A666-81F1EA3A8E8B}"/>
+            </ac:spMkLst>
+          </pc:spChg>
+          <pc:spChg chg="add mod">
+            <ac:chgData name="Jeong SangWoo" userId="8b3882065fa5c9e6" providerId="LiveId" clId="{C6948998-872D-4478-91A8-92141DC3D95E}" dt="2018-04-21T05:02:07.188" v="86" actId="207"/>
+            <ac:spMkLst>
+              <pc:docMk/>
+              <pc:sldMasterMk cId="2055134626" sldId="2147483676"/>
+              <pc:sldLayoutMk cId="251237391" sldId="2147483693"/>
+              <ac:spMk id="6" creationId="{18578E54-A616-43ED-8A3C-845AB70F0129}"/>
+            </ac:spMkLst>
+          </pc:spChg>
+          <pc:spChg chg="add del">
+            <ac:chgData name="Jeong SangWoo" userId="8b3882065fa5c9e6" providerId="LiveId" clId="{C6948998-872D-4478-91A8-92141DC3D95E}" dt="2018-04-21T05:01:22.520" v="52" actId="478"/>
+            <ac:spMkLst>
+              <pc:docMk/>
+              <pc:sldMasterMk cId="2055134626" sldId="2147483676"/>
+              <pc:sldLayoutMk cId="251237391" sldId="2147483693"/>
+              <ac:spMk id="7" creationId="{BC18FCE7-69B9-4D08-9707-66C9D60AB495}"/>
+            </ac:spMkLst>
+          </pc:spChg>
+          <pc:spChg chg="add del mod">
+            <ac:chgData name="Jeong SangWoo" userId="8b3882065fa5c9e6" providerId="LiveId" clId="{C6948998-872D-4478-91A8-92141DC3D95E}" dt="2018-04-21T05:02:36.268" v="110" actId="478"/>
+            <ac:spMkLst>
+              <pc:docMk/>
+              <pc:sldMasterMk cId="2055134626" sldId="2147483676"/>
+              <pc:sldLayoutMk cId="251237391" sldId="2147483693"/>
+              <ac:spMk id="8" creationId="{3115D617-9B8F-420F-8C4A-434005D73927}"/>
+            </ac:spMkLst>
+          </pc:spChg>
+        </pc:sldLayoutChg>
+      </pc:sldMasterChg>
+    </pc:docChg>
+  </pc:docChgLst>
 </pc:chgInfo>
 </file>
 
@@ -2021,7 +1647,7 @@
           <a:p>
             <a:fld id="{F4D17925-1D2E-4024-850D-D1371936956D}" type="datetimeFigureOut">
               <a:rPr lang="ko-KR" altLang="en-US" smtClean="0"/>
-              <a:t>2018-05-30</a:t>
+              <a:t>2018-05-31</a:t>
             </a:fld>
             <a:endParaRPr lang="ko-KR" altLang="en-US"/>
           </a:p>
@@ -2198,7 +1824,7 @@
           <a:p>
             <a:fld id="{3389243F-B1BB-4202-BD78-416ACA555174}" type="datetimeFigureOut">
               <a:rPr lang="en-US" smtClean="0"/>
-              <a:t>5/30/2018</a:t>
+              <a:t>5/31/2018</a:t>
             </a:fld>
             <a:endParaRPr lang="en-US"/>
           </a:p>
@@ -4150,7 +3776,7 @@
           <a:p>
             <a:r>
               <a:rPr lang="ko-KR" altLang="en-US" dirty="0"/>
-              <a:t>첫째</a:t>
+              <a:t>둘째</a:t>
             </a:r>
             <a:endParaRPr lang="en-US" altLang="ko-KR" dirty="0"/>
           </a:p>

</xml_diff>